<commit_message>
finisheing touches on point-point
</commit_message>
<xml_diff>
--- a/slides/MPI/MPI-point2point.pptx
+++ b/slides/MPI/MPI-point2point.pptx
@@ -5,7 +5,7 @@
     <p:sldMasterId id="2147483648" r:id="rId1"/>
   </p:sldMasterIdLst>
   <p:notesMasterIdLst>
-    <p:notesMasterId r:id="rId34"/>
+    <p:notesMasterId r:id="rId33"/>
   </p:notesMasterIdLst>
   <p:sldIdLst>
     <p:sldId id="315" r:id="rId2"/>
@@ -28,18 +28,17 @@
     <p:sldId id="273" r:id="rId19"/>
     <p:sldId id="274" r:id="rId20"/>
     <p:sldId id="311" r:id="rId21"/>
-    <p:sldId id="307" r:id="rId22"/>
-    <p:sldId id="308" r:id="rId23"/>
-    <p:sldId id="309" r:id="rId24"/>
-    <p:sldId id="310" r:id="rId25"/>
-    <p:sldId id="312" r:id="rId26"/>
-    <p:sldId id="334" r:id="rId27"/>
-    <p:sldId id="330" r:id="rId28"/>
-    <p:sldId id="328" r:id="rId29"/>
-    <p:sldId id="329" r:id="rId30"/>
-    <p:sldId id="332" r:id="rId31"/>
-    <p:sldId id="333" r:id="rId32"/>
-    <p:sldId id="331" r:id="rId33"/>
+    <p:sldId id="308" r:id="rId22"/>
+    <p:sldId id="309" r:id="rId23"/>
+    <p:sldId id="310" r:id="rId24"/>
+    <p:sldId id="312" r:id="rId25"/>
+    <p:sldId id="334" r:id="rId26"/>
+    <p:sldId id="330" r:id="rId27"/>
+    <p:sldId id="328" r:id="rId28"/>
+    <p:sldId id="329" r:id="rId29"/>
+    <p:sldId id="332" r:id="rId30"/>
+    <p:sldId id="333" r:id="rId31"/>
+    <p:sldId id="331" r:id="rId32"/>
   </p:sldIdLst>
   <p:sldSz cx="9144000" cy="6858000" type="screen4x3"/>
   <p:notesSz cx="7010400" cy="9296400"/>
@@ -224,7 +223,7 @@
             <a:fld id="{A3BF2BA9-4519-4406-BDB9-3049186EFFAE}" type="datetimeFigureOut">
               <a:rPr lang="en-US" smtClean="0"/>
               <a:pPr/>
-              <a:t>3/3/13</a:t>
+              <a:t>3/5/13</a:t>
             </a:fld>
             <a:endParaRPr lang="en-US"/>
           </a:p>
@@ -1441,7 +1440,7 @@
       </p:grpSpPr>
       <p:sp>
         <p:nvSpPr>
-          <p:cNvPr id="104450" name="Rectangle 7"/>
+          <p:cNvPr id="105474" name="Rectangle 7"/>
           <p:cNvSpPr>
             <a:spLocks noGrp="1" noChangeArrowheads="1"/>
           </p:cNvSpPr>
@@ -1472,7 +1471,7 @@
                 <a:tab pos="10057844" algn="l"/>
               </a:tabLst>
             </a:pPr>
-            <a:fld id="{E2127FE2-7C80-4194-B4DC-2029569DB0B6}" type="slidenum">
+            <a:fld id="{ADA684E6-218E-4BE0-A6A6-4873A814462D}" type="slidenum">
               <a:rPr lang="en-US"/>
               <a:pPr>
                 <a:tabLst>
@@ -1498,7 +1497,7 @@
       </p:sp>
       <p:sp>
         <p:nvSpPr>
-          <p:cNvPr id="104451" name="Text Box 1"/>
+          <p:cNvPr id="105475" name="Text Box 1"/>
           <p:cNvSpPr txBox="1">
             <a:spLocks noChangeArrowheads="1"/>
           </p:cNvSpPr>
@@ -1534,7 +1533,7 @@
       </p:sp>
       <p:sp>
         <p:nvSpPr>
-          <p:cNvPr id="104452" name="Text Box 2"/>
+          <p:cNvPr id="105476" name="Text Box 2"/>
           <p:cNvSpPr>
             <a:spLocks noGrp="1" noChangeArrowheads="1"/>
           </p:cNvSpPr>
@@ -1554,9 +1553,12 @@
           <a:bodyPr wrap="none" anchor="ctr"/>
           <a:lstStyle/>
           <a:p>
-            <a:endParaRPr lang="en-US" smtClean="0">
-              <a:latin typeface="Times New Roman" pitchFamily="-112" charset="0"/>
-            </a:endParaRPr>
+            <a:r>
+              <a:rPr lang="en-US" dirty="0" smtClean="0">
+                <a:latin typeface="Times New Roman" pitchFamily="-112" charset="0"/>
+              </a:rPr>
+              <a:t>1 will always deadlock, even if Sends are made non-blocking.</a:t>
+            </a:r>
           </a:p>
         </p:txBody>
       </p:sp>
@@ -1595,7 +1597,7 @@
       </p:grpSpPr>
       <p:sp>
         <p:nvSpPr>
-          <p:cNvPr id="105474" name="Rectangle 7"/>
+          <p:cNvPr id="106498" name="Rectangle 7"/>
           <p:cNvSpPr>
             <a:spLocks noGrp="1" noChangeArrowheads="1"/>
           </p:cNvSpPr>
@@ -1626,7 +1628,7 @@
                 <a:tab pos="10057844" algn="l"/>
               </a:tabLst>
             </a:pPr>
-            <a:fld id="{ADA684E6-218E-4BE0-A6A6-4873A814462D}" type="slidenum">
+            <a:fld id="{C5708E68-B255-45E2-806D-7CE2DC1677A0}" type="slidenum">
               <a:rPr lang="en-US"/>
               <a:pPr>
                 <a:tabLst>
@@ -1652,7 +1654,7 @@
       </p:sp>
       <p:sp>
         <p:nvSpPr>
-          <p:cNvPr id="105475" name="Text Box 1"/>
+          <p:cNvPr id="106499" name="Text Box 1"/>
           <p:cNvSpPr txBox="1">
             <a:spLocks noChangeArrowheads="1"/>
           </p:cNvSpPr>
@@ -1688,7 +1690,7 @@
       </p:sp>
       <p:sp>
         <p:nvSpPr>
-          <p:cNvPr id="105476" name="Text Box 2"/>
+          <p:cNvPr id="106500" name="Text Box 2"/>
           <p:cNvSpPr>
             <a:spLocks noGrp="1" noChangeArrowheads="1"/>
           </p:cNvSpPr>
@@ -1708,12 +1710,9 @@
           <a:bodyPr wrap="none" anchor="ctr"/>
           <a:lstStyle/>
           <a:p>
-            <a:r>
-              <a:rPr lang="en-US" dirty="0" smtClean="0">
-                <a:latin typeface="Times New Roman" pitchFamily="-112" charset="0"/>
-              </a:rPr>
-              <a:t>1 will always deadlock, even if Sends are made non-blocking.</a:t>
-            </a:r>
+            <a:endParaRPr lang="en-US" smtClean="0">
+              <a:latin typeface="Times New Roman" pitchFamily="-112" charset="0"/>
+            </a:endParaRPr>
           </a:p>
         </p:txBody>
       </p:sp>
@@ -1994,160 +1993,6 @@
       </p:grpSpPr>
       <p:sp>
         <p:nvSpPr>
-          <p:cNvPr id="106498" name="Rectangle 7"/>
-          <p:cNvSpPr>
-            <a:spLocks noGrp="1" noChangeArrowheads="1"/>
-          </p:cNvSpPr>
-          <p:nvPr>
-            <p:ph type="sldNum" sz="quarter"/>
-          </p:nvPr>
-        </p:nvSpPr>
-        <p:spPr>
-          <a:noFill/>
-        </p:spPr>
-        <p:txBody>
-          <a:bodyPr/>
-          <a:lstStyle/>
-          <a:p>
-            <a:pPr>
-              <a:tabLst>
-                <a:tab pos="0" algn="l"/>
-                <a:tab pos="914350" algn="l"/>
-                <a:tab pos="1828698" algn="l"/>
-                <a:tab pos="2743048" algn="l"/>
-                <a:tab pos="3657398" algn="l"/>
-                <a:tab pos="4571748" algn="l"/>
-                <a:tab pos="5486096" algn="l"/>
-                <a:tab pos="6400446" algn="l"/>
-                <a:tab pos="7314796" algn="l"/>
-                <a:tab pos="8229144" algn="l"/>
-                <a:tab pos="9143494" algn="l"/>
-                <a:tab pos="10057844" algn="l"/>
-              </a:tabLst>
-            </a:pPr>
-            <a:fld id="{C5708E68-B255-45E2-806D-7CE2DC1677A0}" type="slidenum">
-              <a:rPr lang="en-US"/>
-              <a:pPr>
-                <a:tabLst>
-                  <a:tab pos="0" algn="l"/>
-                  <a:tab pos="914350" algn="l"/>
-                  <a:tab pos="1828698" algn="l"/>
-                  <a:tab pos="2743048" algn="l"/>
-                  <a:tab pos="3657398" algn="l"/>
-                  <a:tab pos="4571748" algn="l"/>
-                  <a:tab pos="5486096" algn="l"/>
-                  <a:tab pos="6400446" algn="l"/>
-                  <a:tab pos="7314796" algn="l"/>
-                  <a:tab pos="8229144" algn="l"/>
-                  <a:tab pos="9143494" algn="l"/>
-                  <a:tab pos="10057844" algn="l"/>
-                </a:tabLst>
-              </a:pPr>
-              <a:t>23</a:t>
-            </a:fld>
-            <a:endParaRPr lang="en-US" dirty="0"/>
-          </a:p>
-        </p:txBody>
-      </p:sp>
-      <p:sp>
-        <p:nvSpPr>
-          <p:cNvPr id="106499" name="Text Box 1"/>
-          <p:cNvSpPr txBox="1">
-            <a:spLocks noChangeArrowheads="1"/>
-          </p:cNvSpPr>
-          <p:nvPr/>
-        </p:nvSpPr>
-        <p:spPr bwMode="auto">
-          <a:xfrm>
-            <a:off x="1181100" y="696913"/>
-            <a:ext cx="4649788" cy="3486150"/>
-          </a:xfrm>
-          <a:prstGeom prst="rect">
-            <a:avLst/>
-          </a:prstGeom>
-          <a:solidFill>
-            <a:srgbClr val="FFFFFF"/>
-          </a:solidFill>
-          <a:ln w="9525">
-            <a:solidFill>
-              <a:srgbClr val="000000"/>
-            </a:solidFill>
-            <a:miter lim="800000"/>
-            <a:headEnd/>
-            <a:tailEnd/>
-          </a:ln>
-        </p:spPr>
-        <p:txBody>
-          <a:bodyPr wrap="none" lIns="91444" tIns="45723" rIns="91444" bIns="45723" anchor="ctr"/>
-          <a:lstStyle/>
-          <a:p>
-            <a:endParaRPr lang="en-US"/>
-          </a:p>
-        </p:txBody>
-      </p:sp>
-      <p:sp>
-        <p:nvSpPr>
-          <p:cNvPr id="106500" name="Text Box 2"/>
-          <p:cNvSpPr>
-            <a:spLocks noGrp="1" noChangeArrowheads="1"/>
-          </p:cNvSpPr>
-          <p:nvPr>
-            <p:ph type="body"/>
-          </p:nvPr>
-        </p:nvSpPr>
-        <p:spPr>
-          <a:xfrm>
-            <a:off x="935038" y="4416426"/>
-            <a:ext cx="5141912" cy="4278313"/>
-          </a:xfrm>
-          <a:noFill/>
-          <a:ln/>
-        </p:spPr>
-        <p:txBody>
-          <a:bodyPr wrap="none" anchor="ctr"/>
-          <a:lstStyle/>
-          <a:p>
-            <a:endParaRPr lang="en-US" smtClean="0">
-              <a:latin typeface="Times New Roman" pitchFamily="-112" charset="0"/>
-            </a:endParaRPr>
-          </a:p>
-        </p:txBody>
-      </p:sp>
-    </p:spTree>
-  </p:cSld>
-  <p:clrMapOvr>
-    <a:masterClrMapping/>
-  </p:clrMapOvr>
-</p:notes>
-</file>
-
-<file path=ppt/notesSlides/notesSlide21.xml><?xml version="1.0" encoding="utf-8"?>
-<p:notes xmlns:a="http://schemas.openxmlformats.org/drawingml/2006/main" xmlns:r="http://schemas.openxmlformats.org/officeDocument/2006/relationships" xmlns:p="http://schemas.openxmlformats.org/presentationml/2006/main">
-  <p:cSld>
-    <p:bg>
-      <p:bgPr>
-        <a:solidFill>
-          <a:srgbClr val="FFFFFF"/>
-        </a:solidFill>
-        <a:effectLst/>
-      </p:bgPr>
-    </p:bg>
-    <p:spTree>
-      <p:nvGrpSpPr>
-        <p:cNvPr id="1" name=""/>
-        <p:cNvGrpSpPr/>
-        <p:nvPr/>
-      </p:nvGrpSpPr>
-      <p:grpSpPr>
-        <a:xfrm>
-          <a:off x="0" y="0"/>
-          <a:ext cx="0" cy="0"/>
-          <a:chOff x="0" y="0"/>
-          <a:chExt cx="0" cy="0"/>
-        </a:xfrm>
-      </p:grpSpPr>
-      <p:sp>
-        <p:nvSpPr>
           <p:cNvPr id="107522" name="Rectangle 7"/>
           <p:cNvSpPr>
             <a:spLocks noGrp="1" noChangeArrowheads="1"/>
@@ -2197,7 +2042,7 @@
                   <a:tab pos="10057844" algn="l"/>
                 </a:tabLst>
               </a:pPr>
-              <a:t>24</a:t>
+              <a:t>23</a:t>
             </a:fld>
             <a:endParaRPr lang="en-US" dirty="0"/>
           </a:p>
@@ -2275,7 +2120,7 @@
 </p:notes>
 </file>
 
-<file path=ppt/notesSlides/notesSlide22.xml><?xml version="1.0" encoding="utf-8"?>
+<file path=ppt/notesSlides/notesSlide21.xml><?xml version="1.0" encoding="utf-8"?>
 <p:notes xmlns:a="http://schemas.openxmlformats.org/drawingml/2006/main" xmlns:r="http://schemas.openxmlformats.org/officeDocument/2006/relationships" xmlns:p="http://schemas.openxmlformats.org/presentationml/2006/main">
   <p:cSld>
     <p:bg>
@@ -2351,7 +2196,7 @@
                   <a:tab pos="10057844" algn="l"/>
                 </a:tabLst>
               </a:pPr>
-              <a:t>25</a:t>
+              <a:t>24</a:t>
             </a:fld>
             <a:endParaRPr lang="en-US" dirty="0"/>
           </a:p>
@@ -12538,7 +12383,7 @@
       </p:grpSpPr>
       <p:sp>
         <p:nvSpPr>
-          <p:cNvPr id="49154" name="Rectangle 1"/>
+          <p:cNvPr id="50178" name="Rectangle 1"/>
           <p:cNvSpPr>
             <a:spLocks noGrp="1" noChangeArrowheads="1"/>
           </p:cNvSpPr>
@@ -12576,26 +12421,14 @@
               <a:rPr lang="en-US" sz="4000" dirty="0" smtClean="0">
                 <a:ea typeface="굴림" pitchFamily="-112" charset="-127"/>
               </a:rPr>
-              <a:t>One-way Send/</a:t>
-            </a:r>
-            <a:r>
-              <a:rPr lang="en-US" sz="4000" dirty="0" err="1" smtClean="0">
-                <a:ea typeface="굴림" pitchFamily="-112" charset="-127"/>
-              </a:rPr>
-              <a:t>Recv</a:t>
-            </a:r>
-            <a:r>
-              <a:rPr lang="en-US" sz="4000" dirty="0" smtClean="0">
-                <a:ea typeface="굴림" pitchFamily="-112" charset="-127"/>
-              </a:rPr>
-              <a:t> Communication</a:t>
+              <a:t>Two-way Communication: Deadlock</a:t>
             </a:r>
           </a:p>
         </p:txBody>
       </p:sp>
       <p:sp>
         <p:nvSpPr>
-          <p:cNvPr id="49155" name="Rectangle 2"/>
+          <p:cNvPr id="50179" name="Rectangle 2"/>
           <p:cNvSpPr>
             <a:spLocks noGrp="1" noChangeArrowheads="1"/>
           </p:cNvSpPr>
@@ -12605,8 +12438,8 @@
         </p:nvSpPr>
         <p:spPr>
           <a:xfrm>
-            <a:off x="685800" y="1447800"/>
-            <a:ext cx="8001000" cy="4648200"/>
+            <a:off x="457200" y="1371600"/>
+            <a:ext cx="8305800" cy="4660900"/>
           </a:xfrm>
         </p:spPr>
         <p:txBody>
@@ -12620,6 +12453,11 @@
               <a:spcBef>
                 <a:spcPts val="1000"/>
               </a:spcBef>
+              <a:buClr>
+                <a:srgbClr val="FF3300"/>
+              </a:buClr>
+              <a:buFont typeface="Arial" charset="0"/>
+              <a:buNone/>
               <a:tabLst>
                 <a:tab pos="911225" algn="l"/>
                 <a:tab pos="1825625" algn="l"/>
@@ -12635,29 +12473,14 @@
               </a:tabLst>
             </a:pPr>
             <a:r>
-              <a:rPr lang="en-US" sz="1600" b="1" dirty="0" smtClean="0">
+              <a:rPr lang="en-US" sz="1800" b="1" dirty="0" smtClean="0">
                 <a:solidFill>
                   <a:srgbClr val="0070C0"/>
                 </a:solidFill>
                 <a:ea typeface="굴림" pitchFamily="-112" charset="-127"/>
               </a:rPr>
-              <a:t>Blocking Send &amp; Non-blocking </a:t>
-            </a:r>
-            <a:r>
-              <a:rPr lang="en-US" sz="1600" b="1" dirty="0" err="1" smtClean="0">
-                <a:solidFill>
-                  <a:srgbClr val="0070C0"/>
-                </a:solidFill>
-                <a:ea typeface="굴림" pitchFamily="-112" charset="-127"/>
-              </a:rPr>
-              <a:t>Recv</a:t>
-            </a:r>
-            <a:endParaRPr lang="en-US" sz="1800" dirty="0" smtClean="0">
-              <a:solidFill>
-                <a:srgbClr val="0070C0"/>
-              </a:solidFill>
-              <a:ea typeface="굴림" pitchFamily="-112" charset="-127"/>
-            </a:endParaRPr>
+              <a:t>Deadlock 1 (always deadlocks)</a:t>
+            </a:r>
           </a:p>
           <a:p>
             <a:pPr marL="341313" indent="-341313" eaLnBrk="1" hangingPunct="1">
@@ -12684,9 +12507,6 @@
               </a:tabLst>
             </a:pPr>
             <a:endParaRPr lang="en-US" sz="1400" b="1" dirty="0" smtClean="0">
-              <a:solidFill>
-                <a:srgbClr val="0000FF"/>
-              </a:solidFill>
               <a:latin typeface="Andale Mono" pitchFamily="-112" charset="0"/>
               <a:ea typeface="굴림" pitchFamily="-112" charset="-127"/>
             </a:endParaRPr>
@@ -12720,7 +12540,14 @@
                 <a:latin typeface="Andale Mono" pitchFamily="-112" charset="0"/>
                 <a:ea typeface="굴림" pitchFamily="-112" charset="-127"/>
               </a:rPr>
-              <a:t>if (rank==0) then</a:t>
+              <a:t>o</a:t>
+            </a:r>
+            <a:r>
+              <a:rPr lang="en-US" sz="1400" b="1" dirty="0" smtClean="0">
+                <a:latin typeface="Andale Mono" pitchFamily="-112" charset="0"/>
+                <a:ea typeface="굴림" pitchFamily="-112" charset="-127"/>
+              </a:rPr>
+              <a:t>ther = 1-mytid</a:t>
             </a:r>
           </a:p>
           <a:p>
@@ -12752,7 +12579,7 @@
                 <a:latin typeface="Andale Mono" pitchFamily="-112" charset="0"/>
                 <a:ea typeface="굴림" pitchFamily="-112" charset="-127"/>
               </a:rPr>
-              <a:t>	call </a:t>
+              <a:t>call </a:t>
             </a:r>
             <a:r>
               <a:rPr lang="en-US" sz="1400" b="1" dirty="0" err="1" smtClean="0">
@@ -12762,7 +12589,7 @@
                 <a:latin typeface="Andale Mono" pitchFamily="-112" charset="0"/>
                 <a:ea typeface="굴림" pitchFamily="-112" charset="-127"/>
               </a:rPr>
-              <a:t>MPI_send</a:t>
+              <a:t>MPI_Recv</a:t>
             </a:r>
             <a:r>
               <a:rPr lang="en-US" sz="1400" b="1" dirty="0" smtClean="0">
@@ -12776,28 +12603,14 @@
                 <a:latin typeface="Andale Mono" pitchFamily="-112" charset="0"/>
                 <a:ea typeface="굴림" pitchFamily="-112" charset="-127"/>
               </a:rPr>
-              <a:t>sendbuf</a:t>
+              <a:t>recvbuf,count,MPI_REAL</a:t>
             </a:r>
             <a:r>
               <a:rPr lang="en-US" sz="1400" b="1" dirty="0" smtClean="0">
                 <a:latin typeface="Andale Mono" pitchFamily="-112" charset="0"/>
                 <a:ea typeface="굴림" pitchFamily="-112" charset="-127"/>
               </a:rPr>
-              <a:t>, count, MPI_REAL, 1, tag, MPI_COMM_WORLD, </a:t>
-            </a:r>
-            <a:r>
-              <a:rPr lang="en-US" sz="1400" b="1" dirty="0" err="1" smtClean="0">
-                <a:latin typeface="Andale Mono" pitchFamily="-112" charset="0"/>
-                <a:ea typeface="굴림" pitchFamily="-112" charset="-127"/>
-              </a:rPr>
-              <a:t>ierr</a:t>
-            </a:r>
-            <a:r>
-              <a:rPr lang="en-US" sz="1400" b="1" dirty="0" smtClean="0">
-                <a:latin typeface="Andale Mono" pitchFamily="-112" charset="0"/>
-                <a:ea typeface="굴림" pitchFamily="-112" charset="-127"/>
-              </a:rPr>
-              <a:t>)</a:t>
+              <a:t>,</a:t>
             </a:r>
           </a:p>
           <a:p>
@@ -12825,18 +12638,32 @@
               </a:tabLst>
             </a:pPr>
             <a:r>
+              <a:rPr lang="en-US" sz="1400" b="1" dirty="0">
+                <a:latin typeface="Andale Mono" pitchFamily="-112" charset="0"/>
+                <a:ea typeface="굴림" pitchFamily="-112" charset="-127"/>
+              </a:rPr>
+              <a:t>	</a:t>
+            </a:r>
+            <a:r>
               <a:rPr lang="en-US" sz="1400" b="1" dirty="0" err="1" smtClean="0">
                 <a:latin typeface="Andale Mono" pitchFamily="-112" charset="0"/>
                 <a:ea typeface="굴림" pitchFamily="-112" charset="-127"/>
               </a:rPr>
-              <a:t>elseif</a:t>
+              <a:t>other,</a:t>
+            </a:r>
+            <a:r>
+              <a:rPr lang="en-US" sz="1400" b="1" dirty="0" err="1" smtClean="0">
+                <a:latin typeface="Andale Mono" pitchFamily="-112" charset="0"/>
+                <a:ea typeface="굴림" pitchFamily="-112" charset="-127"/>
+              </a:rPr>
+              <a:t>tag,MPI_COMM_WORLD,status,ierr</a:t>
             </a:r>
             <a:r>
               <a:rPr lang="en-US" sz="1400" b="1" dirty="0" smtClean="0">
                 <a:latin typeface="Andale Mono" pitchFamily="-112" charset="0"/>
                 <a:ea typeface="굴림" pitchFamily="-112" charset="-127"/>
               </a:rPr>
-              <a:t> (rank==1) then</a:t>
+              <a:t>)</a:t>
             </a:r>
           </a:p>
           <a:p>
@@ -12868,7 +12695,7 @@
                 <a:latin typeface="Andale Mono" pitchFamily="-112" charset="0"/>
                 <a:ea typeface="굴림" pitchFamily="-112" charset="-127"/>
               </a:rPr>
-              <a:t>	call </a:t>
+              <a:t>call </a:t>
             </a:r>
             <a:r>
               <a:rPr lang="en-US" sz="1400" b="1" dirty="0" err="1" smtClean="0">
@@ -12878,7 +12705,7 @@
                 <a:latin typeface="Andale Mono" pitchFamily="-112" charset="0"/>
                 <a:ea typeface="굴림" pitchFamily="-112" charset="-127"/>
               </a:rPr>
-              <a:t>MPI_Irecv</a:t>
+              <a:t>MPI_Send</a:t>
             </a:r>
             <a:r>
               <a:rPr lang="en-US" sz="1400" b="1" dirty="0" smtClean="0">
@@ -12892,42 +12719,14 @@
                 <a:latin typeface="Andale Mono" pitchFamily="-112" charset="0"/>
                 <a:ea typeface="굴림" pitchFamily="-112" charset="-127"/>
               </a:rPr>
-              <a:t>recvbuf</a:t>
+              <a:t>sendbuf,count,MPI_REAL</a:t>
             </a:r>
             <a:r>
               <a:rPr lang="en-US" sz="1400" b="1" dirty="0" smtClean="0">
                 <a:latin typeface="Andale Mono" pitchFamily="-112" charset="0"/>
                 <a:ea typeface="굴림" pitchFamily="-112" charset="-127"/>
               </a:rPr>
-              <a:t>,  count, MPI_REAL, 0, tag, MPI_COMM_WORLD, </a:t>
-            </a:r>
-            <a:r>
-              <a:rPr lang="en-US" sz="1400" b="1" dirty="0" err="1" smtClean="0">
-                <a:latin typeface="Andale Mono" pitchFamily="-112" charset="0"/>
-                <a:ea typeface="굴림" pitchFamily="-112" charset="-127"/>
-              </a:rPr>
-              <a:t>req</a:t>
-            </a:r>
-            <a:r>
-              <a:rPr lang="en-US" sz="1400" b="1" dirty="0" smtClean="0">
-                <a:latin typeface="Andale Mono" pitchFamily="-112" charset="0"/>
-                <a:ea typeface="굴림" pitchFamily="-112" charset="-127"/>
-              </a:rPr>
-              <a:t>, </a:t>
-            </a:r>
-            <a:r>
-              <a:rPr lang="en-US" sz="1400" b="1" dirty="0" err="1" smtClean="0">
-                <a:latin typeface="Andale Mono" pitchFamily="-112" charset="0"/>
-                <a:ea typeface="굴림" pitchFamily="-112" charset="-127"/>
-              </a:rPr>
-              <a:t>ierr</a:t>
-            </a:r>
-            <a:r>
-              <a:rPr lang="en-US" sz="1400" b="1" dirty="0" smtClean="0">
-                <a:latin typeface="Andale Mono" pitchFamily="-112" charset="0"/>
-                <a:ea typeface="굴림" pitchFamily="-112" charset="-127"/>
-              </a:rPr>
-              <a:t>)</a:t>
+              <a:t>,</a:t>
             </a:r>
           </a:p>
           <a:p>
@@ -12955,38 +12754,25 @@
               </a:tabLst>
             </a:pPr>
             <a:r>
-              <a:rPr lang="en-US" sz="1400" b="1" dirty="0" smtClean="0">
+              <a:rPr lang="en-US" sz="1400" b="1" dirty="0">
                 <a:latin typeface="Andale Mono" pitchFamily="-112" charset="0"/>
                 <a:ea typeface="굴림" pitchFamily="-112" charset="-127"/>
               </a:rPr>
-              <a:t>	call </a:t>
-            </a:r>
-            <a:r>
-              <a:rPr lang="en-US" sz="1400" b="1" dirty="0" err="1" smtClean="0">
-                <a:solidFill>
-                  <a:srgbClr val="0070C0"/>
-                </a:solidFill>
-                <a:latin typeface="Andale Mono" pitchFamily="-112" charset="0"/>
-                <a:ea typeface="굴림" pitchFamily="-112" charset="-127"/>
-              </a:rPr>
-              <a:t>MPI_Wait</a:t>
-            </a:r>
-            <a:r>
-              <a:rPr lang="en-US" sz="1400" b="1" dirty="0" smtClean="0">
-                <a:solidFill>
-                  <a:srgbClr val="0070C0"/>
-                </a:solidFill>
-                <a:latin typeface="Andale Mono" pitchFamily="-112" charset="0"/>
-                <a:ea typeface="굴림" pitchFamily="-112" charset="-127"/>
-              </a:rPr>
-              <a:t>(    </a:t>
+              <a:t>	</a:t>
             </a:r>
             <a:r>
               <a:rPr lang="en-US" sz="1400" b="1" dirty="0" err="1" smtClean="0">
                 <a:latin typeface="Andale Mono" pitchFamily="-112" charset="0"/>
                 <a:ea typeface="굴림" pitchFamily="-112" charset="-127"/>
               </a:rPr>
-              <a:t>req,status,ierr</a:t>
+              <a:t>other,</a:t>
+            </a:r>
+            <a:r>
+              <a:rPr lang="en-US" sz="1400" b="1" dirty="0" err="1" smtClean="0">
+                <a:latin typeface="Andale Mono" pitchFamily="-112" charset="0"/>
+                <a:ea typeface="굴림" pitchFamily="-112" charset="-127"/>
+              </a:rPr>
+              <a:t>tag,MPI_COMM_WORLD,ierr</a:t>
             </a:r>
             <a:r>
               <a:rPr lang="en-US" sz="1400" b="1" dirty="0" smtClean="0">
@@ -13020,15 +12806,8 @@
                 <a:tab pos="10055225" algn="l"/>
               </a:tabLst>
             </a:pPr>
-            <a:r>
-              <a:rPr lang="en-US" sz="1400" b="1" dirty="0" err="1" smtClean="0">
-                <a:latin typeface="Andale Mono" pitchFamily="-112" charset="0"/>
-                <a:ea typeface="굴림" pitchFamily="-112" charset="-127"/>
-              </a:rPr>
-              <a:t>endif</a:t>
-            </a:r>
             <a:endParaRPr lang="en-US" sz="1400" b="1" dirty="0" smtClean="0">
-              <a:latin typeface="Andale Mono" pitchFamily="-112" charset="0"/>
+              <a:latin typeface="Courier New" pitchFamily="-112" charset="0"/>
               <a:ea typeface="굴림" pitchFamily="-112" charset="-127"/>
             </a:endParaRPr>
           </a:p>
@@ -13070,9 +12849,12 @@
                 <a:spcPct val="80000"/>
               </a:lnSpc>
               <a:spcBef>
-                <a:spcPts val="250"/>
+                <a:spcPts val="1000"/>
               </a:spcBef>
-              <a:buFontTx/>
+              <a:buClr>
+                <a:srgbClr val="FF3300"/>
+              </a:buClr>
+              <a:buFont typeface="Arial" charset="0"/>
               <a:buNone/>
               <a:tabLst>
                 <a:tab pos="911225" algn="l"/>
@@ -13088,60 +12870,15 @@
                 <a:tab pos="10055225" algn="l"/>
               </a:tabLst>
             </a:pPr>
-            <a:endParaRPr lang="en-US" sz="1000" b="1" dirty="0" smtClean="0">
-              <a:solidFill>
-                <a:srgbClr val="000078"/>
-              </a:solidFill>
-              <a:latin typeface="Courier New" pitchFamily="-112" charset="0"/>
-              <a:ea typeface="굴림" pitchFamily="-112" charset="-127"/>
-            </a:endParaRPr>
-          </a:p>
-          <a:p>
-            <a:pPr marL="341313" indent="-341313" eaLnBrk="1" hangingPunct="1">
-              <a:lnSpc>
-                <a:spcPct val="80000"/>
-              </a:lnSpc>
-              <a:spcBef>
-                <a:spcPts val="1000"/>
-              </a:spcBef>
-              <a:tabLst>
-                <a:tab pos="911225" algn="l"/>
-                <a:tab pos="1825625" algn="l"/>
-                <a:tab pos="2740025" algn="l"/>
-                <a:tab pos="3654425" algn="l"/>
-                <a:tab pos="4568825" algn="l"/>
-                <a:tab pos="5483225" algn="l"/>
-                <a:tab pos="6397625" algn="l"/>
-                <a:tab pos="7312025" algn="l"/>
-                <a:tab pos="8226425" algn="l"/>
-                <a:tab pos="9140825" algn="l"/>
-                <a:tab pos="10055225" algn="l"/>
-              </a:tabLst>
-            </a:pPr>
-            <a:r>
-              <a:rPr lang="en-US" sz="1600" b="1" dirty="0" smtClean="0">
+            <a:r>
+              <a:rPr lang="en-US" sz="1800" b="1" dirty="0" smtClean="0">
                 <a:solidFill>
                   <a:srgbClr val="0070C0"/>
                 </a:solidFill>
                 <a:ea typeface="굴림" pitchFamily="-112" charset="-127"/>
               </a:rPr>
-              <a:t>Non-blocking Send &amp; Non-blocking </a:t>
-            </a:r>
-            <a:r>
-              <a:rPr lang="en-US" sz="1600" b="1" dirty="0" err="1" smtClean="0">
-                <a:solidFill>
-                  <a:srgbClr val="0070C0"/>
-                </a:solidFill>
-                <a:ea typeface="굴림" pitchFamily="-112" charset="-127"/>
-              </a:rPr>
-              <a:t>Recv</a:t>
-            </a:r>
-            <a:endParaRPr lang="en-US" sz="1800" dirty="0" smtClean="0">
-              <a:solidFill>
-                <a:srgbClr val="0070C0"/>
-              </a:solidFill>
-              <a:ea typeface="굴림" pitchFamily="-112" charset="-127"/>
-            </a:endParaRPr>
+              <a:t>Deadlock 2 (deadlocks when system buffer is too small)</a:t>
+            </a:r>
           </a:p>
           <a:p>
             <a:pPr marL="341313" indent="-341313" eaLnBrk="1" hangingPunct="1">
@@ -13168,9 +12905,6 @@
               </a:tabLst>
             </a:pPr>
             <a:endParaRPr lang="en-US" sz="1400" b="1" dirty="0" smtClean="0">
-              <a:solidFill>
-                <a:srgbClr val="0000FF"/>
-              </a:solidFill>
               <a:latin typeface="Andale Mono" pitchFamily="-112" charset="0"/>
               <a:ea typeface="굴림" pitchFamily="-112" charset="-127"/>
             </a:endParaRPr>
@@ -13204,8 +12938,19 @@
                 <a:latin typeface="Andale Mono" pitchFamily="-112" charset="0"/>
                 <a:ea typeface="굴림" pitchFamily="-112" charset="-127"/>
               </a:rPr>
-              <a:t>if (rank==0) then</a:t>
-            </a:r>
+              <a:t>o</a:t>
+            </a:r>
+            <a:r>
+              <a:rPr lang="en-US" sz="1400" b="1" dirty="0" smtClean="0">
+                <a:latin typeface="Andale Mono" pitchFamily="-112" charset="0"/>
+                <a:ea typeface="굴림" pitchFamily="-112" charset="-127"/>
+              </a:rPr>
+              <a:t>ther = 1-mytid</a:t>
+            </a:r>
+            <a:endParaRPr lang="en-US" sz="1400" b="1" dirty="0" smtClean="0">
+              <a:latin typeface="Andale Mono" pitchFamily="-112" charset="0"/>
+              <a:ea typeface="굴림" pitchFamily="-112" charset="-127"/>
+            </a:endParaRPr>
           </a:p>
           <a:p>
             <a:pPr marL="341313" indent="-341313" eaLnBrk="1" hangingPunct="1">
@@ -13236,7 +12981,7 @@
                 <a:latin typeface="Andale Mono" pitchFamily="-112" charset="0"/>
                 <a:ea typeface="굴림" pitchFamily="-112" charset="-127"/>
               </a:rPr>
-              <a:t>	call </a:t>
+              <a:t>call </a:t>
             </a:r>
             <a:r>
               <a:rPr lang="en-US" sz="1400" b="1" dirty="0" err="1" smtClean="0">
@@ -13246,14 +12991,28 @@
                 <a:latin typeface="Andale Mono" pitchFamily="-112" charset="0"/>
                 <a:ea typeface="굴림" pitchFamily="-112" charset="-127"/>
               </a:rPr>
-              <a:t>MPI_Isend</a:t>
+              <a:t>MPI_Send</a:t>
             </a:r>
             <a:r>
               <a:rPr lang="en-US" sz="1400" b="1" dirty="0" smtClean="0">
                 <a:latin typeface="Andale Mono" pitchFamily="-112" charset="0"/>
                 <a:ea typeface="굴림" pitchFamily="-112" charset="-127"/>
               </a:rPr>
-              <a:t>(   sendbuf,count,MPI_REAL,1,tag,MPI_COMM_WORLD,req,ierr)</a:t>
+              <a:t>(   </a:t>
+            </a:r>
+            <a:r>
+              <a:rPr lang="en-US" sz="1400" b="1" dirty="0" err="1" smtClean="0">
+                <a:latin typeface="Andale Mono" pitchFamily="-112" charset="0"/>
+                <a:ea typeface="굴림" pitchFamily="-112" charset="-127"/>
+              </a:rPr>
+              <a:t>sendbuf,count,MPI_REAL</a:t>
+            </a:r>
+            <a:r>
+              <a:rPr lang="en-US" sz="1400" b="1" dirty="0" smtClean="0">
+                <a:latin typeface="Andale Mono" pitchFamily="-112" charset="0"/>
+                <a:ea typeface="굴림" pitchFamily="-112" charset="-127"/>
+              </a:rPr>
+              <a:t>,</a:t>
             </a:r>
           </a:p>
           <a:p>
@@ -13281,18 +13040,39 @@
               </a:tabLst>
             </a:pPr>
             <a:r>
+              <a:rPr lang="en-US" sz="1400" b="1" dirty="0">
+                <a:latin typeface="Andale Mono" pitchFamily="-112" charset="0"/>
+                <a:ea typeface="굴림" pitchFamily="-112" charset="-127"/>
+              </a:rPr>
+              <a:t>	</a:t>
+            </a:r>
+            <a:r>
               <a:rPr lang="en-US" sz="1400" b="1" dirty="0" err="1" smtClean="0">
                 <a:latin typeface="Andale Mono" pitchFamily="-112" charset="0"/>
                 <a:ea typeface="굴림" pitchFamily="-112" charset="-127"/>
               </a:rPr>
-              <a:t>elseif</a:t>
+              <a:t>other</a:t>
+            </a:r>
+            <a:r>
+              <a:rPr lang="en-US" sz="1400" b="1" dirty="0" err="1" smtClean="0">
+                <a:latin typeface="Andale Mono" pitchFamily="-112" charset="0"/>
+                <a:ea typeface="굴림" pitchFamily="-112" charset="-127"/>
+              </a:rPr>
+              <a:t>,</a:t>
+            </a:r>
+            <a:r>
+              <a:rPr lang="en-US" sz="1400" b="1" dirty="0" err="1" smtClean="0">
+                <a:latin typeface="Andale Mono" pitchFamily="-112" charset="0"/>
+                <a:ea typeface="굴림" pitchFamily="-112" charset="-127"/>
+              </a:rPr>
+              <a:t>tag,MPI_COMM_WORLD,ierr</a:t>
             </a:r>
             <a:r>
               <a:rPr lang="en-US" sz="1400" b="1" dirty="0" smtClean="0">
                 <a:latin typeface="Andale Mono" pitchFamily="-112" charset="0"/>
                 <a:ea typeface="굴림" pitchFamily="-112" charset="-127"/>
               </a:rPr>
-              <a:t> (rank==1) then</a:t>
+              <a:t>)</a:t>
             </a:r>
           </a:p>
           <a:p>
@@ -13324,7 +13104,7 @@
                 <a:latin typeface="Andale Mono" pitchFamily="-112" charset="0"/>
                 <a:ea typeface="굴림" pitchFamily="-112" charset="-127"/>
               </a:rPr>
-              <a:t>	call </a:t>
+              <a:t>call </a:t>
             </a:r>
             <a:r>
               <a:rPr lang="en-US" sz="1400" b="1" dirty="0" err="1" smtClean="0">
@@ -13334,14 +13114,28 @@
                 <a:latin typeface="Andale Mono" pitchFamily="-112" charset="0"/>
                 <a:ea typeface="굴림" pitchFamily="-112" charset="-127"/>
               </a:rPr>
-              <a:t>MPI_Irecv</a:t>
+              <a:t>MPI_Recv</a:t>
             </a:r>
             <a:r>
               <a:rPr lang="en-US" sz="1400" b="1" dirty="0" smtClean="0">
                 <a:latin typeface="Andale Mono" pitchFamily="-112" charset="0"/>
                 <a:ea typeface="굴림" pitchFamily="-112" charset="-127"/>
               </a:rPr>
-              <a:t>(    recvbuf,count,MPI_REAL,0,tag,MPI_COMM_WORLD,req,ierr)</a:t>
+              <a:t>(   </a:t>
+            </a:r>
+            <a:r>
+              <a:rPr lang="en-US" sz="1400" b="1" dirty="0" err="1" smtClean="0">
+                <a:latin typeface="Andale Mono" pitchFamily="-112" charset="0"/>
+                <a:ea typeface="굴림" pitchFamily="-112" charset="-127"/>
+              </a:rPr>
+              <a:t>recvbuf,count,MPI_REAL</a:t>
+            </a:r>
+            <a:r>
+              <a:rPr lang="en-US" sz="1400" b="1" dirty="0" smtClean="0">
+                <a:latin typeface="Andale Mono" pitchFamily="-112" charset="0"/>
+                <a:ea typeface="굴림" pitchFamily="-112" charset="-127"/>
+              </a:rPr>
+              <a:t>,</a:t>
             </a:r>
           </a:p>
           <a:p>
@@ -13369,85 +13163,50 @@
               </a:tabLst>
             </a:pPr>
             <a:r>
+              <a:rPr lang="en-US" sz="1400" b="1" dirty="0">
+                <a:latin typeface="Andale Mono" pitchFamily="-112" charset="0"/>
+                <a:ea typeface="굴림" pitchFamily="-112" charset="-127"/>
+              </a:rPr>
+              <a:t>	</a:t>
+            </a:r>
+            <a:r>
               <a:rPr lang="en-US" sz="1400" b="1" dirty="0" err="1" smtClean="0">
                 <a:latin typeface="Andale Mono" pitchFamily="-112" charset="0"/>
                 <a:ea typeface="굴림" pitchFamily="-112" charset="-127"/>
               </a:rPr>
-              <a:t>endif</a:t>
+              <a:t>other</a:t>
+            </a:r>
+            <a:r>
+              <a:rPr lang="en-US" sz="1400" b="1" dirty="0" err="1" smtClean="0">
+                <a:latin typeface="Andale Mono" pitchFamily="-112" charset="0"/>
+                <a:ea typeface="굴림" pitchFamily="-112" charset="-127"/>
+              </a:rPr>
+              <a:t>,</a:t>
+            </a:r>
+            <a:r>
+              <a:rPr lang="en-US" sz="1400" b="1" dirty="0" err="1" smtClean="0">
+                <a:latin typeface="Andale Mono" pitchFamily="-112" charset="0"/>
+                <a:ea typeface="굴림" pitchFamily="-112" charset="-127"/>
+              </a:rPr>
+              <a:t>tag,MPI_COMM_WORLD,status,ierr</a:t>
+            </a:r>
+            <a:r>
+              <a:rPr lang="en-US" sz="1400" b="1" dirty="0" smtClean="0">
+                <a:latin typeface="Andale Mono" pitchFamily="-112" charset="0"/>
+                <a:ea typeface="굴림" pitchFamily="-112" charset="-127"/>
+              </a:rPr>
+              <a:t>)</a:t>
             </a:r>
             <a:endParaRPr lang="en-US" sz="1400" b="1" dirty="0" smtClean="0">
               <a:latin typeface="Andale Mono" pitchFamily="-112" charset="0"/>
               <a:ea typeface="굴림" pitchFamily="-112" charset="-127"/>
             </a:endParaRPr>
           </a:p>
-          <a:p>
-            <a:pPr marL="341313" indent="-341313" eaLnBrk="1" hangingPunct="1">
-              <a:lnSpc>
-                <a:spcPct val="80000"/>
-              </a:lnSpc>
-              <a:spcBef>
-                <a:spcPts val="350"/>
-              </a:spcBef>
-              <a:buFont typeface="Arial" charset="0"/>
-              <a:buNone/>
-              <a:tabLst>
-                <a:tab pos="911225" algn="l"/>
-                <a:tab pos="1825625" algn="l"/>
-                <a:tab pos="2740025" algn="l"/>
-                <a:tab pos="3654425" algn="l"/>
-                <a:tab pos="4568825" algn="l"/>
-                <a:tab pos="5483225" algn="l"/>
-                <a:tab pos="6397625" algn="l"/>
-                <a:tab pos="7312025" algn="l"/>
-                <a:tab pos="8226425" algn="l"/>
-                <a:tab pos="9140825" algn="l"/>
-                <a:tab pos="10055225" algn="l"/>
-              </a:tabLst>
-            </a:pPr>
-            <a:r>
-              <a:rPr lang="en-US" sz="1400" b="1" dirty="0" smtClean="0">
-                <a:latin typeface="Andale Mono" pitchFamily="-112" charset="0"/>
-                <a:ea typeface="굴림" pitchFamily="-112" charset="-127"/>
-              </a:rPr>
-              <a:t>       call </a:t>
-            </a:r>
-            <a:r>
-              <a:rPr lang="en-US" sz="1400" b="1" dirty="0" err="1" smtClean="0">
-                <a:solidFill>
-                  <a:srgbClr val="0070C0"/>
-                </a:solidFill>
-                <a:latin typeface="Andale Mono" pitchFamily="-112" charset="0"/>
-                <a:ea typeface="굴림" pitchFamily="-112" charset="-127"/>
-              </a:rPr>
-              <a:t>MPI_Wait</a:t>
-            </a:r>
-            <a:r>
-              <a:rPr lang="en-US" sz="1400" b="1" dirty="0" smtClean="0">
-                <a:latin typeface="Andale Mono" pitchFamily="-112" charset="0"/>
-                <a:ea typeface="굴림" pitchFamily="-112" charset="-127"/>
-              </a:rPr>
-              <a:t>(   </a:t>
-            </a:r>
-            <a:r>
-              <a:rPr lang="en-US" sz="1400" b="1" dirty="0" err="1" smtClean="0">
-                <a:latin typeface="Andale Mono" pitchFamily="-112" charset="0"/>
-                <a:ea typeface="굴림" pitchFamily="-112" charset="-127"/>
-              </a:rPr>
-              <a:t>req,status,ierr</a:t>
-            </a:r>
-            <a:r>
-              <a:rPr lang="en-US" sz="1400" b="1" dirty="0" smtClean="0">
-                <a:latin typeface="Andale Mono" pitchFamily="-112" charset="0"/>
-                <a:ea typeface="굴림" pitchFamily="-112" charset="-127"/>
-              </a:rPr>
-              <a:t>)</a:t>
-            </a:r>
-          </a:p>
         </p:txBody>
       </p:sp>
       <p:sp>
         <p:nvSpPr>
-          <p:cNvPr id="49156" name="Slide Number Placeholder 3"/>
+          <p:cNvPr id="50180" name="Slide Number Placeholder 3"/>
           <p:cNvSpPr>
             <a:spLocks noGrp="1"/>
           </p:cNvSpPr>
@@ -13483,7 +13242,7 @@
                 <a:tab pos="10058400" algn="l"/>
               </a:tabLst>
             </a:pPr>
-            <a:fld id="{2CABC743-31C4-4166-B881-1F4F6C571B6C}" type="slidenum">
+            <a:fld id="{1EA954A6-66DC-4CA6-9007-1975678C7453}" type="slidenum">
               <a:rPr lang="en-US"/>
               <a:pPr>
                 <a:tabLst>
@@ -13562,7 +13321,7 @@
       </p:grpSpPr>
       <p:sp>
         <p:nvSpPr>
-          <p:cNvPr id="50178" name="Rectangle 1"/>
+          <p:cNvPr id="51202" name="Rectangle 1"/>
           <p:cNvSpPr>
             <a:spLocks noGrp="1" noChangeArrowheads="1"/>
           </p:cNvSpPr>
@@ -13600,14 +13359,14 @@
               <a:rPr lang="en-US" sz="4000" dirty="0" smtClean="0">
                 <a:ea typeface="굴림" pitchFamily="-112" charset="-127"/>
               </a:rPr>
-              <a:t>Two-way Communication: Deadlock</a:t>
+              <a:t>Two-way Communication: Solutions</a:t>
             </a:r>
           </a:p>
         </p:txBody>
       </p:sp>
       <p:sp>
         <p:nvSpPr>
-          <p:cNvPr id="50179" name="Rectangle 2"/>
+          <p:cNvPr id="51203" name="Rectangle 2"/>
           <p:cNvSpPr>
             <a:spLocks noGrp="1" noChangeArrowheads="1"/>
           </p:cNvSpPr>
@@ -13617,12 +13376,14 @@
         </p:nvSpPr>
         <p:spPr>
           <a:xfrm>
-            <a:off x="457200" y="1371600"/>
-            <a:ext cx="8305800" cy="4660900"/>
+            <a:off x="228600" y="1371600"/>
+            <a:ext cx="8915400" cy="4648200"/>
           </a:xfrm>
         </p:spPr>
         <p:txBody>
-          <a:bodyPr/>
+          <a:bodyPr>
+            <a:normAutofit/>
+          </a:bodyPr>
           <a:lstStyle/>
           <a:p>
             <a:pPr marL="341313" indent="-341313" eaLnBrk="1" hangingPunct="1">
@@ -13632,9 +13393,6 @@
               <a:spcBef>
                 <a:spcPts val="1000"/>
               </a:spcBef>
-              <a:buClr>
-                <a:srgbClr val="FF3300"/>
-              </a:buClr>
               <a:buFont typeface="Arial" charset="0"/>
               <a:buNone/>
               <a:tabLst>
@@ -13658,7 +13416,7 @@
                 </a:solidFill>
                 <a:ea typeface="굴림" pitchFamily="-112" charset="-127"/>
               </a:rPr>
-              <a:t>Deadlock 1 (always deadlocks)</a:t>
+              <a:t>Solution 1  (but this doesn’t allow bidirectional communication)</a:t>
             </a:r>
           </a:p>
           <a:p>
@@ -13685,13 +13443,10 @@
                 <a:tab pos="10055225" algn="l"/>
               </a:tabLst>
             </a:pPr>
-            <a:r>
-              <a:rPr lang="en-US" sz="1400" b="1" dirty="0" smtClean="0">
-                <a:latin typeface="Andale Mono" pitchFamily="-112" charset="0"/>
-                <a:ea typeface="굴림" pitchFamily="-112" charset="-127"/>
-              </a:rPr>
-              <a:t>if (rank==0) then</a:t>
-            </a:r>
+            <a:endParaRPr lang="en-US" sz="1400" b="1" dirty="0" smtClean="0">
+              <a:latin typeface="Andale Mono" pitchFamily="-112" charset="0"/>
+              <a:ea typeface="굴림" pitchFamily="-112" charset="-127"/>
+            </a:endParaRPr>
           </a:p>
           <a:p>
             <a:pPr marL="341313" indent="-341313" eaLnBrk="1" hangingPunct="1">
@@ -13722,24 +13477,14 @@
                 <a:latin typeface="Andale Mono" pitchFamily="-112" charset="0"/>
                 <a:ea typeface="굴림" pitchFamily="-112" charset="-127"/>
               </a:rPr>
-              <a:t>	call </a:t>
-            </a:r>
-            <a:r>
-              <a:rPr lang="en-US" sz="1400" b="1" dirty="0" err="1" smtClean="0">
-                <a:solidFill>
-                  <a:srgbClr val="0070C0"/>
-                </a:solidFill>
-                <a:latin typeface="Andale Mono" pitchFamily="-112" charset="0"/>
-                <a:ea typeface="굴림" pitchFamily="-112" charset="-127"/>
-              </a:rPr>
-              <a:t>MPI_Recv</a:t>
+              <a:t>if </a:t>
             </a:r>
             <a:r>
               <a:rPr lang="en-US" sz="1400" b="1" dirty="0" smtClean="0">
                 <a:latin typeface="Andale Mono" pitchFamily="-112" charset="0"/>
                 <a:ea typeface="굴림" pitchFamily="-112" charset="-127"/>
               </a:rPr>
-              <a:t>(   recvbuf,count,MPI_REAL,1,tag,MPI_COMM_WORLD,status,ierr)</a:t>
+              <a:t>(rank==0) then</a:t>
             </a:r>
           </a:p>
           <a:p>
@@ -13788,7 +13533,21 @@
                 <a:latin typeface="Andale Mono" pitchFamily="-112" charset="0"/>
                 <a:ea typeface="굴림" pitchFamily="-112" charset="-127"/>
               </a:rPr>
-              <a:t>(   sendbuf,count,MPI_REAL,1,tag,MPI_COMM_WORLD,ierr)</a:t>
+              <a:t>(  </a:t>
+            </a:r>
+            <a:r>
+              <a:rPr lang="en-US" sz="1400" b="1" dirty="0" err="1" smtClean="0">
+                <a:latin typeface="Andale Mono" pitchFamily="-112" charset="0"/>
+                <a:ea typeface="굴림" pitchFamily="-112" charset="-127"/>
+              </a:rPr>
+              <a:t>sendbuf,count,MPI_REAL</a:t>
+            </a:r>
+            <a:r>
+              <a:rPr lang="en-US" sz="1400" b="1" dirty="0" smtClean="0">
+                <a:latin typeface="Andale Mono" pitchFamily="-112" charset="0"/>
+                <a:ea typeface="굴림" pitchFamily="-112" charset="-127"/>
+              </a:rPr>
+              <a:t>, 1,tag,MPI_COMM_WORLD,ierr)</a:t>
             </a:r>
           </a:p>
           <a:p>
@@ -13816,18 +13575,42 @@
               </a:tabLst>
             </a:pPr>
             <a:r>
+              <a:rPr lang="en-US" sz="1400" b="1" dirty="0" smtClean="0">
+                <a:latin typeface="Andale Mono" pitchFamily="-112" charset="0"/>
+                <a:ea typeface="굴림" pitchFamily="-112" charset="-127"/>
+              </a:rPr>
+              <a:t>	call </a:t>
+            </a:r>
+            <a:r>
+              <a:rPr lang="en-US" sz="1400" b="1" dirty="0" err="1" smtClean="0">
+                <a:solidFill>
+                  <a:srgbClr val="0070C0"/>
+                </a:solidFill>
+                <a:latin typeface="Andale Mono" pitchFamily="-112" charset="0"/>
+                <a:ea typeface="굴림" pitchFamily="-112" charset="-127"/>
+              </a:rPr>
+              <a:t>MPI_Recv</a:t>
+            </a:r>
+            <a:r>
+              <a:rPr lang="en-US" sz="1400" b="1" dirty="0" smtClean="0">
+                <a:latin typeface="Andale Mono" pitchFamily="-112" charset="0"/>
+                <a:ea typeface="굴림" pitchFamily="-112" charset="-127"/>
+              </a:rPr>
+              <a:t>(   </a:t>
+            </a:r>
+            <a:r>
               <a:rPr lang="en-US" sz="1400" b="1" dirty="0" err="1" smtClean="0">
                 <a:latin typeface="Andale Mono" pitchFamily="-112" charset="0"/>
                 <a:ea typeface="굴림" pitchFamily="-112" charset="-127"/>
               </a:rPr>
-              <a:t>elseif</a:t>
+              <a:t>recvbuf,count,MPI_REAL</a:t>
             </a:r>
             <a:r>
               <a:rPr lang="en-US" sz="1400" b="1" dirty="0" smtClean="0">
                 <a:latin typeface="Andale Mono" pitchFamily="-112" charset="0"/>
                 <a:ea typeface="굴림" pitchFamily="-112" charset="-127"/>
               </a:rPr>
-              <a:t> (rank==1) then</a:t>
+              <a:t>, 1,tag,MPI_COMM_WORLD,status,ierr)</a:t>
             </a:r>
           </a:p>
           <a:p>
@@ -13855,28 +13638,18 @@
               </a:tabLst>
             </a:pPr>
             <a:r>
+              <a:rPr lang="en-US" sz="1400" b="1" dirty="0" err="1" smtClean="0">
+                <a:latin typeface="Andale Mono" pitchFamily="-112" charset="0"/>
+                <a:ea typeface="굴림" pitchFamily="-112" charset="-127"/>
+              </a:rPr>
+              <a:t>elseif</a:t>
+            </a:r>
+            <a:r>
               <a:rPr lang="en-US" sz="1400" b="1" dirty="0" smtClean="0">
                 <a:latin typeface="Andale Mono" pitchFamily="-112" charset="0"/>
                 <a:ea typeface="굴림" pitchFamily="-112" charset="-127"/>
               </a:rPr>
-              <a:t>	call </a:t>
-            </a:r>
-            <a:r>
-              <a:rPr lang="en-US" sz="1400" b="1" dirty="0" err="1" smtClean="0">
-                <a:solidFill>
-                  <a:srgbClr val="0070C0"/>
-                </a:solidFill>
-                <a:latin typeface="Andale Mono" pitchFamily="-112" charset="0"/>
-                <a:ea typeface="굴림" pitchFamily="-112" charset="-127"/>
-              </a:rPr>
-              <a:t>MPI_Recv</a:t>
-            </a:r>
-            <a:r>
-              <a:rPr lang="en-US" sz="1400" b="1" dirty="0" smtClean="0">
-                <a:latin typeface="Andale Mono" pitchFamily="-112" charset="0"/>
-                <a:ea typeface="굴림" pitchFamily="-112" charset="-127"/>
-              </a:rPr>
-              <a:t>(   recvbuf,count,MPI_REAL,0,tag,MPI_COMM_WORLD,status,ierr)</a:t>
+              <a:t> (rank==1) then</a:t>
             </a:r>
           </a:p>
           <a:p>
@@ -13918,14 +13691,28 @@
                 <a:latin typeface="Andale Mono" pitchFamily="-112" charset="0"/>
                 <a:ea typeface="굴림" pitchFamily="-112" charset="-127"/>
               </a:rPr>
-              <a:t>MPI_Send</a:t>
+              <a:t>MPI_Recv</a:t>
             </a:r>
             <a:r>
               <a:rPr lang="en-US" sz="1400" b="1" dirty="0" smtClean="0">
                 <a:latin typeface="Andale Mono" pitchFamily="-112" charset="0"/>
                 <a:ea typeface="굴림" pitchFamily="-112" charset="-127"/>
               </a:rPr>
-              <a:t>(   sendbuf,count,MPI_REAL,0,tag,MPI_COMM_WORLD,ierr)</a:t>
+              <a:t>(    </a:t>
+            </a:r>
+            <a:r>
+              <a:rPr lang="en-US" sz="1400" b="1" dirty="0" err="1" smtClean="0">
+                <a:latin typeface="Andale Mono" pitchFamily="-112" charset="0"/>
+                <a:ea typeface="굴림" pitchFamily="-112" charset="-127"/>
+              </a:rPr>
+              <a:t>recvbuf,count,MPI_REAL</a:t>
+            </a:r>
+            <a:r>
+              <a:rPr lang="en-US" sz="1400" b="1" dirty="0" smtClean="0">
+                <a:latin typeface="Andale Mono" pitchFamily="-112" charset="0"/>
+                <a:ea typeface="굴림" pitchFamily="-112" charset="-127"/>
+              </a:rPr>
+              <a:t>, 0,tag,MPI_COMM_WORLD,status,ierr)</a:t>
             </a:r>
           </a:p>
           <a:p>
@@ -13953,14 +13740,77 @@
               </a:tabLst>
             </a:pPr>
             <a:r>
+              <a:rPr lang="en-US" sz="1400" b="1" dirty="0" smtClean="0">
+                <a:latin typeface="Andale Mono" pitchFamily="-112" charset="0"/>
+                <a:ea typeface="굴림" pitchFamily="-112" charset="-127"/>
+              </a:rPr>
+              <a:t>	call </a:t>
+            </a:r>
+            <a:r>
+              <a:rPr lang="en-US" sz="1400" b="1" dirty="0" err="1" smtClean="0">
+                <a:solidFill>
+                  <a:srgbClr val="0070C0"/>
+                </a:solidFill>
+                <a:latin typeface="Andale Mono" pitchFamily="-112" charset="0"/>
+                <a:ea typeface="굴림" pitchFamily="-112" charset="-127"/>
+              </a:rPr>
+              <a:t>MPI_Send</a:t>
+            </a:r>
+            <a:r>
+              <a:rPr lang="en-US" sz="1400" b="1" dirty="0" smtClean="0">
+                <a:latin typeface="Andale Mono" pitchFamily="-112" charset="0"/>
+                <a:ea typeface="굴림" pitchFamily="-112" charset="-127"/>
+              </a:rPr>
+              <a:t>(   </a:t>
+            </a:r>
+            <a:r>
               <a:rPr lang="en-US" sz="1400" b="1" dirty="0" err="1" smtClean="0">
                 <a:latin typeface="Andale Mono" pitchFamily="-112" charset="0"/>
                 <a:ea typeface="굴림" pitchFamily="-112" charset="-127"/>
               </a:rPr>
+              <a:t>sendbuf,count,MPI_REAL</a:t>
+            </a:r>
+            <a:r>
+              <a:rPr lang="en-US" sz="1400" b="1" dirty="0" smtClean="0">
+                <a:latin typeface="Andale Mono" pitchFamily="-112" charset="0"/>
+                <a:ea typeface="굴림" pitchFamily="-112" charset="-127"/>
+              </a:rPr>
+              <a:t>, 0,tag,MPI_COMM_WORLD,ierr)</a:t>
+            </a:r>
+          </a:p>
+          <a:p>
+            <a:pPr marL="341313" indent="-341313" eaLnBrk="1" hangingPunct="1">
+              <a:lnSpc>
+                <a:spcPct val="80000"/>
+              </a:lnSpc>
+              <a:spcBef>
+                <a:spcPts val="350"/>
+              </a:spcBef>
+              <a:buFontTx/>
+              <a:buNone/>
+              <a:tabLst>
+                <a:tab pos="911225" algn="l"/>
+                <a:tab pos="1825625" algn="l"/>
+                <a:tab pos="2740025" algn="l"/>
+                <a:tab pos="3654425" algn="l"/>
+                <a:tab pos="4568825" algn="l"/>
+                <a:tab pos="5483225" algn="l"/>
+                <a:tab pos="6397625" algn="l"/>
+                <a:tab pos="7312025" algn="l"/>
+                <a:tab pos="8226425" algn="l"/>
+                <a:tab pos="9140825" algn="l"/>
+                <a:tab pos="10055225" algn="l"/>
+              </a:tabLst>
+            </a:pPr>
+            <a:r>
+              <a:rPr lang="en-US" sz="1400" b="1" dirty="0" err="1" smtClean="0">
+                <a:latin typeface="Andale Mono" pitchFamily="-112" charset="0"/>
+                <a:ea typeface="굴림" pitchFamily="-112" charset="-127"/>
+              </a:rPr>
               <a:t>endif</a:t>
             </a:r>
             <a:endParaRPr lang="en-US" sz="1400" b="1" dirty="0" smtClean="0">
-              <a:latin typeface="Courier New" pitchFamily="-112" charset="0"/>
+              <a:latin typeface="Andale Mono" pitchFamily="-112" charset="0"/>
               <a:ea typeface="굴림" pitchFamily="-112" charset="-127"/>
             </a:endParaRPr>
           </a:p>
@@ -14002,12 +13852,9 @@
                 <a:spcPct val="80000"/>
               </a:lnSpc>
               <a:spcBef>
-                <a:spcPts val="1000"/>
+                <a:spcPts val="300"/>
               </a:spcBef>
-              <a:buClr>
-                <a:srgbClr val="FF3300"/>
-              </a:buClr>
-              <a:buFont typeface="Arial" charset="0"/>
+              <a:buFontTx/>
               <a:buNone/>
               <a:tabLst>
                 <a:tab pos="911225" algn="l"/>
@@ -14023,15 +13870,13 @@
                 <a:tab pos="10055225" algn="l"/>
               </a:tabLst>
             </a:pPr>
-            <a:r>
-              <a:rPr lang="en-US" sz="1800" b="1" dirty="0" smtClean="0">
-                <a:solidFill>
-                  <a:srgbClr val="0070C0"/>
-                </a:solidFill>
-                <a:ea typeface="굴림" pitchFamily="-112" charset="-127"/>
-              </a:rPr>
-              <a:t>Deadlock 2 (deadlocks when system buffer is too small)</a:t>
-            </a:r>
+            <a:endParaRPr lang="en-US" sz="1200" b="1" dirty="0" smtClean="0">
+              <a:solidFill>
+                <a:srgbClr val="000078"/>
+              </a:solidFill>
+              <a:latin typeface="Courier New" pitchFamily="-112" charset="0"/>
+              <a:ea typeface="굴림" pitchFamily="-112" charset="-127"/>
+            </a:endParaRPr>
           </a:p>
           <a:p>
             <a:pPr marL="341313" indent="-341313" eaLnBrk="1" hangingPunct="1">
@@ -14039,7 +13884,7 @@
                 <a:spcPct val="80000"/>
               </a:lnSpc>
               <a:spcBef>
-                <a:spcPts val="350"/>
+                <a:spcPts val="1000"/>
               </a:spcBef>
               <a:buFont typeface="Arial" charset="0"/>
               <a:buNone/>
@@ -14058,11 +13903,13 @@
               </a:tabLst>
             </a:pPr>
             <a:r>
-              <a:rPr lang="en-US" sz="1400" b="1" dirty="0" smtClean="0">
-                <a:latin typeface="Andale Mono" pitchFamily="-112" charset="0"/>
+              <a:rPr lang="en-US" sz="1800" b="1" dirty="0" smtClean="0">
+                <a:solidFill>
+                  <a:srgbClr val="0070C0"/>
+                </a:solidFill>
                 <a:ea typeface="굴림" pitchFamily="-112" charset="-127"/>
               </a:rPr>
-              <a:t>if (rank==0) then</a:t>
+              <a:t>Solution 2</a:t>
             </a:r>
           </a:p>
           <a:p>
@@ -14073,7 +13920,7 @@
               <a:spcBef>
                 <a:spcPts val="350"/>
               </a:spcBef>
-              <a:buFont typeface="Arial" charset="0"/>
+              <a:buFontTx/>
               <a:buNone/>
               <a:tabLst>
                 <a:tab pos="911225" algn="l"/>
@@ -14089,40 +13936,19 @@
                 <a:tab pos="10055225" algn="l"/>
               </a:tabLst>
             </a:pPr>
-            <a:r>
-              <a:rPr lang="en-US" sz="1400" b="1" dirty="0" smtClean="0">
-                <a:latin typeface="Andale Mono" pitchFamily="-112" charset="0"/>
-                <a:ea typeface="굴림" pitchFamily="-112" charset="-127"/>
-              </a:rPr>
-              <a:t>	call </a:t>
-            </a:r>
-            <a:r>
-              <a:rPr lang="en-US" sz="1400" b="1" dirty="0" err="1" smtClean="0">
-                <a:solidFill>
-                  <a:srgbClr val="0070C0"/>
-                </a:solidFill>
-                <a:latin typeface="Andale Mono" pitchFamily="-112" charset="0"/>
-                <a:ea typeface="굴림" pitchFamily="-112" charset="-127"/>
-              </a:rPr>
-              <a:t>MPI_Send</a:t>
-            </a:r>
-            <a:r>
-              <a:rPr lang="en-US" sz="1400" b="1" dirty="0" smtClean="0">
-                <a:latin typeface="Andale Mono" pitchFamily="-112" charset="0"/>
-                <a:ea typeface="굴림" pitchFamily="-112" charset="-127"/>
-              </a:rPr>
-              <a:t>(   sendbuf,count,MPI_REAL,1,tag,MPI_COMM_WORLD,ierr)</a:t>
-            </a:r>
-          </a:p>
-          <a:p>
-            <a:pPr marL="341313" indent="-341313" eaLnBrk="1" hangingPunct="1">
+            <a:endParaRPr lang="en-US" sz="1400" b="1" dirty="0">
+              <a:latin typeface="Andale Mono" pitchFamily="-112" charset="0"/>
+              <a:ea typeface="굴림" pitchFamily="-112" charset="-127"/>
+            </a:endParaRPr>
+          </a:p>
+          <a:p>
+            <a:pPr marL="341313" indent="-341313">
               <a:lnSpc>
                 <a:spcPct val="80000"/>
               </a:lnSpc>
               <a:spcBef>
                 <a:spcPts val="350"/>
               </a:spcBef>
-              <a:buFont typeface="Arial" charset="0"/>
               <a:buNone/>
               <a:tabLst>
                 <a:tab pos="911225" algn="l"/>
@@ -14139,28 +13965,18 @@
               </a:tabLst>
             </a:pPr>
             <a:r>
+              <a:rPr lang="en-US" sz="1400" b="1" dirty="0">
+                <a:latin typeface="Andale Mono" pitchFamily="-112" charset="0"/>
+                <a:ea typeface="굴림" pitchFamily="-112" charset="-127"/>
+              </a:rPr>
+              <a:t>other = 1-</a:t>
+            </a:r>
+            <a:r>
               <a:rPr lang="en-US" sz="1400" b="1" dirty="0" smtClean="0">
                 <a:latin typeface="Andale Mono" pitchFamily="-112" charset="0"/>
                 <a:ea typeface="굴림" pitchFamily="-112" charset="-127"/>
               </a:rPr>
-              <a:t>	call </a:t>
-            </a:r>
-            <a:r>
-              <a:rPr lang="en-US" sz="1400" b="1" dirty="0" err="1" smtClean="0">
-                <a:solidFill>
-                  <a:srgbClr val="0070C0"/>
-                </a:solidFill>
-                <a:latin typeface="Andale Mono" pitchFamily="-112" charset="0"/>
-                <a:ea typeface="굴림" pitchFamily="-112" charset="-127"/>
-              </a:rPr>
-              <a:t>MPI_Recv</a:t>
-            </a:r>
-            <a:r>
-              <a:rPr lang="en-US" sz="1400" b="1" dirty="0" smtClean="0">
-                <a:latin typeface="Andale Mono" pitchFamily="-112" charset="0"/>
-                <a:ea typeface="굴림" pitchFamily="-112" charset="-127"/>
-              </a:rPr>
-              <a:t>(   recvbuf,count,MPI_REAL,1,tag,MPI_COMM_WORLD,status,ierr)</a:t>
+              <a:t>mytid</a:t>
             </a:r>
           </a:p>
           <a:p>
@@ -14171,7 +13987,7 @@
               <a:spcBef>
                 <a:spcPts val="350"/>
               </a:spcBef>
-              <a:buFont typeface="Arial" charset="0"/>
+              <a:buFontTx/>
               <a:buNone/>
               <a:tabLst>
                 <a:tab pos="911225" algn="l"/>
@@ -14188,18 +14004,56 @@
               </a:tabLst>
             </a:pPr>
             <a:r>
+              <a:rPr lang="en-US" sz="1400" b="1" dirty="0" smtClean="0">
+                <a:latin typeface="Andale Mono" pitchFamily="-112" charset="0"/>
+                <a:ea typeface="굴림" pitchFamily="-112" charset="-127"/>
+              </a:rPr>
+              <a:t>call </a:t>
+            </a:r>
+            <a:r>
+              <a:rPr lang="en-US" sz="1400" b="1" dirty="0" err="1" smtClean="0">
+                <a:solidFill>
+                  <a:srgbClr val="0070C0"/>
+                </a:solidFill>
+                <a:latin typeface="Andale Mono" pitchFamily="-112" charset="0"/>
+                <a:ea typeface="굴림" pitchFamily="-112" charset="-127"/>
+              </a:rPr>
+              <a:t>MPI_SendRecv</a:t>
+            </a:r>
+            <a:r>
+              <a:rPr lang="en-US" sz="1400" b="1" dirty="0" smtClean="0">
+                <a:latin typeface="Andale Mono" pitchFamily="-112" charset="0"/>
+                <a:ea typeface="굴림" pitchFamily="-112" charset="-127"/>
+              </a:rPr>
+              <a:t>(   </a:t>
+            </a:r>
+            <a:r>
               <a:rPr lang="en-US" sz="1400" b="1" dirty="0" err="1" smtClean="0">
                 <a:latin typeface="Andale Mono" pitchFamily="-112" charset="0"/>
                 <a:ea typeface="굴림" pitchFamily="-112" charset="-127"/>
               </a:rPr>
-              <a:t>elseif</a:t>
+              <a:t>sendbuf,sendcount,sendtype</a:t>
+            </a:r>
+            <a:r>
+              <a:rPr lang="en-US" sz="1400" b="1" dirty="0" err="1" smtClean="0">
+                <a:latin typeface="Andale Mono" pitchFamily="-112" charset="0"/>
+                <a:ea typeface="굴림" pitchFamily="-112" charset="-127"/>
+              </a:rPr>
+              <a:t>,other,</a:t>
+            </a:r>
+            <a:r>
+              <a:rPr lang="en-US" sz="1400" b="1" dirty="0" err="1" smtClean="0">
+                <a:latin typeface="Andale Mono" pitchFamily="-112" charset="0"/>
+                <a:ea typeface="굴림" pitchFamily="-112" charset="-127"/>
+              </a:rPr>
+              <a:t>sendtag</a:t>
             </a:r>
             <a:r>
               <a:rPr lang="en-US" sz="1400" b="1" dirty="0" smtClean="0">
                 <a:latin typeface="Andale Mono" pitchFamily="-112" charset="0"/>
                 <a:ea typeface="굴림" pitchFamily="-112" charset="-127"/>
               </a:rPr>
-              <a:t> (rank==1) then</a:t>
+              <a:t>,</a:t>
             </a:r>
           </a:p>
           <a:p>
@@ -14210,7 +14064,7 @@
               <a:spcBef>
                 <a:spcPts val="350"/>
               </a:spcBef>
-              <a:buFont typeface="Arial" charset="0"/>
+              <a:buFontTx/>
               <a:buNone/>
               <a:tabLst>
                 <a:tab pos="911225" algn="l"/>
@@ -14227,39 +14081,71 @@
               </a:tabLst>
             </a:pPr>
             <a:r>
+              <a:rPr lang="en-US" sz="1400" b="1" dirty="0">
+                <a:latin typeface="Andale Mono" pitchFamily="-112" charset="0"/>
+                <a:ea typeface="굴림" pitchFamily="-112" charset="-127"/>
+              </a:rPr>
+              <a:t>	</a:t>
+            </a:r>
+            <a:r>
+              <a:rPr lang="en-US" sz="1400" b="1" dirty="0" err="1" smtClean="0">
+                <a:latin typeface="Andale Mono" pitchFamily="-112" charset="0"/>
+                <a:ea typeface="굴림" pitchFamily="-112" charset="-127"/>
+              </a:rPr>
+              <a:t>recvbuf</a:t>
+            </a:r>
+            <a:r>
+              <a:rPr lang="en-US" sz="1400" b="1" dirty="0" err="1" smtClean="0">
+                <a:latin typeface="Andale Mono" pitchFamily="-112" charset="0"/>
+                <a:ea typeface="굴림" pitchFamily="-112" charset="-127"/>
+              </a:rPr>
+              <a:t>,recvcount</a:t>
+            </a:r>
+            <a:r>
               <a:rPr lang="en-US" sz="1400" b="1" dirty="0" smtClean="0">
                 <a:latin typeface="Andale Mono" pitchFamily="-112" charset="0"/>
                 <a:ea typeface="굴림" pitchFamily="-112" charset="-127"/>
               </a:rPr>
-              <a:t>	call </a:t>
+              <a:t>, </a:t>
             </a:r>
             <a:r>
               <a:rPr lang="en-US" sz="1400" b="1" dirty="0" err="1" smtClean="0">
-                <a:solidFill>
-                  <a:srgbClr val="0070C0"/>
-                </a:solidFill>
                 <a:latin typeface="Andale Mono" pitchFamily="-112" charset="0"/>
                 <a:ea typeface="굴림" pitchFamily="-112" charset="-127"/>
               </a:rPr>
-              <a:t>MPI_Send</a:t>
+              <a:t>recvtype</a:t>
+            </a:r>
+            <a:r>
+              <a:rPr lang="en-US" sz="1400" b="1" dirty="0" err="1" smtClean="0">
+                <a:latin typeface="Andale Mono" pitchFamily="-112" charset="0"/>
+                <a:ea typeface="굴림" pitchFamily="-112" charset="-127"/>
+              </a:rPr>
+              <a:t>,other,</a:t>
+            </a:r>
+            <a:r>
+              <a:rPr lang="en-US" sz="1400" b="1" dirty="0" err="1" smtClean="0">
+                <a:latin typeface="Andale Mono" pitchFamily="-112" charset="0"/>
+                <a:ea typeface="굴림" pitchFamily="-112" charset="-127"/>
+              </a:rPr>
+              <a:t>recvtag,MPI_COMM_WORLD,status,ierr</a:t>
             </a:r>
             <a:r>
               <a:rPr lang="en-US" sz="1400" b="1" dirty="0" smtClean="0">
                 <a:latin typeface="Andale Mono" pitchFamily="-112" charset="0"/>
                 <a:ea typeface="굴림" pitchFamily="-112" charset="-127"/>
               </a:rPr>
-              <a:t>(   sendbuf,count,MPI_REAL,0,tag,MPI_COMM_WORLD,ierr)</a:t>
+              <a:t>)</a:t>
             </a:r>
           </a:p>
           <a:p>
             <a:pPr marL="341313" indent="-341313" eaLnBrk="1" hangingPunct="1">
               <a:lnSpc>
-                <a:spcPct val="80000"/>
+                <a:spcPct val="90000"/>
               </a:lnSpc>
               <a:spcBef>
-                <a:spcPts val="350"/>
+                <a:spcPts val="875"/>
               </a:spcBef>
-              <a:buFont typeface="Arial" charset="0"/>
+              <a:buFontTx/>
               <a:buNone/>
               <a:tabLst>
                 <a:tab pos="911225" algn="l"/>
@@ -14275,64 +14161,11 @@
                 <a:tab pos="10055225" algn="l"/>
               </a:tabLst>
             </a:pPr>
-            <a:r>
-              <a:rPr lang="en-US" sz="1400" b="1" dirty="0" smtClean="0">
-                <a:latin typeface="Andale Mono" pitchFamily="-112" charset="0"/>
-                <a:ea typeface="굴림" pitchFamily="-112" charset="-127"/>
-              </a:rPr>
-              <a:t>	call </a:t>
-            </a:r>
-            <a:r>
-              <a:rPr lang="en-US" sz="1400" b="1" dirty="0" err="1" smtClean="0">
-                <a:solidFill>
-                  <a:srgbClr val="0070C0"/>
-                </a:solidFill>
-                <a:latin typeface="Andale Mono" pitchFamily="-112" charset="0"/>
-                <a:ea typeface="굴림" pitchFamily="-112" charset="-127"/>
-              </a:rPr>
-              <a:t>MPI_Recv</a:t>
-            </a:r>
-            <a:r>
-              <a:rPr lang="en-US" sz="1400" b="1" dirty="0" smtClean="0">
-                <a:latin typeface="Andale Mono" pitchFamily="-112" charset="0"/>
-                <a:ea typeface="굴림" pitchFamily="-112" charset="-127"/>
-              </a:rPr>
-              <a:t>(   recvbuf,count,MPI_REAL,0,tag,MPI_COMM_WORLD,status,ierr)</a:t>
-            </a:r>
-          </a:p>
-          <a:p>
-            <a:pPr marL="341313" indent="-341313" eaLnBrk="1" hangingPunct="1">
-              <a:lnSpc>
-                <a:spcPct val="80000"/>
-              </a:lnSpc>
-              <a:spcBef>
-                <a:spcPts val="350"/>
-              </a:spcBef>
-              <a:buFont typeface="Arial" charset="0"/>
-              <a:buNone/>
-              <a:tabLst>
-                <a:tab pos="911225" algn="l"/>
-                <a:tab pos="1825625" algn="l"/>
-                <a:tab pos="2740025" algn="l"/>
-                <a:tab pos="3654425" algn="l"/>
-                <a:tab pos="4568825" algn="l"/>
-                <a:tab pos="5483225" algn="l"/>
-                <a:tab pos="6397625" algn="l"/>
-                <a:tab pos="7312025" algn="l"/>
-                <a:tab pos="8226425" algn="l"/>
-                <a:tab pos="9140825" algn="l"/>
-                <a:tab pos="10055225" algn="l"/>
-              </a:tabLst>
-            </a:pPr>
-            <a:r>
-              <a:rPr lang="en-US" sz="1400" b="1" dirty="0" err="1" smtClean="0">
-                <a:latin typeface="Andale Mono" pitchFamily="-112" charset="0"/>
-                <a:ea typeface="굴림" pitchFamily="-112" charset="-127"/>
-              </a:rPr>
-              <a:t>endif</a:t>
-            </a:r>
             <a:endParaRPr lang="en-US" sz="1400" b="1" dirty="0" smtClean="0">
-              <a:latin typeface="Andale Mono" pitchFamily="-112" charset="0"/>
+              <a:solidFill>
+                <a:srgbClr val="000078"/>
+              </a:solidFill>
+              <a:latin typeface="Courier New" pitchFamily="-112" charset="0"/>
               <a:ea typeface="굴림" pitchFamily="-112" charset="-127"/>
             </a:endParaRPr>
           </a:p>
@@ -14340,7 +14173,7 @@
       </p:sp>
       <p:sp>
         <p:nvSpPr>
-          <p:cNvPr id="50180" name="Slide Number Placeholder 3"/>
+          <p:cNvPr id="51204" name="Slide Number Placeholder 3"/>
           <p:cNvSpPr>
             <a:spLocks noGrp="1"/>
           </p:cNvSpPr>
@@ -14376,7 +14209,7 @@
                 <a:tab pos="10058400" algn="l"/>
               </a:tabLst>
             </a:pPr>
-            <a:fld id="{1EA954A6-66DC-4CA6-9007-1975678C7453}" type="slidenum">
+            <a:fld id="{4A2854C0-EE8F-4CC6-A1E8-03762C464260}" type="slidenum">
               <a:rPr lang="en-US"/>
               <a:pPr>
                 <a:tabLst>
@@ -14455,7 +14288,7 @@
       </p:grpSpPr>
       <p:sp>
         <p:nvSpPr>
-          <p:cNvPr id="51202" name="Rectangle 1"/>
+          <p:cNvPr id="52226" name="Rectangle 1"/>
           <p:cNvSpPr>
             <a:spLocks noGrp="1" noChangeArrowheads="1"/>
           </p:cNvSpPr>
@@ -14500,7 +14333,7 @@
       </p:sp>
       <p:sp>
         <p:nvSpPr>
-          <p:cNvPr id="51203" name="Rectangle 2"/>
+          <p:cNvPr id="52227" name="Rectangle 2"/>
           <p:cNvSpPr>
             <a:spLocks noGrp="1" noChangeArrowheads="1"/>
           </p:cNvSpPr>
@@ -14510,12 +14343,14 @@
         </p:nvSpPr>
         <p:spPr>
           <a:xfrm>
-            <a:off x="228600" y="1371600"/>
-            <a:ext cx="8915400" cy="4648200"/>
+            <a:off x="465746" y="1414330"/>
+            <a:ext cx="7772400" cy="4876800"/>
           </a:xfrm>
         </p:spPr>
         <p:txBody>
-          <a:bodyPr/>
+          <a:bodyPr>
+            <a:normAutofit/>
+          </a:bodyPr>
           <a:lstStyle/>
           <a:p>
             <a:pPr marL="341313" indent="-341313" eaLnBrk="1" hangingPunct="1">
@@ -14523,7 +14358,7 @@
                 <a:spcPct val="80000"/>
               </a:lnSpc>
               <a:spcBef>
-                <a:spcPts val="1000"/>
+                <a:spcPts val="875"/>
               </a:spcBef>
               <a:buFont typeface="Arial" charset="0"/>
               <a:buNone/>
@@ -14542,13 +14377,13 @@
               </a:tabLst>
             </a:pPr>
             <a:r>
-              <a:rPr lang="en-US" sz="1800" b="1" dirty="0" smtClean="0">
+              <a:rPr lang="en-US" sz="1600" b="1" dirty="0" smtClean="0">
                 <a:solidFill>
                   <a:srgbClr val="0070C0"/>
                 </a:solidFill>
                 <a:ea typeface="굴림" pitchFamily="-112" charset="-127"/>
               </a:rPr>
-              <a:t>Solution 1  (but this doesn’t allow bidirectional communication)</a:t>
+              <a:t>Solution 3</a:t>
             </a:r>
           </a:p>
           <a:p>
@@ -14575,13 +14410,52 @@
                 <a:tab pos="10055225" algn="l"/>
               </a:tabLst>
             </a:pPr>
+            <a:endParaRPr lang="en-US" sz="1400" b="1" dirty="0" smtClean="0">
+              <a:latin typeface="Andale Mono" pitchFamily="-112" charset="0"/>
+              <a:ea typeface="굴림" pitchFamily="-112" charset="-127"/>
+            </a:endParaRPr>
+          </a:p>
+          <a:p>
+            <a:pPr marL="341313" indent="-341313">
+              <a:lnSpc>
+                <a:spcPct val="80000"/>
+              </a:lnSpc>
+              <a:spcBef>
+                <a:spcPts val="350"/>
+              </a:spcBef>
+              <a:buNone/>
+              <a:tabLst>
+                <a:tab pos="911225" algn="l"/>
+                <a:tab pos="1825625" algn="l"/>
+                <a:tab pos="2740025" algn="l"/>
+                <a:tab pos="3654425" algn="l"/>
+                <a:tab pos="4568825" algn="l"/>
+                <a:tab pos="5483225" algn="l"/>
+                <a:tab pos="6397625" algn="l"/>
+                <a:tab pos="7312025" algn="l"/>
+                <a:tab pos="8226425" algn="l"/>
+                <a:tab pos="9140825" algn="l"/>
+                <a:tab pos="10055225" algn="l"/>
+              </a:tabLst>
+            </a:pPr>
+            <a:r>
+              <a:rPr lang="en-US" sz="1400" b="1" dirty="0">
+                <a:latin typeface="Andale Mono" pitchFamily="-112" charset="0"/>
+                <a:ea typeface="굴림" pitchFamily="-112" charset="-127"/>
+              </a:rPr>
+              <a:t>other = 1-</a:t>
+            </a:r>
             <a:r>
               <a:rPr lang="en-US" sz="1400" b="1" dirty="0" smtClean="0">
                 <a:latin typeface="Andale Mono" pitchFamily="-112" charset="0"/>
                 <a:ea typeface="굴림" pitchFamily="-112" charset="-127"/>
               </a:rPr>
-              <a:t>if (rank==0) then</a:t>
-            </a:r>
+              <a:t>mytid</a:t>
+            </a:r>
+            <a:endParaRPr lang="en-US" sz="1400" b="1" dirty="0" smtClean="0">
+              <a:latin typeface="Andale Mono" pitchFamily="-112" charset="0"/>
+              <a:ea typeface="굴림" pitchFamily="-112" charset="-127"/>
+            </a:endParaRPr>
           </a:p>
           <a:p>
             <a:pPr marL="341313" indent="-341313" eaLnBrk="1" hangingPunct="1">
@@ -14612,7 +14486,7 @@
                 <a:latin typeface="Andale Mono" pitchFamily="-112" charset="0"/>
                 <a:ea typeface="굴림" pitchFamily="-112" charset="-127"/>
               </a:rPr>
-              <a:t>	call </a:t>
+              <a:t>call </a:t>
             </a:r>
             <a:r>
               <a:rPr lang="en-US" sz="1400" b="1" dirty="0" err="1" smtClean="0">
@@ -14622,14 +14496,14 @@
                 <a:latin typeface="Andale Mono" pitchFamily="-112" charset="0"/>
                 <a:ea typeface="굴림" pitchFamily="-112" charset="-127"/>
               </a:rPr>
-              <a:t>MPI_Send</a:t>
+              <a:t>MPI_ISend</a:t>
             </a:r>
             <a:r>
               <a:rPr lang="en-US" sz="1400" b="1" dirty="0" smtClean="0">
                 <a:latin typeface="Andale Mono" pitchFamily="-112" charset="0"/>
                 <a:ea typeface="굴림" pitchFamily="-112" charset="-127"/>
               </a:rPr>
-              <a:t>(  </a:t>
+              <a:t>(   </a:t>
             </a:r>
             <a:r>
               <a:rPr lang="en-US" sz="1400" b="1" dirty="0" err="1" smtClean="0">
@@ -14643,7 +14517,7 @@
                 <a:latin typeface="Andale Mono" pitchFamily="-112" charset="0"/>
                 <a:ea typeface="굴림" pitchFamily="-112" charset="-127"/>
               </a:rPr>
-              <a:t>, 1,tag,MPI_COMM_WORLD,ierr)</a:t>
+              <a:t>,</a:t>
             </a:r>
           </a:p>
           <a:p>
@@ -14671,42 +14545,32 @@
               </a:tabLst>
             </a:pPr>
             <a:r>
+              <a:rPr lang="en-US" sz="1400" b="1" dirty="0">
+                <a:latin typeface="Andale Mono" pitchFamily="-112" charset="0"/>
+                <a:ea typeface="굴림" pitchFamily="-112" charset="-127"/>
+              </a:rPr>
+              <a:t>	</a:t>
+            </a:r>
+            <a:r>
               <a:rPr lang="en-US" sz="1400" b="1" dirty="0" smtClean="0">
                 <a:latin typeface="Andale Mono" pitchFamily="-112" charset="0"/>
                 <a:ea typeface="굴림" pitchFamily="-112" charset="-127"/>
               </a:rPr>
-              <a:t>	call </a:t>
-            </a:r>
-            <a:r>
-              <a:rPr lang="en-US" sz="1400" b="1" dirty="0" err="1" smtClean="0">
-                <a:solidFill>
-                  <a:srgbClr val="0070C0"/>
-                </a:solidFill>
-                <a:latin typeface="Andale Mono" pitchFamily="-112" charset="0"/>
-                <a:ea typeface="굴림" pitchFamily="-112" charset="-127"/>
-              </a:rPr>
-              <a:t>MPI_Recv</a:t>
+              <a:t>other</a:t>
             </a:r>
             <a:r>
               <a:rPr lang="en-US" sz="1400" b="1" dirty="0" smtClean="0">
                 <a:latin typeface="Andale Mono" pitchFamily="-112" charset="0"/>
                 <a:ea typeface="굴림" pitchFamily="-112" charset="-127"/>
               </a:rPr>
-              <a:t>(   </a:t>
-            </a:r>
-            <a:r>
-              <a:rPr lang="en-US" sz="1400" b="1" dirty="0" err="1" smtClean="0">
-                <a:latin typeface="Andale Mono" pitchFamily="-112" charset="0"/>
-                <a:ea typeface="굴림" pitchFamily="-112" charset="-127"/>
-              </a:rPr>
-              <a:t>recvbuf,count,MPI_REAL</a:t>
+              <a:t>,</a:t>
             </a:r>
             <a:r>
               <a:rPr lang="en-US" sz="1400" b="1" dirty="0" smtClean="0">
                 <a:latin typeface="Andale Mono" pitchFamily="-112" charset="0"/>
                 <a:ea typeface="굴림" pitchFamily="-112" charset="-127"/>
               </a:rPr>
-              <a:t>, 1,tag,MPI_COMM_WORLD,status,ierr)</a:t>
+              <a:t>tag,MPI_COMM_WORLD,req1,ierr)</a:t>
             </a:r>
           </a:p>
           <a:p>
@@ -14734,18 +14598,42 @@
               </a:tabLst>
             </a:pPr>
             <a:r>
+              <a:rPr lang="en-US" sz="1400" b="1" dirty="0" smtClean="0">
+                <a:latin typeface="Andale Mono" pitchFamily="-112" charset="0"/>
+                <a:ea typeface="굴림" pitchFamily="-112" charset="-127"/>
+              </a:rPr>
+              <a:t>call </a:t>
+            </a:r>
+            <a:r>
+              <a:rPr lang="en-US" sz="1400" b="1" dirty="0" err="1" smtClean="0">
+                <a:solidFill>
+                  <a:srgbClr val="0070C0"/>
+                </a:solidFill>
+                <a:latin typeface="Andale Mono" pitchFamily="-112" charset="0"/>
+                <a:ea typeface="굴림" pitchFamily="-112" charset="-127"/>
+              </a:rPr>
+              <a:t>MPI_IRecv</a:t>
+            </a:r>
+            <a:r>
+              <a:rPr lang="en-US" sz="1400" b="1" dirty="0" smtClean="0">
+                <a:latin typeface="Andale Mono" pitchFamily="-112" charset="0"/>
+                <a:ea typeface="굴림" pitchFamily="-112" charset="-127"/>
+              </a:rPr>
+              <a:t>(   </a:t>
+            </a:r>
+            <a:r>
               <a:rPr lang="en-US" sz="1400" b="1" dirty="0" err="1" smtClean="0">
                 <a:latin typeface="Andale Mono" pitchFamily="-112" charset="0"/>
                 <a:ea typeface="굴림" pitchFamily="-112" charset="-127"/>
               </a:rPr>
-              <a:t>elseif</a:t>
+              <a:t>recvbuf,count,MPI_REAL</a:t>
             </a:r>
             <a:r>
               <a:rPr lang="en-US" sz="1400" b="1" dirty="0" smtClean="0">
                 <a:latin typeface="Andale Mono" pitchFamily="-112" charset="0"/>
                 <a:ea typeface="굴림" pitchFamily="-112" charset="-127"/>
               </a:rPr>
-              <a:t> (rank==1) then</a:t>
+              <a:t>,</a:t>
             </a:r>
           </a:p>
           <a:p>
@@ -14773,42 +14661,39 @@
               </a:tabLst>
             </a:pPr>
             <a:r>
+              <a:rPr lang="en-US" sz="1400" b="1" dirty="0">
+                <a:latin typeface="Andale Mono" pitchFamily="-112" charset="0"/>
+                <a:ea typeface="굴림" pitchFamily="-112" charset="-127"/>
+              </a:rPr>
+              <a:t>	</a:t>
+            </a:r>
+            <a:r>
               <a:rPr lang="en-US" sz="1400" b="1" dirty="0" smtClean="0">
                 <a:latin typeface="Andale Mono" pitchFamily="-112" charset="0"/>
                 <a:ea typeface="굴림" pitchFamily="-112" charset="-127"/>
               </a:rPr>
-              <a:t>	call </a:t>
-            </a:r>
-            <a:r>
-              <a:rPr lang="en-US" sz="1400" b="1" dirty="0" err="1" smtClean="0">
-                <a:solidFill>
-                  <a:srgbClr val="0070C0"/>
-                </a:solidFill>
-                <a:latin typeface="Andale Mono" pitchFamily="-112" charset="0"/>
-                <a:ea typeface="굴림" pitchFamily="-112" charset="-127"/>
-              </a:rPr>
-              <a:t>MPI_Recv</a:t>
+              <a:t>other</a:t>
             </a:r>
             <a:r>
               <a:rPr lang="en-US" sz="1400" b="1" dirty="0" smtClean="0">
                 <a:latin typeface="Andale Mono" pitchFamily="-112" charset="0"/>
                 <a:ea typeface="굴림" pitchFamily="-112" charset="-127"/>
               </a:rPr>
-              <a:t>(    </a:t>
-            </a:r>
-            <a:r>
-              <a:rPr lang="en-US" sz="1400" b="1" dirty="0" err="1" smtClean="0">
-                <a:latin typeface="Andale Mono" pitchFamily="-112" charset="0"/>
-                <a:ea typeface="굴림" pitchFamily="-112" charset="-127"/>
-              </a:rPr>
-              <a:t>recvbuf,count,MPI_REAL</a:t>
+              <a:t>,</a:t>
             </a:r>
             <a:r>
               <a:rPr lang="en-US" sz="1400" b="1" dirty="0" smtClean="0">
                 <a:latin typeface="Andale Mono" pitchFamily="-112" charset="0"/>
                 <a:ea typeface="굴림" pitchFamily="-112" charset="-127"/>
               </a:rPr>
-              <a:t>, 0,tag,MPI_COMM_WORLD,status,ierr)</a:t>
+              <a:t>tag,MPI_COMM_WORLD,req2,ierr</a:t>
+            </a:r>
+            <a:r>
+              <a:rPr lang="en-US" sz="1400" b="1" dirty="0" smtClean="0">
+                <a:latin typeface="Andale Mono" pitchFamily="-112" charset="0"/>
+                <a:ea typeface="굴림" pitchFamily="-112" charset="-127"/>
+              </a:rPr>
+              <a:t>)</a:t>
             </a:r>
           </a:p>
           <a:p>
@@ -14840,7 +14725,7 @@
                 <a:latin typeface="Andale Mono" pitchFamily="-112" charset="0"/>
                 <a:ea typeface="굴림" pitchFamily="-112" charset="-127"/>
               </a:rPr>
-              <a:t>	call </a:t>
+              <a:t>call </a:t>
             </a:r>
             <a:r>
               <a:rPr lang="en-US" sz="1400" b="1" dirty="0" err="1" smtClean="0">
@@ -14850,28 +14735,14 @@
                 <a:latin typeface="Andale Mono" pitchFamily="-112" charset="0"/>
                 <a:ea typeface="굴림" pitchFamily="-112" charset="-127"/>
               </a:rPr>
-              <a:t>MPI_Send</a:t>
+              <a:t>MPI_Wait</a:t>
             </a:r>
             <a:r>
               <a:rPr lang="en-US" sz="1400" b="1" dirty="0" smtClean="0">
                 <a:latin typeface="Andale Mono" pitchFamily="-112" charset="0"/>
                 <a:ea typeface="굴림" pitchFamily="-112" charset="-127"/>
               </a:rPr>
-              <a:t>(   </a:t>
-            </a:r>
-            <a:r>
-              <a:rPr lang="en-US" sz="1400" b="1" dirty="0" err="1" smtClean="0">
-                <a:latin typeface="Andale Mono" pitchFamily="-112" charset="0"/>
-                <a:ea typeface="굴림" pitchFamily="-112" charset="-127"/>
-              </a:rPr>
-              <a:t>sendbuf,count,MPI_REAL</a:t>
-            </a:r>
-            <a:r>
-              <a:rPr lang="en-US" sz="1400" b="1" dirty="0" smtClean="0">
-                <a:latin typeface="Andale Mono" pitchFamily="-112" charset="0"/>
-                <a:ea typeface="굴림" pitchFamily="-112" charset="-127"/>
-              </a:rPr>
-              <a:t>, 0,tag,MPI_COMM_WORLD,ierr)</a:t>
+              <a:t>(   req1,status,ierr)</a:t>
             </a:r>
           </a:p>
           <a:p>
@@ -14899,16 +14770,29 @@
               </a:tabLst>
             </a:pPr>
             <a:r>
-              <a:rPr lang="en-US" sz="1400" b="1" dirty="0" err="1" smtClean="0">
+              <a:rPr lang="en-US" sz="1400" b="1" dirty="0" smtClean="0">
                 <a:latin typeface="Andale Mono" pitchFamily="-112" charset="0"/>
                 <a:ea typeface="굴림" pitchFamily="-112" charset="-127"/>
               </a:rPr>
-              <a:t>endif</a:t>
-            </a:r>
-            <a:endParaRPr lang="en-US" sz="1400" b="1" dirty="0" smtClean="0">
-              <a:latin typeface="Andale Mono" pitchFamily="-112" charset="0"/>
-              <a:ea typeface="굴림" pitchFamily="-112" charset="-127"/>
-            </a:endParaRPr>
+              <a:t>call </a:t>
+            </a:r>
+            <a:r>
+              <a:rPr lang="en-US" sz="1400" b="1" dirty="0" err="1" smtClean="0">
+                <a:solidFill>
+                  <a:srgbClr val="0070C0"/>
+                </a:solidFill>
+                <a:latin typeface="Andale Mono" pitchFamily="-112" charset="0"/>
+                <a:ea typeface="굴림" pitchFamily="-112" charset="-127"/>
+              </a:rPr>
+              <a:t>MPI_Wait</a:t>
+            </a:r>
+            <a:r>
+              <a:rPr lang="en-US" sz="1400" b="1" dirty="0" smtClean="0">
+                <a:latin typeface="Andale Mono" pitchFamily="-112" charset="0"/>
+                <a:ea typeface="굴림" pitchFamily="-112" charset="-127"/>
+              </a:rPr>
+              <a:t>(   req2,status,ierr)</a:t>
+            </a:r>
           </a:p>
           <a:p>
             <a:pPr marL="341313" indent="-341313" eaLnBrk="1" hangingPunct="1">
@@ -14916,7 +14800,7 @@
                 <a:spcPct val="80000"/>
               </a:lnSpc>
               <a:spcBef>
-                <a:spcPts val="300"/>
+                <a:spcPts val="250"/>
               </a:spcBef>
               <a:buFontTx/>
               <a:buNone/>
@@ -14934,7 +14818,7 @@
                 <a:tab pos="10055225" algn="l"/>
               </a:tabLst>
             </a:pPr>
-            <a:endParaRPr lang="en-US" sz="1200" b="1" dirty="0" smtClean="0">
+            <a:endParaRPr lang="en-US" sz="1050" b="1" dirty="0" smtClean="0">
               <a:solidFill>
                 <a:srgbClr val="000078"/>
               </a:solidFill>
@@ -14948,7 +14832,7 @@
                 <a:spcPct val="80000"/>
               </a:lnSpc>
               <a:spcBef>
-                <a:spcPts val="300"/>
+                <a:spcPts val="250"/>
               </a:spcBef>
               <a:buFontTx/>
               <a:buNone/>
@@ -14966,7 +14850,7 @@
                 <a:tab pos="10055225" algn="l"/>
               </a:tabLst>
             </a:pPr>
-            <a:endParaRPr lang="en-US" sz="1200" b="1" dirty="0" smtClean="0">
+            <a:endParaRPr lang="en-US" sz="1050" b="1" dirty="0" smtClean="0">
               <a:solidFill>
                 <a:srgbClr val="000078"/>
               </a:solidFill>
@@ -14980,7 +14864,7 @@
                 <a:spcPct val="80000"/>
               </a:lnSpc>
               <a:spcBef>
-                <a:spcPts val="1000"/>
+                <a:spcPts val="875"/>
               </a:spcBef>
               <a:buFont typeface="Arial" charset="0"/>
               <a:buNone/>
@@ -15005,8 +14889,23 @@
                 </a:solidFill>
                 <a:ea typeface="굴림" pitchFamily="-112" charset="-127"/>
               </a:rPr>
-              <a:t>Solution 2</a:t>
-            </a:r>
+              <a:t>Solution </a:t>
+            </a:r>
+            <a:r>
+              <a:rPr lang="en-US" sz="1800" b="1" dirty="0" smtClean="0">
+                <a:solidFill>
+                  <a:srgbClr val="0070C0"/>
+                </a:solidFill>
+                <a:ea typeface="굴림" pitchFamily="-112" charset="-127"/>
+              </a:rPr>
+              <a:t>4 (buffered sends are not part of this class)</a:t>
+            </a:r>
+            <a:endParaRPr lang="en-US" sz="1800" b="1" dirty="0" smtClean="0">
+              <a:solidFill>
+                <a:srgbClr val="0070C0"/>
+              </a:solidFill>
+              <a:ea typeface="굴림" pitchFamily="-112" charset="-127"/>
+            </a:endParaRPr>
           </a:p>
           <a:p>
             <a:pPr marL="341313" indent="-341313" eaLnBrk="1" hangingPunct="1">
@@ -15079,28 +14978,14 @@
                 <a:latin typeface="Andale Mono" pitchFamily="-112" charset="0"/>
                 <a:ea typeface="굴림" pitchFamily="-112" charset="-127"/>
               </a:rPr>
-              <a:t>MPI_SendRecv</a:t>
+              <a:t>MPI_BSend</a:t>
             </a:r>
             <a:r>
               <a:rPr lang="en-US" sz="1400" b="1" dirty="0" smtClean="0">
                 <a:latin typeface="Andale Mono" pitchFamily="-112" charset="0"/>
                 <a:ea typeface="굴림" pitchFamily="-112" charset="-127"/>
               </a:rPr>
-              <a:t>(   </a:t>
-            </a:r>
-            <a:r>
-              <a:rPr lang="en-US" sz="1400" b="1" dirty="0" err="1" smtClean="0">
-                <a:latin typeface="Andale Mono" pitchFamily="-112" charset="0"/>
-                <a:ea typeface="굴림" pitchFamily="-112" charset="-127"/>
-              </a:rPr>
-              <a:t>sendbuf,sendcount,sendtype,dest,sendtag</a:t>
-            </a:r>
-            <a:r>
-              <a:rPr lang="en-US" sz="1400" b="1" dirty="0" smtClean="0">
-                <a:latin typeface="Andale Mono" pitchFamily="-112" charset="0"/>
-                <a:ea typeface="굴림" pitchFamily="-112" charset="-127"/>
-              </a:rPr>
-              <a:t>,</a:t>
+              <a:t>(   sendbuf,count,MPI_REAL,1,tag,MPI_COMM_WORLD,ierr)</a:t>
             </a:r>
           </a:p>
           <a:p>
@@ -15132,35 +15017,24 @@
                 <a:latin typeface="Andale Mono" pitchFamily="-112" charset="0"/>
                 <a:ea typeface="굴림" pitchFamily="-112" charset="-127"/>
               </a:rPr>
-              <a:t>                                            </a:t>
+              <a:t>	call </a:t>
             </a:r>
             <a:r>
               <a:rPr lang="en-US" sz="1400" b="1" dirty="0" err="1" smtClean="0">
+                <a:solidFill>
+                  <a:srgbClr val="0070C0"/>
+                </a:solidFill>
                 <a:latin typeface="Andale Mono" pitchFamily="-112" charset="0"/>
                 <a:ea typeface="굴림" pitchFamily="-112" charset="-127"/>
               </a:rPr>
-              <a:t>recvbuf,recvcount</a:t>
+              <a:t>MPI_Recv</a:t>
             </a:r>
             <a:r>
               <a:rPr lang="en-US" sz="1400" b="1" dirty="0" smtClean="0">
                 <a:latin typeface="Andale Mono" pitchFamily="-112" charset="0"/>
                 <a:ea typeface="굴림" pitchFamily="-112" charset="-127"/>
               </a:rPr>
-              <a:t>, </a:t>
-            </a:r>
-            <a:r>
-              <a:rPr lang="en-US" sz="1400" b="1" dirty="0" err="1" smtClean="0">
-                <a:latin typeface="Andale Mono" pitchFamily="-112" charset="0"/>
-                <a:ea typeface="굴림" pitchFamily="-112" charset="-127"/>
-              </a:rPr>
-              <a:t>recvtype,source,recvtag,MPI_COMM_WORLD,status,ierr</a:t>
-            </a:r>
-            <a:r>
-              <a:rPr lang="en-US" sz="1400" b="1" dirty="0" smtClean="0">
-                <a:latin typeface="Andale Mono" pitchFamily="-112" charset="0"/>
-                <a:ea typeface="굴림" pitchFamily="-112" charset="-127"/>
-              </a:rPr>
-              <a:t>)</a:t>
+              <a:t>(      recvbuf,count,MPI_REAL,0,tag,MPI_COMM_WORLD,status,ierr)</a:t>
             </a:r>
           </a:p>
           <a:p>
@@ -15241,42 +15115,14 @@
                 <a:latin typeface="Andale Mono" pitchFamily="-112" charset="0"/>
                 <a:ea typeface="굴림" pitchFamily="-112" charset="-127"/>
               </a:rPr>
-              <a:t>MPI_SendRecv</a:t>
+              <a:t>MPI_BSend</a:t>
             </a:r>
             <a:r>
               <a:rPr lang="en-US" sz="1400" b="1" dirty="0" smtClean="0">
                 <a:latin typeface="Andale Mono" pitchFamily="-112" charset="0"/>
                 <a:ea typeface="굴림" pitchFamily="-112" charset="-127"/>
               </a:rPr>
-              <a:t>(   </a:t>
-            </a:r>
-            <a:r>
-              <a:rPr lang="en-US" sz="1400" b="1" dirty="0" err="1" smtClean="0">
-                <a:latin typeface="Andale Mono" pitchFamily="-112" charset="0"/>
-                <a:ea typeface="굴림" pitchFamily="-112" charset="-127"/>
-              </a:rPr>
-              <a:t>sendbuf,sendcount,sendtype</a:t>
-            </a:r>
-            <a:r>
-              <a:rPr lang="en-US" sz="1400" b="1" dirty="0" smtClean="0">
-                <a:latin typeface="Andale Mono" pitchFamily="-112" charset="0"/>
-                <a:ea typeface="굴림" pitchFamily="-112" charset="-127"/>
-              </a:rPr>
-              <a:t>   ,</a:t>
-            </a:r>
-            <a:r>
-              <a:rPr lang="en-US" sz="1400" b="1" dirty="0" err="1" smtClean="0">
-                <a:latin typeface="Andale Mono" pitchFamily="-112" charset="0"/>
-                <a:ea typeface="굴림" pitchFamily="-112" charset="-127"/>
-              </a:rPr>
-              <a:t>dest,sendtag</a:t>
-            </a:r>
-            <a:r>
-              <a:rPr lang="en-US" sz="1400" b="1" dirty="0" smtClean="0">
-                <a:latin typeface="Andale Mono" pitchFamily="-112" charset="0"/>
-                <a:ea typeface="굴림" pitchFamily="-112" charset="-127"/>
-              </a:rPr>
-              <a:t>,</a:t>
+              <a:t>(   sendbuf,count,MPI_REAL,1,tag,MPI_COMM_WORLD,ierr)</a:t>
             </a:r>
           </a:p>
           <a:p>
@@ -15308,35 +15154,24 @@
                 <a:latin typeface="Andale Mono" pitchFamily="-112" charset="0"/>
                 <a:ea typeface="굴림" pitchFamily="-112" charset="-127"/>
               </a:rPr>
-              <a:t>                                             </a:t>
+              <a:t>	call </a:t>
             </a:r>
             <a:r>
               <a:rPr lang="en-US" sz="1400" b="1" dirty="0" err="1" smtClean="0">
+                <a:solidFill>
+                  <a:srgbClr val="0070C0"/>
+                </a:solidFill>
                 <a:latin typeface="Andale Mono" pitchFamily="-112" charset="0"/>
                 <a:ea typeface="굴림" pitchFamily="-112" charset="-127"/>
               </a:rPr>
-              <a:t>recvbuf,recvcount</a:t>
+              <a:t>MPI_Recv</a:t>
             </a:r>
             <a:r>
               <a:rPr lang="en-US" sz="1400" b="1" dirty="0" smtClean="0">
                 <a:latin typeface="Andale Mono" pitchFamily="-112" charset="0"/>
                 <a:ea typeface="굴림" pitchFamily="-112" charset="-127"/>
               </a:rPr>
-              <a:t>, </a:t>
-            </a:r>
-            <a:r>
-              <a:rPr lang="en-US" sz="1400" b="1" dirty="0" err="1" smtClean="0">
-                <a:latin typeface="Andale Mono" pitchFamily="-112" charset="0"/>
-                <a:ea typeface="굴림" pitchFamily="-112" charset="-127"/>
-              </a:rPr>
-              <a:t>recvtype,source,recvtag,MPI_COMM_WORLD,status,ierr</a:t>
-            </a:r>
-            <a:r>
-              <a:rPr lang="en-US" sz="1400" b="1" dirty="0" smtClean="0">
-                <a:latin typeface="Andale Mono" pitchFamily="-112" charset="0"/>
-                <a:ea typeface="굴림" pitchFamily="-112" charset="-127"/>
-              </a:rPr>
-              <a:t>)</a:t>
+              <a:t>(      recvbuf,count,MPI_REAL,0,tag,MPI_COMM_WORLD,status,ierr)</a:t>
             </a:r>
           </a:p>
           <a:p>
@@ -15375,43 +15210,11 @@
               <a:ea typeface="굴림" pitchFamily="-112" charset="-127"/>
             </a:endParaRPr>
           </a:p>
-          <a:p>
-            <a:pPr marL="341313" indent="-341313" eaLnBrk="1" hangingPunct="1">
-              <a:lnSpc>
-                <a:spcPct val="90000"/>
-              </a:lnSpc>
-              <a:spcBef>
-                <a:spcPts val="875"/>
-              </a:spcBef>
-              <a:buFontTx/>
-              <a:buNone/>
-              <a:tabLst>
-                <a:tab pos="911225" algn="l"/>
-                <a:tab pos="1825625" algn="l"/>
-                <a:tab pos="2740025" algn="l"/>
-                <a:tab pos="3654425" algn="l"/>
-                <a:tab pos="4568825" algn="l"/>
-                <a:tab pos="5483225" algn="l"/>
-                <a:tab pos="6397625" algn="l"/>
-                <a:tab pos="7312025" algn="l"/>
-                <a:tab pos="8226425" algn="l"/>
-                <a:tab pos="9140825" algn="l"/>
-                <a:tab pos="10055225" algn="l"/>
-              </a:tabLst>
-            </a:pPr>
-            <a:endParaRPr lang="en-US" sz="1400" b="1" dirty="0" smtClean="0">
-              <a:solidFill>
-                <a:srgbClr val="000078"/>
-              </a:solidFill>
-              <a:latin typeface="Courier New" pitchFamily="-112" charset="0"/>
-              <a:ea typeface="굴림" pitchFamily="-112" charset="-127"/>
-            </a:endParaRPr>
-          </a:p>
         </p:txBody>
       </p:sp>
       <p:sp>
         <p:nvSpPr>
-          <p:cNvPr id="51204" name="Slide Number Placeholder 3"/>
+          <p:cNvPr id="52228" name="Slide Number Placeholder 3"/>
           <p:cNvSpPr>
             <a:spLocks noGrp="1"/>
           </p:cNvSpPr>
@@ -15447,7 +15250,7 @@
                 <a:tab pos="10058400" algn="l"/>
               </a:tabLst>
             </a:pPr>
-            <a:fld id="{4A2854C0-EE8F-4CC6-A1E8-03762C464260}" type="slidenum">
+            <a:fld id="{2C8552C0-902B-419B-8E80-218B2FAB1162}" type="slidenum">
               <a:rPr lang="en-US"/>
               <a:pPr>
                 <a:tabLst>
@@ -15526,1025 +15329,6 @@
       </p:grpSpPr>
       <p:sp>
         <p:nvSpPr>
-          <p:cNvPr id="52226" name="Rectangle 1"/>
-          <p:cNvSpPr>
-            <a:spLocks noGrp="1" noChangeArrowheads="1"/>
-          </p:cNvSpPr>
-          <p:nvPr>
-            <p:ph type="title"/>
-          </p:nvPr>
-        </p:nvSpPr>
-        <p:spPr>
-          <a:xfrm>
-            <a:off x="685800" y="0"/>
-            <a:ext cx="7772400" cy="1190625"/>
-          </a:xfrm>
-        </p:spPr>
-        <p:txBody>
-          <a:bodyPr/>
-          <a:lstStyle/>
-          <a:p>
-            <a:pPr eaLnBrk="1" hangingPunct="1">
-              <a:tabLst>
-                <a:tab pos="0" algn="l"/>
-                <a:tab pos="914400" algn="l"/>
-                <a:tab pos="1828800" algn="l"/>
-                <a:tab pos="2743200" algn="l"/>
-                <a:tab pos="3657600" algn="l"/>
-                <a:tab pos="4572000" algn="l"/>
-                <a:tab pos="5486400" algn="l"/>
-                <a:tab pos="6400800" algn="l"/>
-                <a:tab pos="7315200" algn="l"/>
-                <a:tab pos="8229600" algn="l"/>
-                <a:tab pos="9144000" algn="l"/>
-                <a:tab pos="10058400" algn="l"/>
-              </a:tabLst>
-            </a:pPr>
-            <a:r>
-              <a:rPr lang="en-US" sz="4000" dirty="0" smtClean="0">
-                <a:ea typeface="굴림" pitchFamily="-112" charset="-127"/>
-              </a:rPr>
-              <a:t>Two-way Communication: Solutions</a:t>
-            </a:r>
-          </a:p>
-        </p:txBody>
-      </p:sp>
-      <p:sp>
-        <p:nvSpPr>
-          <p:cNvPr id="52227" name="Rectangle 2"/>
-          <p:cNvSpPr>
-            <a:spLocks noGrp="1" noChangeArrowheads="1"/>
-          </p:cNvSpPr>
-          <p:nvPr>
-            <p:ph idx="1"/>
-          </p:nvPr>
-        </p:nvSpPr>
-        <p:spPr>
-          <a:xfrm>
-            <a:off x="465746" y="1414330"/>
-            <a:ext cx="7772400" cy="4876800"/>
-          </a:xfrm>
-        </p:spPr>
-        <p:txBody>
-          <a:bodyPr>
-            <a:normAutofit lnSpcReduction="10000"/>
-          </a:bodyPr>
-          <a:lstStyle/>
-          <a:p>
-            <a:pPr marL="341313" indent="-341313" eaLnBrk="1" hangingPunct="1">
-              <a:lnSpc>
-                <a:spcPct val="80000"/>
-              </a:lnSpc>
-              <a:spcBef>
-                <a:spcPts val="875"/>
-              </a:spcBef>
-              <a:buFont typeface="Arial" charset="0"/>
-              <a:buNone/>
-              <a:tabLst>
-                <a:tab pos="911225" algn="l"/>
-                <a:tab pos="1825625" algn="l"/>
-                <a:tab pos="2740025" algn="l"/>
-                <a:tab pos="3654425" algn="l"/>
-                <a:tab pos="4568825" algn="l"/>
-                <a:tab pos="5483225" algn="l"/>
-                <a:tab pos="6397625" algn="l"/>
-                <a:tab pos="7312025" algn="l"/>
-                <a:tab pos="8226425" algn="l"/>
-                <a:tab pos="9140825" algn="l"/>
-                <a:tab pos="10055225" algn="l"/>
-              </a:tabLst>
-            </a:pPr>
-            <a:r>
-              <a:rPr lang="en-US" sz="1600" b="1" dirty="0" smtClean="0">
-                <a:solidFill>
-                  <a:srgbClr val="0070C0"/>
-                </a:solidFill>
-                <a:ea typeface="굴림" pitchFamily="-112" charset="-127"/>
-              </a:rPr>
-              <a:t>Solution 3</a:t>
-            </a:r>
-          </a:p>
-          <a:p>
-            <a:pPr marL="341313" indent="-341313" eaLnBrk="1" hangingPunct="1">
-              <a:lnSpc>
-                <a:spcPct val="80000"/>
-              </a:lnSpc>
-              <a:spcBef>
-                <a:spcPts val="350"/>
-              </a:spcBef>
-              <a:buFontTx/>
-              <a:buNone/>
-              <a:tabLst>
-                <a:tab pos="911225" algn="l"/>
-                <a:tab pos="1825625" algn="l"/>
-                <a:tab pos="2740025" algn="l"/>
-                <a:tab pos="3654425" algn="l"/>
-                <a:tab pos="4568825" algn="l"/>
-                <a:tab pos="5483225" algn="l"/>
-                <a:tab pos="6397625" algn="l"/>
-                <a:tab pos="7312025" algn="l"/>
-                <a:tab pos="8226425" algn="l"/>
-                <a:tab pos="9140825" algn="l"/>
-                <a:tab pos="10055225" algn="l"/>
-              </a:tabLst>
-            </a:pPr>
-            <a:r>
-              <a:rPr lang="en-US" sz="1400" b="1" dirty="0" smtClean="0">
-                <a:latin typeface="Andale Mono" pitchFamily="-112" charset="0"/>
-                <a:ea typeface="굴림" pitchFamily="-112" charset="-127"/>
-              </a:rPr>
-              <a:t>if (rank==0) then</a:t>
-            </a:r>
-          </a:p>
-          <a:p>
-            <a:pPr marL="341313" indent="-341313" eaLnBrk="1" hangingPunct="1">
-              <a:lnSpc>
-                <a:spcPct val="80000"/>
-              </a:lnSpc>
-              <a:spcBef>
-                <a:spcPts val="350"/>
-              </a:spcBef>
-              <a:buFontTx/>
-              <a:buNone/>
-              <a:tabLst>
-                <a:tab pos="911225" algn="l"/>
-                <a:tab pos="1825625" algn="l"/>
-                <a:tab pos="2740025" algn="l"/>
-                <a:tab pos="3654425" algn="l"/>
-                <a:tab pos="4568825" algn="l"/>
-                <a:tab pos="5483225" algn="l"/>
-                <a:tab pos="6397625" algn="l"/>
-                <a:tab pos="7312025" algn="l"/>
-                <a:tab pos="8226425" algn="l"/>
-                <a:tab pos="9140825" algn="l"/>
-                <a:tab pos="10055225" algn="l"/>
-              </a:tabLst>
-            </a:pPr>
-            <a:r>
-              <a:rPr lang="en-US" sz="1400" b="1" dirty="0" smtClean="0">
-                <a:latin typeface="Andale Mono" pitchFamily="-112" charset="0"/>
-                <a:ea typeface="굴림" pitchFamily="-112" charset="-127"/>
-              </a:rPr>
-              <a:t>	call </a:t>
-            </a:r>
-            <a:r>
-              <a:rPr lang="en-US" sz="1400" b="1" dirty="0" err="1" smtClean="0">
-                <a:solidFill>
-                  <a:srgbClr val="0070C0"/>
-                </a:solidFill>
-                <a:latin typeface="Andale Mono" pitchFamily="-112" charset="0"/>
-                <a:ea typeface="굴림" pitchFamily="-112" charset="-127"/>
-              </a:rPr>
-              <a:t>MPI_ISend</a:t>
-            </a:r>
-            <a:r>
-              <a:rPr lang="en-US" sz="1400" b="1" dirty="0" smtClean="0">
-                <a:latin typeface="Andale Mono" pitchFamily="-112" charset="0"/>
-                <a:ea typeface="굴림" pitchFamily="-112" charset="-127"/>
-              </a:rPr>
-              <a:t>(   sendbuf,count,MPI_REAL,1,tag,MPI_COMM_WORLD,req1,ierr)</a:t>
-            </a:r>
-          </a:p>
-          <a:p>
-            <a:pPr marL="341313" indent="-341313" eaLnBrk="1" hangingPunct="1">
-              <a:lnSpc>
-                <a:spcPct val="80000"/>
-              </a:lnSpc>
-              <a:spcBef>
-                <a:spcPts val="350"/>
-              </a:spcBef>
-              <a:buFontTx/>
-              <a:buNone/>
-              <a:tabLst>
-                <a:tab pos="911225" algn="l"/>
-                <a:tab pos="1825625" algn="l"/>
-                <a:tab pos="2740025" algn="l"/>
-                <a:tab pos="3654425" algn="l"/>
-                <a:tab pos="4568825" algn="l"/>
-                <a:tab pos="5483225" algn="l"/>
-                <a:tab pos="6397625" algn="l"/>
-                <a:tab pos="7312025" algn="l"/>
-                <a:tab pos="8226425" algn="l"/>
-                <a:tab pos="9140825" algn="l"/>
-                <a:tab pos="10055225" algn="l"/>
-              </a:tabLst>
-            </a:pPr>
-            <a:r>
-              <a:rPr lang="en-US" sz="1400" b="1" dirty="0" smtClean="0">
-                <a:latin typeface="Andale Mono" pitchFamily="-112" charset="0"/>
-                <a:ea typeface="굴림" pitchFamily="-112" charset="-127"/>
-              </a:rPr>
-              <a:t>	call </a:t>
-            </a:r>
-            <a:r>
-              <a:rPr lang="en-US" sz="1400" b="1" dirty="0" err="1" smtClean="0">
-                <a:solidFill>
-                  <a:srgbClr val="0070C0"/>
-                </a:solidFill>
-                <a:latin typeface="Andale Mono" pitchFamily="-112" charset="0"/>
-                <a:ea typeface="굴림" pitchFamily="-112" charset="-127"/>
-              </a:rPr>
-              <a:t>MPI_IRecv</a:t>
-            </a:r>
-            <a:r>
-              <a:rPr lang="en-US" sz="1400" b="1" dirty="0" smtClean="0">
-                <a:latin typeface="Andale Mono" pitchFamily="-112" charset="0"/>
-                <a:ea typeface="굴림" pitchFamily="-112" charset="-127"/>
-              </a:rPr>
-              <a:t>(   recvbuf,count,MPI_REAL,0,tag,MPI_COMM_WORLD,req2,ierr)</a:t>
-            </a:r>
-          </a:p>
-          <a:p>
-            <a:pPr marL="341313" indent="-341313" eaLnBrk="1" hangingPunct="1">
-              <a:lnSpc>
-                <a:spcPct val="80000"/>
-              </a:lnSpc>
-              <a:spcBef>
-                <a:spcPts val="350"/>
-              </a:spcBef>
-              <a:buFontTx/>
-              <a:buNone/>
-              <a:tabLst>
-                <a:tab pos="911225" algn="l"/>
-                <a:tab pos="1825625" algn="l"/>
-                <a:tab pos="2740025" algn="l"/>
-                <a:tab pos="3654425" algn="l"/>
-                <a:tab pos="4568825" algn="l"/>
-                <a:tab pos="5483225" algn="l"/>
-                <a:tab pos="6397625" algn="l"/>
-                <a:tab pos="7312025" algn="l"/>
-                <a:tab pos="8226425" algn="l"/>
-                <a:tab pos="9140825" algn="l"/>
-                <a:tab pos="10055225" algn="l"/>
-              </a:tabLst>
-            </a:pPr>
-            <a:r>
-              <a:rPr lang="en-US" sz="1400" b="1" dirty="0" err="1" smtClean="0">
-                <a:latin typeface="Andale Mono" pitchFamily="-112" charset="0"/>
-                <a:ea typeface="굴림" pitchFamily="-112" charset="-127"/>
-              </a:rPr>
-              <a:t>elseif</a:t>
-            </a:r>
-            <a:r>
-              <a:rPr lang="en-US" sz="1400" b="1" dirty="0" smtClean="0">
-                <a:latin typeface="Andale Mono" pitchFamily="-112" charset="0"/>
-                <a:ea typeface="굴림" pitchFamily="-112" charset="-127"/>
-              </a:rPr>
-              <a:t> (rank==1) then</a:t>
-            </a:r>
-          </a:p>
-          <a:p>
-            <a:pPr marL="341313" indent="-341313" eaLnBrk="1" hangingPunct="1">
-              <a:lnSpc>
-                <a:spcPct val="80000"/>
-              </a:lnSpc>
-              <a:spcBef>
-                <a:spcPts val="350"/>
-              </a:spcBef>
-              <a:buFontTx/>
-              <a:buNone/>
-              <a:tabLst>
-                <a:tab pos="911225" algn="l"/>
-                <a:tab pos="1825625" algn="l"/>
-                <a:tab pos="2740025" algn="l"/>
-                <a:tab pos="3654425" algn="l"/>
-                <a:tab pos="4568825" algn="l"/>
-                <a:tab pos="5483225" algn="l"/>
-                <a:tab pos="6397625" algn="l"/>
-                <a:tab pos="7312025" algn="l"/>
-                <a:tab pos="8226425" algn="l"/>
-                <a:tab pos="9140825" algn="l"/>
-                <a:tab pos="10055225" algn="l"/>
-              </a:tabLst>
-            </a:pPr>
-            <a:r>
-              <a:rPr lang="en-US" sz="1400" b="1" dirty="0" smtClean="0">
-                <a:latin typeface="Andale Mono" pitchFamily="-112" charset="0"/>
-                <a:ea typeface="굴림" pitchFamily="-112" charset="-127"/>
-              </a:rPr>
-              <a:t>	call </a:t>
-            </a:r>
-            <a:r>
-              <a:rPr lang="en-US" sz="1400" b="1" dirty="0" err="1" smtClean="0">
-                <a:solidFill>
-                  <a:srgbClr val="0070C0"/>
-                </a:solidFill>
-                <a:latin typeface="Andale Mono" pitchFamily="-112" charset="0"/>
-                <a:ea typeface="굴림" pitchFamily="-112" charset="-127"/>
-              </a:rPr>
-              <a:t>MPI_ISend</a:t>
-            </a:r>
-            <a:r>
-              <a:rPr lang="en-US" sz="1400" b="1" dirty="0" smtClean="0">
-                <a:latin typeface="Andale Mono" pitchFamily="-112" charset="0"/>
-                <a:ea typeface="굴림" pitchFamily="-112" charset="-127"/>
-              </a:rPr>
-              <a:t>(   sendbuf,count,MPI_REAL,0,tag,MPI_COMM_WORLD,req1,ierr)</a:t>
-            </a:r>
-          </a:p>
-          <a:p>
-            <a:pPr marL="341313" indent="-341313" eaLnBrk="1" hangingPunct="1">
-              <a:lnSpc>
-                <a:spcPct val="80000"/>
-              </a:lnSpc>
-              <a:spcBef>
-                <a:spcPts val="350"/>
-              </a:spcBef>
-              <a:buFontTx/>
-              <a:buNone/>
-              <a:tabLst>
-                <a:tab pos="911225" algn="l"/>
-                <a:tab pos="1825625" algn="l"/>
-                <a:tab pos="2740025" algn="l"/>
-                <a:tab pos="3654425" algn="l"/>
-                <a:tab pos="4568825" algn="l"/>
-                <a:tab pos="5483225" algn="l"/>
-                <a:tab pos="6397625" algn="l"/>
-                <a:tab pos="7312025" algn="l"/>
-                <a:tab pos="8226425" algn="l"/>
-                <a:tab pos="9140825" algn="l"/>
-                <a:tab pos="10055225" algn="l"/>
-              </a:tabLst>
-            </a:pPr>
-            <a:r>
-              <a:rPr lang="en-US" sz="1400" b="1" dirty="0" smtClean="0">
-                <a:latin typeface="Andale Mono" pitchFamily="-112" charset="0"/>
-                <a:ea typeface="굴림" pitchFamily="-112" charset="-127"/>
-              </a:rPr>
-              <a:t>	call </a:t>
-            </a:r>
-            <a:r>
-              <a:rPr lang="en-US" sz="1400" b="1" dirty="0" err="1" smtClean="0">
-                <a:solidFill>
-                  <a:srgbClr val="0070C0"/>
-                </a:solidFill>
-                <a:latin typeface="Andale Mono" pitchFamily="-112" charset="0"/>
-                <a:ea typeface="굴림" pitchFamily="-112" charset="-127"/>
-              </a:rPr>
-              <a:t>MPI_IRecv</a:t>
-            </a:r>
-            <a:r>
-              <a:rPr lang="en-US" sz="1400" b="1" dirty="0" smtClean="0">
-                <a:latin typeface="Andale Mono" pitchFamily="-112" charset="0"/>
-                <a:ea typeface="굴림" pitchFamily="-112" charset="-127"/>
-              </a:rPr>
-              <a:t>(   recvbuf,count,MPI_REAL,1,tag,MPI_COMM_WORLD,req2,ierr)</a:t>
-            </a:r>
-          </a:p>
-          <a:p>
-            <a:pPr marL="341313" indent="-341313" eaLnBrk="1" hangingPunct="1">
-              <a:lnSpc>
-                <a:spcPct val="80000"/>
-              </a:lnSpc>
-              <a:spcBef>
-                <a:spcPts val="350"/>
-              </a:spcBef>
-              <a:buFontTx/>
-              <a:buNone/>
-              <a:tabLst>
-                <a:tab pos="911225" algn="l"/>
-                <a:tab pos="1825625" algn="l"/>
-                <a:tab pos="2740025" algn="l"/>
-                <a:tab pos="3654425" algn="l"/>
-                <a:tab pos="4568825" algn="l"/>
-                <a:tab pos="5483225" algn="l"/>
-                <a:tab pos="6397625" algn="l"/>
-                <a:tab pos="7312025" algn="l"/>
-                <a:tab pos="8226425" algn="l"/>
-                <a:tab pos="9140825" algn="l"/>
-                <a:tab pos="10055225" algn="l"/>
-              </a:tabLst>
-            </a:pPr>
-            <a:r>
-              <a:rPr lang="en-US" sz="1400" b="1" dirty="0" err="1" smtClean="0">
-                <a:latin typeface="Andale Mono" pitchFamily="-112" charset="0"/>
-                <a:ea typeface="굴림" pitchFamily="-112" charset="-127"/>
-              </a:rPr>
-              <a:t>endif</a:t>
-            </a:r>
-            <a:endParaRPr lang="en-US" sz="1400" b="1" dirty="0" smtClean="0">
-              <a:latin typeface="Andale Mono" pitchFamily="-112" charset="0"/>
-              <a:ea typeface="굴림" pitchFamily="-112" charset="-127"/>
-            </a:endParaRPr>
-          </a:p>
-          <a:p>
-            <a:pPr marL="341313" indent="-341313" eaLnBrk="1" hangingPunct="1">
-              <a:lnSpc>
-                <a:spcPct val="80000"/>
-              </a:lnSpc>
-              <a:spcBef>
-                <a:spcPts val="350"/>
-              </a:spcBef>
-              <a:buFontTx/>
-              <a:buNone/>
-              <a:tabLst>
-                <a:tab pos="911225" algn="l"/>
-                <a:tab pos="1825625" algn="l"/>
-                <a:tab pos="2740025" algn="l"/>
-                <a:tab pos="3654425" algn="l"/>
-                <a:tab pos="4568825" algn="l"/>
-                <a:tab pos="5483225" algn="l"/>
-                <a:tab pos="6397625" algn="l"/>
-                <a:tab pos="7312025" algn="l"/>
-                <a:tab pos="8226425" algn="l"/>
-                <a:tab pos="9140825" algn="l"/>
-                <a:tab pos="10055225" algn="l"/>
-              </a:tabLst>
-            </a:pPr>
-            <a:r>
-              <a:rPr lang="en-US" sz="1400" b="1" dirty="0" smtClean="0">
-                <a:latin typeface="Andale Mono" pitchFamily="-112" charset="0"/>
-                <a:ea typeface="굴림" pitchFamily="-112" charset="-127"/>
-              </a:rPr>
-              <a:t>        call </a:t>
-            </a:r>
-            <a:r>
-              <a:rPr lang="en-US" sz="1400" b="1" dirty="0" err="1" smtClean="0">
-                <a:solidFill>
-                  <a:srgbClr val="0070C0"/>
-                </a:solidFill>
-                <a:latin typeface="Andale Mono" pitchFamily="-112" charset="0"/>
-                <a:ea typeface="굴림" pitchFamily="-112" charset="-127"/>
-              </a:rPr>
-              <a:t>MPI_Wait</a:t>
-            </a:r>
-            <a:r>
-              <a:rPr lang="en-US" sz="1400" b="1" dirty="0" smtClean="0">
-                <a:latin typeface="Andale Mono" pitchFamily="-112" charset="0"/>
-                <a:ea typeface="굴림" pitchFamily="-112" charset="-127"/>
-              </a:rPr>
-              <a:t>(   req1,status,ierr)</a:t>
-            </a:r>
-          </a:p>
-          <a:p>
-            <a:pPr marL="341313" indent="-341313" eaLnBrk="1" hangingPunct="1">
-              <a:lnSpc>
-                <a:spcPct val="80000"/>
-              </a:lnSpc>
-              <a:spcBef>
-                <a:spcPts val="350"/>
-              </a:spcBef>
-              <a:buFontTx/>
-              <a:buNone/>
-              <a:tabLst>
-                <a:tab pos="911225" algn="l"/>
-                <a:tab pos="1825625" algn="l"/>
-                <a:tab pos="2740025" algn="l"/>
-                <a:tab pos="3654425" algn="l"/>
-                <a:tab pos="4568825" algn="l"/>
-                <a:tab pos="5483225" algn="l"/>
-                <a:tab pos="6397625" algn="l"/>
-                <a:tab pos="7312025" algn="l"/>
-                <a:tab pos="8226425" algn="l"/>
-                <a:tab pos="9140825" algn="l"/>
-                <a:tab pos="10055225" algn="l"/>
-              </a:tabLst>
-            </a:pPr>
-            <a:r>
-              <a:rPr lang="en-US" sz="1400" b="1" dirty="0" smtClean="0">
-                <a:latin typeface="Andale Mono" pitchFamily="-112" charset="0"/>
-                <a:ea typeface="굴림" pitchFamily="-112" charset="-127"/>
-              </a:rPr>
-              <a:t>        call </a:t>
-            </a:r>
-            <a:r>
-              <a:rPr lang="en-US" sz="1400" b="1" dirty="0" err="1" smtClean="0">
-                <a:solidFill>
-                  <a:srgbClr val="0070C0"/>
-                </a:solidFill>
-                <a:latin typeface="Andale Mono" pitchFamily="-112" charset="0"/>
-                <a:ea typeface="굴림" pitchFamily="-112" charset="-127"/>
-              </a:rPr>
-              <a:t>MPI_Wait</a:t>
-            </a:r>
-            <a:r>
-              <a:rPr lang="en-US" sz="1400" b="1" dirty="0" smtClean="0">
-                <a:latin typeface="Andale Mono" pitchFamily="-112" charset="0"/>
-                <a:ea typeface="굴림" pitchFamily="-112" charset="-127"/>
-              </a:rPr>
-              <a:t>(   req2,status,ierr)</a:t>
-            </a:r>
-          </a:p>
-          <a:p>
-            <a:pPr marL="341313" indent="-341313" eaLnBrk="1" hangingPunct="1">
-              <a:lnSpc>
-                <a:spcPct val="80000"/>
-              </a:lnSpc>
-              <a:spcBef>
-                <a:spcPts val="250"/>
-              </a:spcBef>
-              <a:buFontTx/>
-              <a:buNone/>
-              <a:tabLst>
-                <a:tab pos="911225" algn="l"/>
-                <a:tab pos="1825625" algn="l"/>
-                <a:tab pos="2740025" algn="l"/>
-                <a:tab pos="3654425" algn="l"/>
-                <a:tab pos="4568825" algn="l"/>
-                <a:tab pos="5483225" algn="l"/>
-                <a:tab pos="6397625" algn="l"/>
-                <a:tab pos="7312025" algn="l"/>
-                <a:tab pos="8226425" algn="l"/>
-                <a:tab pos="9140825" algn="l"/>
-                <a:tab pos="10055225" algn="l"/>
-              </a:tabLst>
-            </a:pPr>
-            <a:endParaRPr lang="en-US" sz="1050" b="1" dirty="0" smtClean="0">
-              <a:solidFill>
-                <a:srgbClr val="000078"/>
-              </a:solidFill>
-              <a:latin typeface="Courier New" pitchFamily="-112" charset="0"/>
-              <a:ea typeface="굴림" pitchFamily="-112" charset="-127"/>
-            </a:endParaRPr>
-          </a:p>
-          <a:p>
-            <a:pPr marL="341313" indent="-341313" eaLnBrk="1" hangingPunct="1">
-              <a:lnSpc>
-                <a:spcPct val="80000"/>
-              </a:lnSpc>
-              <a:spcBef>
-                <a:spcPts val="250"/>
-              </a:spcBef>
-              <a:buFontTx/>
-              <a:buNone/>
-              <a:tabLst>
-                <a:tab pos="911225" algn="l"/>
-                <a:tab pos="1825625" algn="l"/>
-                <a:tab pos="2740025" algn="l"/>
-                <a:tab pos="3654425" algn="l"/>
-                <a:tab pos="4568825" algn="l"/>
-                <a:tab pos="5483225" algn="l"/>
-                <a:tab pos="6397625" algn="l"/>
-                <a:tab pos="7312025" algn="l"/>
-                <a:tab pos="8226425" algn="l"/>
-                <a:tab pos="9140825" algn="l"/>
-                <a:tab pos="10055225" algn="l"/>
-              </a:tabLst>
-            </a:pPr>
-            <a:endParaRPr lang="en-US" sz="1050" b="1" dirty="0" smtClean="0">
-              <a:solidFill>
-                <a:srgbClr val="000078"/>
-              </a:solidFill>
-              <a:latin typeface="Courier New" pitchFamily="-112" charset="0"/>
-              <a:ea typeface="굴림" pitchFamily="-112" charset="-127"/>
-            </a:endParaRPr>
-          </a:p>
-          <a:p>
-            <a:pPr marL="341313" indent="-341313" eaLnBrk="1" hangingPunct="1">
-              <a:lnSpc>
-                <a:spcPct val="80000"/>
-              </a:lnSpc>
-              <a:spcBef>
-                <a:spcPts val="875"/>
-              </a:spcBef>
-              <a:buFont typeface="Arial" charset="0"/>
-              <a:buNone/>
-              <a:tabLst>
-                <a:tab pos="911225" algn="l"/>
-                <a:tab pos="1825625" algn="l"/>
-                <a:tab pos="2740025" algn="l"/>
-                <a:tab pos="3654425" algn="l"/>
-                <a:tab pos="4568825" algn="l"/>
-                <a:tab pos="5483225" algn="l"/>
-                <a:tab pos="6397625" algn="l"/>
-                <a:tab pos="7312025" algn="l"/>
-                <a:tab pos="8226425" algn="l"/>
-                <a:tab pos="9140825" algn="l"/>
-                <a:tab pos="10055225" algn="l"/>
-              </a:tabLst>
-            </a:pPr>
-            <a:r>
-              <a:rPr lang="en-US" sz="1800" b="1" dirty="0" smtClean="0">
-                <a:solidFill>
-                  <a:srgbClr val="0070C0"/>
-                </a:solidFill>
-                <a:ea typeface="굴림" pitchFamily="-112" charset="-127"/>
-              </a:rPr>
-              <a:t>Solution 4</a:t>
-            </a:r>
-          </a:p>
-          <a:p>
-            <a:pPr marL="341313" indent="-341313" eaLnBrk="1" hangingPunct="1">
-              <a:lnSpc>
-                <a:spcPct val="80000"/>
-              </a:lnSpc>
-              <a:spcBef>
-                <a:spcPts val="350"/>
-              </a:spcBef>
-              <a:buFontTx/>
-              <a:buNone/>
-              <a:tabLst>
-                <a:tab pos="911225" algn="l"/>
-                <a:tab pos="1825625" algn="l"/>
-                <a:tab pos="2740025" algn="l"/>
-                <a:tab pos="3654425" algn="l"/>
-                <a:tab pos="4568825" algn="l"/>
-                <a:tab pos="5483225" algn="l"/>
-                <a:tab pos="6397625" algn="l"/>
-                <a:tab pos="7312025" algn="l"/>
-                <a:tab pos="8226425" algn="l"/>
-                <a:tab pos="9140825" algn="l"/>
-                <a:tab pos="10055225" algn="l"/>
-              </a:tabLst>
-            </a:pPr>
-            <a:r>
-              <a:rPr lang="en-US" sz="1400" b="1" dirty="0" smtClean="0">
-                <a:latin typeface="Andale Mono" pitchFamily="-112" charset="0"/>
-                <a:ea typeface="굴림" pitchFamily="-112" charset="-127"/>
-              </a:rPr>
-              <a:t>if (rank==0) then</a:t>
-            </a:r>
-          </a:p>
-          <a:p>
-            <a:pPr marL="341313" indent="-341313" eaLnBrk="1" hangingPunct="1">
-              <a:lnSpc>
-                <a:spcPct val="80000"/>
-              </a:lnSpc>
-              <a:spcBef>
-                <a:spcPts val="350"/>
-              </a:spcBef>
-              <a:buFontTx/>
-              <a:buNone/>
-              <a:tabLst>
-                <a:tab pos="911225" algn="l"/>
-                <a:tab pos="1825625" algn="l"/>
-                <a:tab pos="2740025" algn="l"/>
-                <a:tab pos="3654425" algn="l"/>
-                <a:tab pos="4568825" algn="l"/>
-                <a:tab pos="5483225" algn="l"/>
-                <a:tab pos="6397625" algn="l"/>
-                <a:tab pos="7312025" algn="l"/>
-                <a:tab pos="8226425" algn="l"/>
-                <a:tab pos="9140825" algn="l"/>
-                <a:tab pos="10055225" algn="l"/>
-              </a:tabLst>
-            </a:pPr>
-            <a:r>
-              <a:rPr lang="en-US" sz="1400" b="1" dirty="0" smtClean="0">
-                <a:latin typeface="Andale Mono" pitchFamily="-112" charset="0"/>
-                <a:ea typeface="굴림" pitchFamily="-112" charset="-127"/>
-              </a:rPr>
-              <a:t>	call </a:t>
-            </a:r>
-            <a:r>
-              <a:rPr lang="en-US" sz="1400" b="1" dirty="0" err="1" smtClean="0">
-                <a:solidFill>
-                  <a:srgbClr val="0070C0"/>
-                </a:solidFill>
-                <a:latin typeface="Andale Mono" pitchFamily="-112" charset="0"/>
-                <a:ea typeface="굴림" pitchFamily="-112" charset="-127"/>
-              </a:rPr>
-              <a:t>MPI_BSend</a:t>
-            </a:r>
-            <a:r>
-              <a:rPr lang="en-US" sz="1400" b="1" dirty="0" smtClean="0">
-                <a:latin typeface="Andale Mono" pitchFamily="-112" charset="0"/>
-                <a:ea typeface="굴림" pitchFamily="-112" charset="-127"/>
-              </a:rPr>
-              <a:t>(   sendbuf,count,MPI_REAL,1,tag,MPI_COMM_WORLD,ierr)</a:t>
-            </a:r>
-          </a:p>
-          <a:p>
-            <a:pPr marL="341313" indent="-341313" eaLnBrk="1" hangingPunct="1">
-              <a:lnSpc>
-                <a:spcPct val="80000"/>
-              </a:lnSpc>
-              <a:spcBef>
-                <a:spcPts val="350"/>
-              </a:spcBef>
-              <a:buFontTx/>
-              <a:buNone/>
-              <a:tabLst>
-                <a:tab pos="911225" algn="l"/>
-                <a:tab pos="1825625" algn="l"/>
-                <a:tab pos="2740025" algn="l"/>
-                <a:tab pos="3654425" algn="l"/>
-                <a:tab pos="4568825" algn="l"/>
-                <a:tab pos="5483225" algn="l"/>
-                <a:tab pos="6397625" algn="l"/>
-                <a:tab pos="7312025" algn="l"/>
-                <a:tab pos="8226425" algn="l"/>
-                <a:tab pos="9140825" algn="l"/>
-                <a:tab pos="10055225" algn="l"/>
-              </a:tabLst>
-            </a:pPr>
-            <a:r>
-              <a:rPr lang="en-US" sz="1400" b="1" dirty="0" smtClean="0">
-                <a:latin typeface="Andale Mono" pitchFamily="-112" charset="0"/>
-                <a:ea typeface="굴림" pitchFamily="-112" charset="-127"/>
-              </a:rPr>
-              <a:t>	call </a:t>
-            </a:r>
-            <a:r>
-              <a:rPr lang="en-US" sz="1400" b="1" dirty="0" err="1" smtClean="0">
-                <a:solidFill>
-                  <a:srgbClr val="0070C0"/>
-                </a:solidFill>
-                <a:latin typeface="Andale Mono" pitchFamily="-112" charset="0"/>
-                <a:ea typeface="굴림" pitchFamily="-112" charset="-127"/>
-              </a:rPr>
-              <a:t>MPI_Recv</a:t>
-            </a:r>
-            <a:r>
-              <a:rPr lang="en-US" sz="1400" b="1" dirty="0" smtClean="0">
-                <a:latin typeface="Andale Mono" pitchFamily="-112" charset="0"/>
-                <a:ea typeface="굴림" pitchFamily="-112" charset="-127"/>
-              </a:rPr>
-              <a:t>(      recvbuf,count,MPI_REAL,0,tag,MPI_COMM_WORLD,status,ierr)</a:t>
-            </a:r>
-          </a:p>
-          <a:p>
-            <a:pPr marL="341313" indent="-341313" eaLnBrk="1" hangingPunct="1">
-              <a:lnSpc>
-                <a:spcPct val="80000"/>
-              </a:lnSpc>
-              <a:spcBef>
-                <a:spcPts val="350"/>
-              </a:spcBef>
-              <a:buFontTx/>
-              <a:buNone/>
-              <a:tabLst>
-                <a:tab pos="911225" algn="l"/>
-                <a:tab pos="1825625" algn="l"/>
-                <a:tab pos="2740025" algn="l"/>
-                <a:tab pos="3654425" algn="l"/>
-                <a:tab pos="4568825" algn="l"/>
-                <a:tab pos="5483225" algn="l"/>
-                <a:tab pos="6397625" algn="l"/>
-                <a:tab pos="7312025" algn="l"/>
-                <a:tab pos="8226425" algn="l"/>
-                <a:tab pos="9140825" algn="l"/>
-                <a:tab pos="10055225" algn="l"/>
-              </a:tabLst>
-            </a:pPr>
-            <a:r>
-              <a:rPr lang="en-US" sz="1400" b="1" dirty="0" err="1" smtClean="0">
-                <a:latin typeface="Andale Mono" pitchFamily="-112" charset="0"/>
-                <a:ea typeface="굴림" pitchFamily="-112" charset="-127"/>
-              </a:rPr>
-              <a:t>elseif</a:t>
-            </a:r>
-            <a:r>
-              <a:rPr lang="en-US" sz="1400" b="1" dirty="0" smtClean="0">
-                <a:latin typeface="Andale Mono" pitchFamily="-112" charset="0"/>
-                <a:ea typeface="굴림" pitchFamily="-112" charset="-127"/>
-              </a:rPr>
-              <a:t> (rank==1) then</a:t>
-            </a:r>
-          </a:p>
-          <a:p>
-            <a:pPr marL="341313" indent="-341313" eaLnBrk="1" hangingPunct="1">
-              <a:lnSpc>
-                <a:spcPct val="80000"/>
-              </a:lnSpc>
-              <a:spcBef>
-                <a:spcPts val="350"/>
-              </a:spcBef>
-              <a:buFontTx/>
-              <a:buNone/>
-              <a:tabLst>
-                <a:tab pos="911225" algn="l"/>
-                <a:tab pos="1825625" algn="l"/>
-                <a:tab pos="2740025" algn="l"/>
-                <a:tab pos="3654425" algn="l"/>
-                <a:tab pos="4568825" algn="l"/>
-                <a:tab pos="5483225" algn="l"/>
-                <a:tab pos="6397625" algn="l"/>
-                <a:tab pos="7312025" algn="l"/>
-                <a:tab pos="8226425" algn="l"/>
-                <a:tab pos="9140825" algn="l"/>
-                <a:tab pos="10055225" algn="l"/>
-              </a:tabLst>
-            </a:pPr>
-            <a:r>
-              <a:rPr lang="en-US" sz="1400" b="1" dirty="0" smtClean="0">
-                <a:latin typeface="Andale Mono" pitchFamily="-112" charset="0"/>
-                <a:ea typeface="굴림" pitchFamily="-112" charset="-127"/>
-              </a:rPr>
-              <a:t>	call </a:t>
-            </a:r>
-            <a:r>
-              <a:rPr lang="en-US" sz="1400" b="1" dirty="0" err="1" smtClean="0">
-                <a:solidFill>
-                  <a:srgbClr val="0070C0"/>
-                </a:solidFill>
-                <a:latin typeface="Andale Mono" pitchFamily="-112" charset="0"/>
-                <a:ea typeface="굴림" pitchFamily="-112" charset="-127"/>
-              </a:rPr>
-              <a:t>MPI_BSend</a:t>
-            </a:r>
-            <a:r>
-              <a:rPr lang="en-US" sz="1400" b="1" dirty="0" smtClean="0">
-                <a:latin typeface="Andale Mono" pitchFamily="-112" charset="0"/>
-                <a:ea typeface="굴림" pitchFamily="-112" charset="-127"/>
-              </a:rPr>
-              <a:t>(   sendbuf,count,MPI_REAL,1,tag,MPI_COMM_WORLD,ierr)</a:t>
-            </a:r>
-          </a:p>
-          <a:p>
-            <a:pPr marL="341313" indent="-341313" eaLnBrk="1" hangingPunct="1">
-              <a:lnSpc>
-                <a:spcPct val="80000"/>
-              </a:lnSpc>
-              <a:spcBef>
-                <a:spcPts val="350"/>
-              </a:spcBef>
-              <a:buFontTx/>
-              <a:buNone/>
-              <a:tabLst>
-                <a:tab pos="911225" algn="l"/>
-                <a:tab pos="1825625" algn="l"/>
-                <a:tab pos="2740025" algn="l"/>
-                <a:tab pos="3654425" algn="l"/>
-                <a:tab pos="4568825" algn="l"/>
-                <a:tab pos="5483225" algn="l"/>
-                <a:tab pos="6397625" algn="l"/>
-                <a:tab pos="7312025" algn="l"/>
-                <a:tab pos="8226425" algn="l"/>
-                <a:tab pos="9140825" algn="l"/>
-                <a:tab pos="10055225" algn="l"/>
-              </a:tabLst>
-            </a:pPr>
-            <a:r>
-              <a:rPr lang="en-US" sz="1400" b="1" dirty="0" smtClean="0">
-                <a:latin typeface="Andale Mono" pitchFamily="-112" charset="0"/>
-                <a:ea typeface="굴림" pitchFamily="-112" charset="-127"/>
-              </a:rPr>
-              <a:t>	call </a:t>
-            </a:r>
-            <a:r>
-              <a:rPr lang="en-US" sz="1400" b="1" dirty="0" err="1" smtClean="0">
-                <a:solidFill>
-                  <a:srgbClr val="0070C0"/>
-                </a:solidFill>
-                <a:latin typeface="Andale Mono" pitchFamily="-112" charset="0"/>
-                <a:ea typeface="굴림" pitchFamily="-112" charset="-127"/>
-              </a:rPr>
-              <a:t>MPI_Recv</a:t>
-            </a:r>
-            <a:r>
-              <a:rPr lang="en-US" sz="1400" b="1" dirty="0" smtClean="0">
-                <a:latin typeface="Andale Mono" pitchFamily="-112" charset="0"/>
-                <a:ea typeface="굴림" pitchFamily="-112" charset="-127"/>
-              </a:rPr>
-              <a:t>(      recvbuf,count,MPI_REAL,0,tag,MPI_COMM_WORLD,status,ierr)</a:t>
-            </a:r>
-          </a:p>
-          <a:p>
-            <a:pPr marL="341313" indent="-341313" eaLnBrk="1" hangingPunct="1">
-              <a:lnSpc>
-                <a:spcPct val="80000"/>
-              </a:lnSpc>
-              <a:spcBef>
-                <a:spcPts val="350"/>
-              </a:spcBef>
-              <a:buFontTx/>
-              <a:buNone/>
-              <a:tabLst>
-                <a:tab pos="911225" algn="l"/>
-                <a:tab pos="1825625" algn="l"/>
-                <a:tab pos="2740025" algn="l"/>
-                <a:tab pos="3654425" algn="l"/>
-                <a:tab pos="4568825" algn="l"/>
-                <a:tab pos="5483225" algn="l"/>
-                <a:tab pos="6397625" algn="l"/>
-                <a:tab pos="7312025" algn="l"/>
-                <a:tab pos="8226425" algn="l"/>
-                <a:tab pos="9140825" algn="l"/>
-                <a:tab pos="10055225" algn="l"/>
-              </a:tabLst>
-            </a:pPr>
-            <a:r>
-              <a:rPr lang="en-US" sz="1400" b="1" dirty="0" err="1" smtClean="0">
-                <a:latin typeface="Andale Mono" pitchFamily="-112" charset="0"/>
-                <a:ea typeface="굴림" pitchFamily="-112" charset="-127"/>
-              </a:rPr>
-              <a:t>endif</a:t>
-            </a:r>
-            <a:endParaRPr lang="en-US" sz="1400" b="1" dirty="0" smtClean="0">
-              <a:latin typeface="Andale Mono" pitchFamily="-112" charset="0"/>
-              <a:ea typeface="굴림" pitchFamily="-112" charset="-127"/>
-            </a:endParaRPr>
-          </a:p>
-        </p:txBody>
-      </p:sp>
-      <p:sp>
-        <p:nvSpPr>
-          <p:cNvPr id="52228" name="Slide Number Placeholder 3"/>
-          <p:cNvSpPr>
-            <a:spLocks noGrp="1"/>
-          </p:cNvSpPr>
-          <p:nvPr>
-            <p:ph type="sldNum" sz="quarter" idx="12"/>
-          </p:nvPr>
-        </p:nvSpPr>
-        <p:spPr bwMode="auto">
-          <a:noFill/>
-          <a:ln>
-            <a:miter lim="800000"/>
-            <a:headEnd/>
-            <a:tailEnd/>
-          </a:ln>
-        </p:spPr>
-        <p:txBody>
-          <a:bodyPr/>
-          <a:lstStyle/>
-          <a:p>
-            <a:pPr>
-              <a:tabLst>
-                <a:tab pos="0" algn="l"/>
-                <a:tab pos="914400" algn="l"/>
-                <a:tab pos="1828800" algn="l"/>
-                <a:tab pos="2743200" algn="l"/>
-                <a:tab pos="3657600" algn="l"/>
-                <a:tab pos="4572000" algn="l"/>
-                <a:tab pos="5486400" algn="l"/>
-                <a:tab pos="6400800" algn="l"/>
-                <a:tab pos="7315200" algn="l"/>
-                <a:tab pos="8229600" algn="l"/>
-                <a:tab pos="9144000" algn="l"/>
-                <a:tab pos="10058400" algn="l"/>
-              </a:tabLst>
-            </a:pPr>
-            <a:fld id="{2C8552C0-902B-419B-8E80-218B2FAB1162}" type="slidenum">
-              <a:rPr lang="en-US"/>
-              <a:pPr>
-                <a:tabLst>
-                  <a:tab pos="0" algn="l"/>
-                  <a:tab pos="914400" algn="l"/>
-                  <a:tab pos="1828800" algn="l"/>
-                  <a:tab pos="2743200" algn="l"/>
-                  <a:tab pos="3657600" algn="l"/>
-                  <a:tab pos="4572000" algn="l"/>
-                  <a:tab pos="5486400" algn="l"/>
-                  <a:tab pos="6400800" algn="l"/>
-                  <a:tab pos="7315200" algn="l"/>
-                  <a:tab pos="8229600" algn="l"/>
-                  <a:tab pos="9144000" algn="l"/>
-                  <a:tab pos="10058400" algn="l"/>
-                </a:tabLst>
-              </a:pPr>
-              <a:t>24</a:t>
-            </a:fld>
-            <a:endParaRPr lang="en-US"/>
-          </a:p>
-        </p:txBody>
-      </p:sp>
-    </p:spTree>
-  </p:cSld>
-  <p:clrMapOvr>
-    <a:masterClrMapping/>
-  </p:clrMapOvr>
-  <p:transition xmlns:p14="http://schemas.microsoft.com/office/powerpoint/2010/main" spd="med"/>
-  <p:timing>
-    <p:tnLst>
-      <p:par>
-        <p:cTn xmlns:p14="http://schemas.microsoft.com/office/powerpoint/2010/main" id="1" dur="indefinite" restart="never" nodeType="tmRoot">
-          <p:childTnLst>
-            <p:seq concurrent="1" nextAc="seek">
-              <p:cTn id="2" dur="0" nodeType="mainSeq"/>
-              <p:prevCondLst>
-                <p:cond evt="onPrev" delay="0">
-                  <p:tgtEl>
-                    <p:sldTgt/>
-                  </p:tgtEl>
-                </p:cond>
-              </p:prevCondLst>
-              <p:nextCondLst>
-                <p:cond evt="onNext" delay="0">
-                  <p:tgtEl>
-                    <p:sldTgt/>
-                  </p:tgtEl>
-                </p:cond>
-              </p:nextCondLst>
-            </p:seq>
-          </p:childTnLst>
-        </p:cTn>
-      </p:par>
-    </p:tnLst>
-  </p:timing>
-</p:sld>
-</file>
-
-<file path=ppt/slides/slide25.xml><?xml version="1.0" encoding="utf-8"?>
-<p:sld xmlns:a="http://schemas.openxmlformats.org/drawingml/2006/main" xmlns:r="http://schemas.openxmlformats.org/officeDocument/2006/relationships" xmlns:p="http://schemas.openxmlformats.org/presentationml/2006/main">
-  <p:cSld>
-    <p:spTree>
-      <p:nvGrpSpPr>
-        <p:cNvPr id="1" name=""/>
-        <p:cNvGrpSpPr/>
-        <p:nvPr/>
-      </p:nvGrpSpPr>
-      <p:grpSpPr>
-        <a:xfrm>
-          <a:off x="0" y="0"/>
-          <a:ext cx="0" cy="0"/>
-          <a:chOff x="0" y="0"/>
-          <a:chExt cx="0" cy="0"/>
-        </a:xfrm>
-      </p:grpSpPr>
-      <p:sp>
-        <p:nvSpPr>
           <p:cNvPr id="53250" name="Rectangle 1"/>
           <p:cNvSpPr>
             <a:spLocks noGrp="1" noChangeArrowheads="1"/>
@@ -16644,7 +15428,7 @@
                   <a:tab pos="10058400" algn="l"/>
                 </a:tabLst>
               </a:pPr>
-              <a:t>25</a:t>
+              <a:t>24</a:t>
             </a:fld>
             <a:endParaRPr lang="en-US"/>
           </a:p>
@@ -18054,6 +16838,171 @@
 </p:sld>
 </file>
 
+<file path=ppt/slides/slide25.xml><?xml version="1.0" encoding="utf-8"?>
+<p:sld xmlns:a="http://schemas.openxmlformats.org/drawingml/2006/main" xmlns:r="http://schemas.openxmlformats.org/officeDocument/2006/relationships" xmlns:p="http://schemas.openxmlformats.org/presentationml/2006/main">
+  <p:cSld>
+    <p:spTree>
+      <p:nvGrpSpPr>
+        <p:cNvPr id="1" name=""/>
+        <p:cNvGrpSpPr/>
+        <p:nvPr/>
+      </p:nvGrpSpPr>
+      <p:grpSpPr>
+        <a:xfrm>
+          <a:off x="0" y="0"/>
+          <a:ext cx="0" cy="0"/>
+          <a:chOff x="0" y="0"/>
+          <a:chExt cx="0" cy="0"/>
+        </a:xfrm>
+      </p:grpSpPr>
+      <p:sp>
+        <p:nvSpPr>
+          <p:cNvPr id="2" name="Title 1"/>
+          <p:cNvSpPr>
+            <a:spLocks noGrp="1"/>
+          </p:cNvSpPr>
+          <p:nvPr>
+            <p:ph type="title"/>
+          </p:nvPr>
+        </p:nvSpPr>
+        <p:spPr/>
+        <p:txBody>
+          <a:bodyPr/>
+          <a:lstStyle/>
+          <a:p>
+            <a:r>
+              <a:rPr lang="en-US" dirty="0" smtClean="0"/>
+              <a:t>Wait types</a:t>
+            </a:r>
+            <a:endParaRPr lang="en-US" dirty="0"/>
+          </a:p>
+        </p:txBody>
+      </p:sp>
+      <p:sp>
+        <p:nvSpPr>
+          <p:cNvPr id="3" name="Content Placeholder 2"/>
+          <p:cNvSpPr>
+            <a:spLocks noGrp="1"/>
+          </p:cNvSpPr>
+          <p:nvPr>
+            <p:ph idx="1"/>
+          </p:nvPr>
+        </p:nvSpPr>
+        <p:spPr/>
+        <p:txBody>
+          <a:bodyPr>
+            <a:normAutofit lnSpcReduction="10000"/>
+          </a:bodyPr>
+          <a:lstStyle/>
+          <a:p>
+            <a:r>
+              <a:rPr lang="en-US" dirty="0" err="1" smtClean="0">
+                <a:latin typeface="Arial"/>
+                <a:cs typeface="Arial"/>
+              </a:rPr>
+              <a:t>MPI_Wait</a:t>
+            </a:r>
+            <a:r>
+              <a:rPr lang="en-US" dirty="0" smtClean="0"/>
+              <a:t> : wait for one request</a:t>
+            </a:r>
+          </a:p>
+          <a:p>
+            <a:r>
+              <a:rPr lang="en-US" dirty="0" err="1" smtClean="0">
+                <a:latin typeface="Arial"/>
+                <a:cs typeface="Arial"/>
+              </a:rPr>
+              <a:t>MPI_Waitall</a:t>
+            </a:r>
+            <a:r>
+              <a:rPr lang="en-US" dirty="0" smtClean="0"/>
+              <a:t> : wait for an array of requests, good for load balanced tasks, or when all needed</a:t>
+            </a:r>
+          </a:p>
+          <a:p>
+            <a:r>
+              <a:rPr lang="en-US" dirty="0" err="1" smtClean="0">
+                <a:latin typeface="Arial"/>
+                <a:cs typeface="Arial"/>
+              </a:rPr>
+              <a:t>MPI_Waitany</a:t>
+            </a:r>
+            <a:r>
+              <a:rPr lang="en-US" dirty="0" smtClean="0"/>
+              <a:t> : wait for one in an array of requests, good for unbalanced tasks, or if they can be processed individually</a:t>
+            </a:r>
+          </a:p>
+          <a:p>
+            <a:r>
+              <a:rPr lang="en-US" dirty="0" err="1" smtClean="0">
+                <a:latin typeface="Arial"/>
+                <a:cs typeface="Arial"/>
+              </a:rPr>
+              <a:t>MPI_Waitsome</a:t>
+            </a:r>
+            <a:r>
+              <a:rPr lang="en-US" dirty="0" smtClean="0"/>
+              <a:t> : wait for any number in an array, much like </a:t>
+            </a:r>
+            <a:r>
+              <a:rPr lang="en-US" dirty="0" err="1" smtClean="0">
+                <a:latin typeface="Arial"/>
+                <a:cs typeface="Arial"/>
+              </a:rPr>
+              <a:t>MPI_Waitany</a:t>
+            </a:r>
+            <a:r>
+              <a:rPr lang="en-US" dirty="0" smtClean="0">
+                <a:latin typeface="Arial"/>
+                <a:cs typeface="Arial"/>
+              </a:rPr>
+              <a:t> </a:t>
+            </a:r>
+            <a:endParaRPr lang="en-US" dirty="0">
+              <a:latin typeface="Arial"/>
+              <a:cs typeface="Arial"/>
+            </a:endParaRPr>
+          </a:p>
+        </p:txBody>
+      </p:sp>
+      <p:sp>
+        <p:nvSpPr>
+          <p:cNvPr id="4" name="Slide Number Placeholder 3"/>
+          <p:cNvSpPr>
+            <a:spLocks noGrp="1"/>
+          </p:cNvSpPr>
+          <p:nvPr>
+            <p:ph type="sldNum" sz="quarter" idx="12"/>
+          </p:nvPr>
+        </p:nvSpPr>
+        <p:spPr/>
+        <p:txBody>
+          <a:bodyPr/>
+          <a:lstStyle/>
+          <a:p>
+            <a:fld id="{7B90F24A-6679-4F21-A41E-0DBEFD6DC596}" type="slidenum">
+              <a:rPr lang="en-US" smtClean="0"/>
+              <a:pPr/>
+              <a:t>25</a:t>
+            </a:fld>
+            <a:endParaRPr lang="en-US" dirty="0"/>
+          </a:p>
+        </p:txBody>
+      </p:sp>
+    </p:spTree>
+    <p:extLst>
+      <p:ext uri="{BB962C8B-B14F-4D97-AF65-F5344CB8AC3E}">
+        <p14:creationId xmlns:p14="http://schemas.microsoft.com/office/powerpoint/2010/main" val="460115824"/>
+      </p:ext>
+    </p:extLst>
+  </p:cSld>
+  <p:clrMapOvr>
+    <a:masterClrMapping/>
+  </p:clrMapOvr>
+</p:sld>
+</file>
+
 <file path=ppt/slides/slide26.xml><?xml version="1.0" encoding="utf-8"?>
 <p:sld xmlns:a="http://schemas.openxmlformats.org/drawingml/2006/main" xmlns:r="http://schemas.openxmlformats.org/officeDocument/2006/relationships" xmlns:p="http://schemas.openxmlformats.org/presentationml/2006/main">
   <p:cSld>
@@ -18088,97 +17037,9 @@
           <a:p>
             <a:r>
               <a:rPr lang="en-US" dirty="0" smtClean="0"/>
-              <a:t>Wait types</a:t>
+              <a:t>One-Sided or RMA</a:t>
             </a:r>
             <a:endParaRPr lang="en-US" dirty="0"/>
-          </a:p>
-        </p:txBody>
-      </p:sp>
-      <p:sp>
-        <p:nvSpPr>
-          <p:cNvPr id="3" name="Content Placeholder 2"/>
-          <p:cNvSpPr>
-            <a:spLocks noGrp="1"/>
-          </p:cNvSpPr>
-          <p:nvPr>
-            <p:ph idx="1"/>
-          </p:nvPr>
-        </p:nvSpPr>
-        <p:spPr/>
-        <p:txBody>
-          <a:bodyPr>
-            <a:normAutofit lnSpcReduction="10000"/>
-          </a:bodyPr>
-          <a:lstStyle/>
-          <a:p>
-            <a:r>
-              <a:rPr lang="en-US" dirty="0" err="1" smtClean="0">
-                <a:latin typeface="Arial"/>
-                <a:cs typeface="Arial"/>
-              </a:rPr>
-              <a:t>MPI_Wait</a:t>
-            </a:r>
-            <a:r>
-              <a:rPr lang="en-US" dirty="0" smtClean="0"/>
-              <a:t> : wait for one request</a:t>
-            </a:r>
-          </a:p>
-          <a:p>
-            <a:r>
-              <a:rPr lang="en-US" dirty="0" err="1" smtClean="0">
-                <a:latin typeface="Arial"/>
-                <a:cs typeface="Arial"/>
-              </a:rPr>
-              <a:t>MPI_Waitall</a:t>
-            </a:r>
-            <a:r>
-              <a:rPr lang="en-US" dirty="0" smtClean="0"/>
-              <a:t> : wait for an array of requests, good for load balanced tasks, or when all needed</a:t>
-            </a:r>
-          </a:p>
-          <a:p>
-            <a:r>
-              <a:rPr lang="en-US" dirty="0" err="1" smtClean="0">
-                <a:latin typeface="Arial"/>
-                <a:cs typeface="Arial"/>
-              </a:rPr>
-              <a:t>MPI_Waitany</a:t>
-            </a:r>
-            <a:r>
-              <a:rPr lang="en-US" dirty="0" smtClean="0"/>
-              <a:t> : wait for one in an array of requests, good for unbalanced tasks, or if they can be processed individually</a:t>
-            </a:r>
-          </a:p>
-          <a:p>
-            <a:r>
-              <a:rPr lang="en-US" dirty="0" err="1" smtClean="0">
-                <a:latin typeface="Arial"/>
-                <a:cs typeface="Arial"/>
-              </a:rPr>
-              <a:t>MPI_Waitsome</a:t>
-            </a:r>
-            <a:r>
-              <a:rPr lang="en-US" dirty="0" smtClean="0"/>
-              <a:t> : wait for any number in an array, much like </a:t>
-            </a:r>
-            <a:r>
-              <a:rPr lang="en-US" dirty="0" err="1" smtClean="0">
-                <a:latin typeface="Arial"/>
-                <a:cs typeface="Arial"/>
-              </a:rPr>
-              <a:t>MPI_Waitany</a:t>
-            </a:r>
-            <a:r>
-              <a:rPr lang="en-US" dirty="0" smtClean="0">
-                <a:latin typeface="Arial"/>
-                <a:cs typeface="Arial"/>
-              </a:rPr>
-              <a:t> </a:t>
-            </a:r>
-            <a:endParaRPr lang="en-US" dirty="0">
-              <a:latin typeface="Arial"/>
-              <a:cs typeface="Arial"/>
-            </a:endParaRPr>
           </a:p>
         </p:txBody>
       </p:sp>
@@ -18201,83 +17062,6 @@
               <a:rPr lang="en-US" smtClean="0"/>
               <a:pPr/>
               <a:t>26</a:t>
-            </a:fld>
-            <a:endParaRPr lang="en-US" dirty="0"/>
-          </a:p>
-        </p:txBody>
-      </p:sp>
-    </p:spTree>
-    <p:extLst>
-      <p:ext uri="{BB962C8B-B14F-4D97-AF65-F5344CB8AC3E}">
-        <p14:creationId xmlns:p14="http://schemas.microsoft.com/office/powerpoint/2010/main" val="460115824"/>
-      </p:ext>
-    </p:extLst>
-  </p:cSld>
-  <p:clrMapOvr>
-    <a:masterClrMapping/>
-  </p:clrMapOvr>
-</p:sld>
-</file>
-
-<file path=ppt/slides/slide27.xml><?xml version="1.0" encoding="utf-8"?>
-<p:sld xmlns:a="http://schemas.openxmlformats.org/drawingml/2006/main" xmlns:r="http://schemas.openxmlformats.org/officeDocument/2006/relationships" xmlns:p="http://schemas.openxmlformats.org/presentationml/2006/main">
-  <p:cSld>
-    <p:spTree>
-      <p:nvGrpSpPr>
-        <p:cNvPr id="1" name=""/>
-        <p:cNvGrpSpPr/>
-        <p:nvPr/>
-      </p:nvGrpSpPr>
-      <p:grpSpPr>
-        <a:xfrm>
-          <a:off x="0" y="0"/>
-          <a:ext cx="0" cy="0"/>
-          <a:chOff x="0" y="0"/>
-          <a:chExt cx="0" cy="0"/>
-        </a:xfrm>
-      </p:grpSpPr>
-      <p:sp>
-        <p:nvSpPr>
-          <p:cNvPr id="2" name="Title 1"/>
-          <p:cNvSpPr>
-            <a:spLocks noGrp="1"/>
-          </p:cNvSpPr>
-          <p:nvPr>
-            <p:ph type="title"/>
-          </p:nvPr>
-        </p:nvSpPr>
-        <p:spPr/>
-        <p:txBody>
-          <a:bodyPr/>
-          <a:lstStyle/>
-          <a:p>
-            <a:r>
-              <a:rPr lang="en-US" dirty="0" smtClean="0"/>
-              <a:t>One-Sided or RMA</a:t>
-            </a:r>
-            <a:endParaRPr lang="en-US" dirty="0"/>
-          </a:p>
-        </p:txBody>
-      </p:sp>
-      <p:sp>
-        <p:nvSpPr>
-          <p:cNvPr id="4" name="Slide Number Placeholder 3"/>
-          <p:cNvSpPr>
-            <a:spLocks noGrp="1"/>
-          </p:cNvSpPr>
-          <p:nvPr>
-            <p:ph type="sldNum" sz="quarter" idx="12"/>
-          </p:nvPr>
-        </p:nvSpPr>
-        <p:spPr/>
-        <p:txBody>
-          <a:bodyPr/>
-          <a:lstStyle/>
-          <a:p>
-            <a:fld id="{7B90F24A-6679-4F21-A41E-0DBEFD6DC596}" type="slidenum">
-              <a:rPr lang="en-US" smtClean="0"/>
-              <a:pPr/>
-              <a:t>27</a:t>
             </a:fld>
             <a:endParaRPr lang="en-US" dirty="0"/>
           </a:p>
@@ -18361,7 +17145,7 @@
 </p:sld>
 </file>
 
-<file path=ppt/slides/slide28.xml><?xml version="1.0" encoding="utf-8"?>
+<file path=ppt/slides/slide27.xml><?xml version="1.0" encoding="utf-8"?>
 <p:sld xmlns:a="http://schemas.openxmlformats.org/drawingml/2006/main" xmlns:r="http://schemas.openxmlformats.org/officeDocument/2006/relationships" xmlns:p="http://schemas.openxmlformats.org/presentationml/2006/main">
   <p:cSld>
     <p:spTree>
@@ -18419,7 +17203,7 @@
             <a:fld id="{7B90F24A-6679-4F21-A41E-0DBEFD6DC596}" type="slidenum">
               <a:rPr lang="en-US" smtClean="0"/>
               <a:pPr/>
-              <a:t>28</a:t>
+              <a:t>27</a:t>
             </a:fld>
             <a:endParaRPr lang="en-US" dirty="0"/>
           </a:p>
@@ -18504,7 +17288,7 @@
 </p:sld>
 </file>
 
-<file path=ppt/slides/slide29.xml><?xml version="1.0" encoding="utf-8"?>
+<file path=ppt/slides/slide28.xml><?xml version="1.0" encoding="utf-8"?>
 <p:sld xmlns:a="http://schemas.openxmlformats.org/drawingml/2006/main" xmlns:r="http://schemas.openxmlformats.org/officeDocument/2006/relationships" xmlns:p="http://schemas.openxmlformats.org/presentationml/2006/main">
   <p:cSld>
     <p:spTree>
@@ -18539,7 +17323,7 @@
             <a:fld id="{7B90F24A-6679-4F21-A41E-0DBEFD6DC596}" type="slidenum">
               <a:rPr lang="en-US" smtClean="0"/>
               <a:pPr/>
-              <a:t>29</a:t>
+              <a:t>28</a:t>
             </a:fld>
             <a:endParaRPr lang="en-US" dirty="0"/>
           </a:p>
@@ -18673,6 +17457,342 @@
     <p:extLst>
       <p:ext uri="{BB962C8B-B14F-4D97-AF65-F5344CB8AC3E}">
         <p14:creationId xmlns:p14="http://schemas.microsoft.com/office/powerpoint/2010/main" val="3740550571"/>
+      </p:ext>
+    </p:extLst>
+  </p:cSld>
+  <p:clrMapOvr>
+    <a:masterClrMapping/>
+  </p:clrMapOvr>
+</p:sld>
+</file>
+
+<file path=ppt/slides/slide29.xml><?xml version="1.0" encoding="utf-8"?>
+<p:sld xmlns:a="http://schemas.openxmlformats.org/drawingml/2006/main" xmlns:r="http://schemas.openxmlformats.org/officeDocument/2006/relationships" xmlns:p="http://schemas.openxmlformats.org/presentationml/2006/main">
+  <p:cSld>
+    <p:spTree>
+      <p:nvGrpSpPr>
+        <p:cNvPr id="1" name=""/>
+        <p:cNvGrpSpPr/>
+        <p:nvPr/>
+      </p:nvGrpSpPr>
+      <p:grpSpPr>
+        <a:xfrm>
+          <a:off x="0" y="0"/>
+          <a:ext cx="0" cy="0"/>
+          <a:chOff x="0" y="0"/>
+          <a:chExt cx="0" cy="0"/>
+        </a:xfrm>
+      </p:grpSpPr>
+      <p:sp>
+        <p:nvSpPr>
+          <p:cNvPr id="2" name="Title 1"/>
+          <p:cNvSpPr>
+            <a:spLocks noGrp="1"/>
+          </p:cNvSpPr>
+          <p:nvPr>
+            <p:ph type="title"/>
+          </p:nvPr>
+        </p:nvSpPr>
+        <p:spPr/>
+        <p:txBody>
+          <a:bodyPr/>
+          <a:lstStyle/>
+          <a:p>
+            <a:r>
+              <a:rPr lang="en-US" dirty="0" smtClean="0"/>
+              <a:t>RMA routines</a:t>
+            </a:r>
+            <a:endParaRPr lang="en-US" dirty="0"/>
+          </a:p>
+        </p:txBody>
+      </p:sp>
+      <p:sp>
+        <p:nvSpPr>
+          <p:cNvPr id="4" name="Slide Number Placeholder 3"/>
+          <p:cNvSpPr>
+            <a:spLocks noGrp="1"/>
+          </p:cNvSpPr>
+          <p:nvPr>
+            <p:ph type="sldNum" sz="quarter" idx="12"/>
+          </p:nvPr>
+        </p:nvSpPr>
+        <p:spPr/>
+        <p:txBody>
+          <a:bodyPr/>
+          <a:lstStyle/>
+          <a:p>
+            <a:fld id="{7B90F24A-6679-4F21-A41E-0DBEFD6DC596}" type="slidenum">
+              <a:rPr lang="en-US" smtClean="0"/>
+              <a:pPr/>
+              <a:t>29</a:t>
+            </a:fld>
+            <a:endParaRPr lang="en-US" dirty="0"/>
+          </a:p>
+        </p:txBody>
+      </p:sp>
+      <p:sp>
+        <p:nvSpPr>
+          <p:cNvPr id="6" name="TextBox 5"/>
+          <p:cNvSpPr txBox="1"/>
+          <p:nvPr/>
+        </p:nvSpPr>
+        <p:spPr>
+          <a:xfrm>
+            <a:off x="0" y="1600200"/>
+            <a:ext cx="9144000" cy="2554545"/>
+          </a:xfrm>
+          <a:prstGeom prst="rect">
+            <a:avLst/>
+          </a:prstGeom>
+          <a:noFill/>
+        </p:spPr>
+        <p:txBody>
+          <a:bodyPr wrap="square" rtlCol="0">
+            <a:spAutoFit/>
+          </a:bodyPr>
+          <a:lstStyle/>
+          <a:p>
+            <a:r>
+              <a:rPr lang="en-US" sz="2000" dirty="0" err="1"/>
+              <a:t>int</a:t>
+            </a:r>
+            <a:r>
+              <a:rPr lang="en-US" sz="2000" dirty="0"/>
+              <a:t> </a:t>
+            </a:r>
+            <a:r>
+              <a:rPr lang="en-US" sz="2000" dirty="0" err="1"/>
+              <a:t>MPI_Win_create</a:t>
+            </a:r>
+            <a:r>
+              <a:rPr lang="en-US" sz="2000" dirty="0"/>
+              <a:t>(void *base, </a:t>
+            </a:r>
+            <a:r>
+              <a:rPr lang="en-US" sz="2000" dirty="0" err="1"/>
+              <a:t>MPI_Aint</a:t>
+            </a:r>
+            <a:r>
+              <a:rPr lang="en-US" sz="2000" dirty="0"/>
+              <a:t> size</a:t>
+            </a:r>
+            <a:r>
+              <a:rPr lang="en-US" sz="2000" dirty="0" smtClean="0"/>
+              <a:t>, </a:t>
+            </a:r>
+            <a:r>
+              <a:rPr lang="en-US" sz="2000" dirty="0" err="1" smtClean="0"/>
+              <a:t>int</a:t>
+            </a:r>
+            <a:r>
+              <a:rPr lang="en-US" sz="2000" dirty="0" smtClean="0"/>
+              <a:t> </a:t>
+            </a:r>
+            <a:r>
+              <a:rPr lang="en-US" sz="2000" dirty="0" err="1"/>
+              <a:t>disp_unit</a:t>
+            </a:r>
+            <a:r>
+              <a:rPr lang="en-US" sz="2000" dirty="0"/>
+              <a:t>, </a:t>
+            </a:r>
+            <a:r>
+              <a:rPr lang="en-US" sz="2000" dirty="0" err="1"/>
+              <a:t>MPI_Info</a:t>
+            </a:r>
+            <a:r>
+              <a:rPr lang="en-US" sz="2000" dirty="0"/>
+              <a:t> info</a:t>
+            </a:r>
+            <a:r>
+              <a:rPr lang="en-US" sz="2000" dirty="0" smtClean="0"/>
+              <a:t>, </a:t>
+            </a:r>
+            <a:endParaRPr lang="en-US" sz="2000" dirty="0"/>
+          </a:p>
+          <a:p>
+            <a:r>
+              <a:rPr lang="en-US" sz="2000" dirty="0"/>
+              <a:t> </a:t>
+            </a:r>
+            <a:r>
+              <a:rPr lang="en-US" sz="2000" dirty="0" smtClean="0"/>
+              <a:t>   </a:t>
+            </a:r>
+            <a:r>
+              <a:rPr lang="en-US" sz="2000" dirty="0" err="1" smtClean="0"/>
+              <a:t>MPI_Comm</a:t>
+            </a:r>
+            <a:r>
+              <a:rPr lang="en-US" sz="2000" dirty="0" smtClean="0"/>
+              <a:t> </a:t>
+            </a:r>
+            <a:r>
+              <a:rPr lang="en-US" sz="2000" dirty="0" err="1"/>
+              <a:t>comm</a:t>
+            </a:r>
+            <a:r>
+              <a:rPr lang="en-US" sz="2000" dirty="0"/>
+              <a:t>, </a:t>
+            </a:r>
+            <a:r>
+              <a:rPr lang="en-US" sz="2000" dirty="0" err="1" smtClean="0"/>
+              <a:t>MPI_Win</a:t>
+            </a:r>
+            <a:r>
+              <a:rPr lang="en-US" sz="2000" dirty="0" smtClean="0"/>
+              <a:t> *win) </a:t>
+            </a:r>
+            <a:endParaRPr lang="en-US" sz="2000" dirty="0"/>
+          </a:p>
+          <a:p>
+            <a:endParaRPr lang="en-US" sz="2000" dirty="0" smtClean="0"/>
+          </a:p>
+          <a:p>
+            <a:r>
+              <a:rPr lang="en-US" sz="2000" dirty="0" err="1" smtClean="0"/>
+              <a:t>MPI_Get</a:t>
+            </a:r>
+            <a:r>
+              <a:rPr lang="en-US" sz="2000" dirty="0"/>
+              <a:t>( </a:t>
+            </a:r>
+            <a:r>
+              <a:rPr lang="en-US" sz="2000" dirty="0" err="1"/>
+              <a:t>origin_addr</a:t>
+            </a:r>
+            <a:r>
+              <a:rPr lang="en-US" sz="2000" dirty="0"/>
+              <a:t>, </a:t>
+            </a:r>
+            <a:r>
+              <a:rPr lang="en-US" sz="2000" dirty="0" err="1"/>
+              <a:t>origin_count</a:t>
+            </a:r>
+            <a:r>
+              <a:rPr lang="en-US" sz="2000" dirty="0"/>
+              <a:t>, </a:t>
+            </a:r>
+            <a:r>
+              <a:rPr lang="en-US" sz="2000" dirty="0" err="1"/>
+              <a:t>origin_datatype</a:t>
+            </a:r>
+            <a:r>
+              <a:rPr lang="en-US" sz="2000" dirty="0"/>
+              <a:t>, </a:t>
+            </a:r>
+            <a:r>
+              <a:rPr lang="en-US" sz="2000" dirty="0" smtClean="0"/>
+              <a:t/>
+            </a:r>
+            <a:br>
+              <a:rPr lang="en-US" sz="2000" dirty="0" smtClean="0"/>
+            </a:br>
+            <a:r>
+              <a:rPr lang="en-US" sz="2000" dirty="0" smtClean="0"/>
+              <a:t>                   </a:t>
+            </a:r>
+            <a:r>
+              <a:rPr lang="en-US" sz="2000" dirty="0" err="1" smtClean="0"/>
+              <a:t>target_rank</a:t>
+            </a:r>
+            <a:r>
+              <a:rPr lang="en-US" sz="2000" dirty="0"/>
+              <a:t>, </a:t>
+            </a:r>
+            <a:r>
+              <a:rPr lang="en-US" sz="2000" dirty="0" err="1"/>
+              <a:t>target_disp</a:t>
+            </a:r>
+            <a:r>
+              <a:rPr lang="en-US" sz="2000" dirty="0"/>
+              <a:t>, </a:t>
+            </a:r>
+            <a:r>
+              <a:rPr lang="en-US" sz="2000" dirty="0" err="1"/>
+              <a:t>target_count</a:t>
+            </a:r>
+            <a:r>
+              <a:rPr lang="en-US" sz="2000" dirty="0"/>
+              <a:t>, </a:t>
+            </a:r>
+            <a:r>
+              <a:rPr lang="en-US" sz="2000" dirty="0" err="1"/>
+              <a:t>target_datatype</a:t>
+            </a:r>
+            <a:r>
+              <a:rPr lang="en-US" sz="2000" dirty="0"/>
+              <a:t>, </a:t>
+            </a:r>
+            <a:r>
+              <a:rPr lang="en-US" sz="2000" dirty="0" smtClean="0"/>
+              <a:t/>
+            </a:r>
+            <a:br>
+              <a:rPr lang="en-US" sz="2000" dirty="0" smtClean="0"/>
+            </a:br>
+            <a:r>
+              <a:rPr lang="en-US" sz="2000" dirty="0" smtClean="0"/>
+              <a:t>                   win)</a:t>
+            </a:r>
+          </a:p>
+          <a:p>
+            <a:endParaRPr lang="en-US" sz="2000" dirty="0"/>
+          </a:p>
+          <a:p>
+            <a:r>
+              <a:rPr lang="en-US" sz="2000" dirty="0" err="1"/>
+              <a:t>MPI_Win_fence</a:t>
+            </a:r>
+            <a:r>
+              <a:rPr lang="en-US" sz="2000" dirty="0"/>
+              <a:t>(</a:t>
+            </a:r>
+            <a:r>
+              <a:rPr lang="en-US" sz="2000" dirty="0" err="1"/>
+              <a:t>assert,win</a:t>
+            </a:r>
+            <a:r>
+              <a:rPr lang="en-US" sz="2000" dirty="0" smtClean="0"/>
+              <a:t>)</a:t>
+            </a:r>
+          </a:p>
+        </p:txBody>
+      </p:sp>
+      <p:sp>
+        <p:nvSpPr>
+          <p:cNvPr id="8" name="TextBox 7"/>
+          <p:cNvSpPr txBox="1"/>
+          <p:nvPr/>
+        </p:nvSpPr>
+        <p:spPr>
+          <a:xfrm>
+            <a:off x="0" y="4419600"/>
+            <a:ext cx="5526723" cy="369332"/>
+          </a:xfrm>
+          <a:prstGeom prst="rect">
+            <a:avLst/>
+          </a:prstGeom>
+          <a:noFill/>
+        </p:spPr>
+        <p:txBody>
+          <a:bodyPr wrap="none" rtlCol="0">
+            <a:spAutoFit/>
+          </a:bodyPr>
+          <a:lstStyle/>
+          <a:p>
+            <a:r>
+              <a:rPr lang="en-US" dirty="0" smtClean="0"/>
+              <a:t>Use of fences is one way to synchronize. There are more.</a:t>
+            </a:r>
+            <a:endParaRPr lang="en-US" dirty="0"/>
+          </a:p>
+        </p:txBody>
+      </p:sp>
+    </p:spTree>
+    <p:extLst>
+      <p:ext uri="{BB962C8B-B14F-4D97-AF65-F5344CB8AC3E}">
+        <p14:creationId xmlns:p14="http://schemas.microsoft.com/office/powerpoint/2010/main" val="452899727"/>
       </p:ext>
     </p:extLst>
   </p:cSld>
@@ -18851,342 +17971,6 @@
           <a:p>
             <a:r>
               <a:rPr lang="en-US" dirty="0" smtClean="0"/>
-              <a:t>RMA routines</a:t>
-            </a:r>
-            <a:endParaRPr lang="en-US" dirty="0"/>
-          </a:p>
-        </p:txBody>
-      </p:sp>
-      <p:sp>
-        <p:nvSpPr>
-          <p:cNvPr id="4" name="Slide Number Placeholder 3"/>
-          <p:cNvSpPr>
-            <a:spLocks noGrp="1"/>
-          </p:cNvSpPr>
-          <p:nvPr>
-            <p:ph type="sldNum" sz="quarter" idx="12"/>
-          </p:nvPr>
-        </p:nvSpPr>
-        <p:spPr/>
-        <p:txBody>
-          <a:bodyPr/>
-          <a:lstStyle/>
-          <a:p>
-            <a:fld id="{7B90F24A-6679-4F21-A41E-0DBEFD6DC596}" type="slidenum">
-              <a:rPr lang="en-US" smtClean="0"/>
-              <a:pPr/>
-              <a:t>30</a:t>
-            </a:fld>
-            <a:endParaRPr lang="en-US" dirty="0"/>
-          </a:p>
-        </p:txBody>
-      </p:sp>
-      <p:sp>
-        <p:nvSpPr>
-          <p:cNvPr id="6" name="TextBox 5"/>
-          <p:cNvSpPr txBox="1"/>
-          <p:nvPr/>
-        </p:nvSpPr>
-        <p:spPr>
-          <a:xfrm>
-            <a:off x="0" y="1600200"/>
-            <a:ext cx="9144000" cy="2554545"/>
-          </a:xfrm>
-          <a:prstGeom prst="rect">
-            <a:avLst/>
-          </a:prstGeom>
-          <a:noFill/>
-        </p:spPr>
-        <p:txBody>
-          <a:bodyPr wrap="square" rtlCol="0">
-            <a:spAutoFit/>
-          </a:bodyPr>
-          <a:lstStyle/>
-          <a:p>
-            <a:r>
-              <a:rPr lang="en-US" sz="2000" dirty="0" err="1"/>
-              <a:t>int</a:t>
-            </a:r>
-            <a:r>
-              <a:rPr lang="en-US" sz="2000" dirty="0"/>
-              <a:t> </a:t>
-            </a:r>
-            <a:r>
-              <a:rPr lang="en-US" sz="2000" dirty="0" err="1"/>
-              <a:t>MPI_Win_create</a:t>
-            </a:r>
-            <a:r>
-              <a:rPr lang="en-US" sz="2000" dirty="0"/>
-              <a:t>(void *base, </a:t>
-            </a:r>
-            <a:r>
-              <a:rPr lang="en-US" sz="2000" dirty="0" err="1"/>
-              <a:t>MPI_Aint</a:t>
-            </a:r>
-            <a:r>
-              <a:rPr lang="en-US" sz="2000" dirty="0"/>
-              <a:t> size</a:t>
-            </a:r>
-            <a:r>
-              <a:rPr lang="en-US" sz="2000" dirty="0" smtClean="0"/>
-              <a:t>, </a:t>
-            </a:r>
-            <a:r>
-              <a:rPr lang="en-US" sz="2000" dirty="0" err="1" smtClean="0"/>
-              <a:t>int</a:t>
-            </a:r>
-            <a:r>
-              <a:rPr lang="en-US" sz="2000" dirty="0" smtClean="0"/>
-              <a:t> </a:t>
-            </a:r>
-            <a:r>
-              <a:rPr lang="en-US" sz="2000" dirty="0" err="1"/>
-              <a:t>disp_unit</a:t>
-            </a:r>
-            <a:r>
-              <a:rPr lang="en-US" sz="2000" dirty="0"/>
-              <a:t>, </a:t>
-            </a:r>
-            <a:r>
-              <a:rPr lang="en-US" sz="2000" dirty="0" err="1"/>
-              <a:t>MPI_Info</a:t>
-            </a:r>
-            <a:r>
-              <a:rPr lang="en-US" sz="2000" dirty="0"/>
-              <a:t> info</a:t>
-            </a:r>
-            <a:r>
-              <a:rPr lang="en-US" sz="2000" dirty="0" smtClean="0"/>
-              <a:t>, </a:t>
-            </a:r>
-            <a:endParaRPr lang="en-US" sz="2000" dirty="0"/>
-          </a:p>
-          <a:p>
-            <a:r>
-              <a:rPr lang="en-US" sz="2000" dirty="0"/>
-              <a:t> </a:t>
-            </a:r>
-            <a:r>
-              <a:rPr lang="en-US" sz="2000" dirty="0" smtClean="0"/>
-              <a:t>   </a:t>
-            </a:r>
-            <a:r>
-              <a:rPr lang="en-US" sz="2000" dirty="0" err="1" smtClean="0"/>
-              <a:t>MPI_Comm</a:t>
-            </a:r>
-            <a:r>
-              <a:rPr lang="en-US" sz="2000" dirty="0" smtClean="0"/>
-              <a:t> </a:t>
-            </a:r>
-            <a:r>
-              <a:rPr lang="en-US" sz="2000" dirty="0" err="1"/>
-              <a:t>comm</a:t>
-            </a:r>
-            <a:r>
-              <a:rPr lang="en-US" sz="2000" dirty="0"/>
-              <a:t>, </a:t>
-            </a:r>
-            <a:r>
-              <a:rPr lang="en-US" sz="2000" dirty="0" err="1" smtClean="0"/>
-              <a:t>MPI_Win</a:t>
-            </a:r>
-            <a:r>
-              <a:rPr lang="en-US" sz="2000" dirty="0" smtClean="0"/>
-              <a:t> *win) </a:t>
-            </a:r>
-            <a:endParaRPr lang="en-US" sz="2000" dirty="0"/>
-          </a:p>
-          <a:p>
-            <a:endParaRPr lang="en-US" sz="2000" dirty="0" smtClean="0"/>
-          </a:p>
-          <a:p>
-            <a:r>
-              <a:rPr lang="en-US" sz="2000" dirty="0" err="1" smtClean="0"/>
-              <a:t>MPI_Get</a:t>
-            </a:r>
-            <a:r>
-              <a:rPr lang="en-US" sz="2000" dirty="0"/>
-              <a:t>( </a:t>
-            </a:r>
-            <a:r>
-              <a:rPr lang="en-US" sz="2000" dirty="0" err="1"/>
-              <a:t>origin_addr</a:t>
-            </a:r>
-            <a:r>
-              <a:rPr lang="en-US" sz="2000" dirty="0"/>
-              <a:t>, </a:t>
-            </a:r>
-            <a:r>
-              <a:rPr lang="en-US" sz="2000" dirty="0" err="1"/>
-              <a:t>origin_count</a:t>
-            </a:r>
-            <a:r>
-              <a:rPr lang="en-US" sz="2000" dirty="0"/>
-              <a:t>, </a:t>
-            </a:r>
-            <a:r>
-              <a:rPr lang="en-US" sz="2000" dirty="0" err="1"/>
-              <a:t>origin_datatype</a:t>
-            </a:r>
-            <a:r>
-              <a:rPr lang="en-US" sz="2000" dirty="0"/>
-              <a:t>, </a:t>
-            </a:r>
-            <a:r>
-              <a:rPr lang="en-US" sz="2000" dirty="0" smtClean="0"/>
-              <a:t/>
-            </a:r>
-            <a:br>
-              <a:rPr lang="en-US" sz="2000" dirty="0" smtClean="0"/>
-            </a:br>
-            <a:r>
-              <a:rPr lang="en-US" sz="2000" dirty="0" smtClean="0"/>
-              <a:t>                   </a:t>
-            </a:r>
-            <a:r>
-              <a:rPr lang="en-US" sz="2000" dirty="0" err="1" smtClean="0"/>
-              <a:t>target_rank</a:t>
-            </a:r>
-            <a:r>
-              <a:rPr lang="en-US" sz="2000" dirty="0"/>
-              <a:t>, </a:t>
-            </a:r>
-            <a:r>
-              <a:rPr lang="en-US" sz="2000" dirty="0" err="1"/>
-              <a:t>target_disp</a:t>
-            </a:r>
-            <a:r>
-              <a:rPr lang="en-US" sz="2000" dirty="0"/>
-              <a:t>, </a:t>
-            </a:r>
-            <a:r>
-              <a:rPr lang="en-US" sz="2000" dirty="0" err="1"/>
-              <a:t>target_count</a:t>
-            </a:r>
-            <a:r>
-              <a:rPr lang="en-US" sz="2000" dirty="0"/>
-              <a:t>, </a:t>
-            </a:r>
-            <a:r>
-              <a:rPr lang="en-US" sz="2000" dirty="0" err="1"/>
-              <a:t>target_datatype</a:t>
-            </a:r>
-            <a:r>
-              <a:rPr lang="en-US" sz="2000" dirty="0"/>
-              <a:t>, </a:t>
-            </a:r>
-            <a:r>
-              <a:rPr lang="en-US" sz="2000" dirty="0" smtClean="0"/>
-              <a:t/>
-            </a:r>
-            <a:br>
-              <a:rPr lang="en-US" sz="2000" dirty="0" smtClean="0"/>
-            </a:br>
-            <a:r>
-              <a:rPr lang="en-US" sz="2000" dirty="0" smtClean="0"/>
-              <a:t>                   win)</a:t>
-            </a:r>
-          </a:p>
-          <a:p>
-            <a:endParaRPr lang="en-US" sz="2000" dirty="0"/>
-          </a:p>
-          <a:p>
-            <a:r>
-              <a:rPr lang="en-US" sz="2000" dirty="0" err="1"/>
-              <a:t>MPI_Win_fence</a:t>
-            </a:r>
-            <a:r>
-              <a:rPr lang="en-US" sz="2000" dirty="0"/>
-              <a:t>(</a:t>
-            </a:r>
-            <a:r>
-              <a:rPr lang="en-US" sz="2000" dirty="0" err="1"/>
-              <a:t>assert,win</a:t>
-            </a:r>
-            <a:r>
-              <a:rPr lang="en-US" sz="2000" dirty="0" smtClean="0"/>
-              <a:t>)</a:t>
-            </a:r>
-          </a:p>
-        </p:txBody>
-      </p:sp>
-      <p:sp>
-        <p:nvSpPr>
-          <p:cNvPr id="8" name="TextBox 7"/>
-          <p:cNvSpPr txBox="1"/>
-          <p:nvPr/>
-        </p:nvSpPr>
-        <p:spPr>
-          <a:xfrm>
-            <a:off x="0" y="4419600"/>
-            <a:ext cx="5526723" cy="369332"/>
-          </a:xfrm>
-          <a:prstGeom prst="rect">
-            <a:avLst/>
-          </a:prstGeom>
-          <a:noFill/>
-        </p:spPr>
-        <p:txBody>
-          <a:bodyPr wrap="none" rtlCol="0">
-            <a:spAutoFit/>
-          </a:bodyPr>
-          <a:lstStyle/>
-          <a:p>
-            <a:r>
-              <a:rPr lang="en-US" dirty="0" smtClean="0"/>
-              <a:t>Use of fences is one way to synchronize. There are more.</a:t>
-            </a:r>
-            <a:endParaRPr lang="en-US" dirty="0"/>
-          </a:p>
-        </p:txBody>
-      </p:sp>
-    </p:spTree>
-    <p:extLst>
-      <p:ext uri="{BB962C8B-B14F-4D97-AF65-F5344CB8AC3E}">
-        <p14:creationId xmlns:p14="http://schemas.microsoft.com/office/powerpoint/2010/main" val="452899727"/>
-      </p:ext>
-    </p:extLst>
-  </p:cSld>
-  <p:clrMapOvr>
-    <a:masterClrMapping/>
-  </p:clrMapOvr>
-</p:sld>
-</file>
-
-<file path=ppt/slides/slide31.xml><?xml version="1.0" encoding="utf-8"?>
-<p:sld xmlns:a="http://schemas.openxmlformats.org/drawingml/2006/main" xmlns:r="http://schemas.openxmlformats.org/officeDocument/2006/relationships" xmlns:p="http://schemas.openxmlformats.org/presentationml/2006/main">
-  <p:cSld>
-    <p:spTree>
-      <p:nvGrpSpPr>
-        <p:cNvPr id="1" name=""/>
-        <p:cNvGrpSpPr/>
-        <p:nvPr/>
-      </p:nvGrpSpPr>
-      <p:grpSpPr>
-        <a:xfrm>
-          <a:off x="0" y="0"/>
-          <a:ext cx="0" cy="0"/>
-          <a:chOff x="0" y="0"/>
-          <a:chExt cx="0" cy="0"/>
-        </a:xfrm>
-      </p:grpSpPr>
-      <p:sp>
-        <p:nvSpPr>
-          <p:cNvPr id="2" name="Title 1"/>
-          <p:cNvSpPr>
-            <a:spLocks noGrp="1"/>
-          </p:cNvSpPr>
-          <p:nvPr>
-            <p:ph type="title"/>
-          </p:nvPr>
-        </p:nvSpPr>
-        <p:spPr/>
-        <p:txBody>
-          <a:bodyPr/>
-          <a:lstStyle/>
-          <a:p>
-            <a:r>
-              <a:rPr lang="en-US" dirty="0" smtClean="0"/>
               <a:t>Fences</a:t>
             </a:r>
             <a:endParaRPr lang="en-US" dirty="0"/>
@@ -19372,7 +18156,7 @@
             <a:fld id="{7B90F24A-6679-4F21-A41E-0DBEFD6DC596}" type="slidenum">
               <a:rPr lang="en-US" smtClean="0"/>
               <a:pPr/>
-              <a:t>31</a:t>
+              <a:t>30</a:t>
             </a:fld>
             <a:endParaRPr lang="en-US" dirty="0"/>
           </a:p>
@@ -19391,7 +18175,7 @@
 </p:sld>
 </file>
 
-<file path=ppt/slides/slide32.xml><?xml version="1.0" encoding="utf-8"?>
+<file path=ppt/slides/slide31.xml><?xml version="1.0" encoding="utf-8"?>
 <p:sld xmlns:a="http://schemas.openxmlformats.org/drawingml/2006/main" xmlns:r="http://schemas.openxmlformats.org/officeDocument/2006/relationships" xmlns:p="http://schemas.openxmlformats.org/presentationml/2006/main">
   <p:cSld>
     <p:spTree>
@@ -19477,7 +18261,7 @@
             <a:fld id="{7B90F24A-6679-4F21-A41E-0DBEFD6DC596}" type="slidenum">
               <a:rPr lang="en-US" smtClean="0"/>
               <a:pPr/>
-              <a:t>32</a:t>
+              <a:t>31</a:t>
             </a:fld>
             <a:endParaRPr lang="en-US" dirty="0"/>
           </a:p>

</xml_diff>